<commit_message>
Ported advanced part 2 slides to C
 - Duplicated and hid the C++ slides, and ported to C
 - Updated Bilateral meta programming results slides to use P100s
</commit_message>
<xml_diff>
--- a/advanced_part2.pptx
+++ b/advanced_part2.pptx
@@ -5,7 +5,7 @@
     <p:sldMasterId id="2147483648" r:id="rId1"/>
   </p:sldMasterIdLst>
   <p:notesMasterIdLst>
-    <p:notesMasterId r:id="rId28"/>
+    <p:notesMasterId r:id="rId33"/>
   </p:notesMasterIdLst>
   <p:sldIdLst>
     <p:sldId id="257" r:id="rId2"/>
@@ -16,24 +16,29 @@
     <p:sldId id="259" r:id="rId7"/>
     <p:sldId id="260" r:id="rId8"/>
     <p:sldId id="261" r:id="rId9"/>
-    <p:sldId id="262" r:id="rId10"/>
-    <p:sldId id="263" r:id="rId11"/>
-    <p:sldId id="283" r:id="rId12"/>
-    <p:sldId id="284" r:id="rId13"/>
-    <p:sldId id="267" r:id="rId14"/>
-    <p:sldId id="269" r:id="rId15"/>
-    <p:sldId id="268" r:id="rId16"/>
-    <p:sldId id="270" r:id="rId17"/>
-    <p:sldId id="271" r:id="rId18"/>
-    <p:sldId id="272" r:id="rId19"/>
-    <p:sldId id="278" r:id="rId20"/>
-    <p:sldId id="273" r:id="rId21"/>
-    <p:sldId id="274" r:id="rId22"/>
-    <p:sldId id="275" r:id="rId23"/>
-    <p:sldId id="281" r:id="rId24"/>
-    <p:sldId id="279" r:id="rId25"/>
-    <p:sldId id="277" r:id="rId26"/>
-    <p:sldId id="282" r:id="rId27"/>
+    <p:sldId id="285" r:id="rId10"/>
+    <p:sldId id="262" r:id="rId11"/>
+    <p:sldId id="263" r:id="rId12"/>
+    <p:sldId id="283" r:id="rId13"/>
+    <p:sldId id="284" r:id="rId14"/>
+    <p:sldId id="267" r:id="rId15"/>
+    <p:sldId id="269" r:id="rId16"/>
+    <p:sldId id="268" r:id="rId17"/>
+    <p:sldId id="286" r:id="rId18"/>
+    <p:sldId id="270" r:id="rId19"/>
+    <p:sldId id="287" r:id="rId20"/>
+    <p:sldId id="271" r:id="rId21"/>
+    <p:sldId id="272" r:id="rId22"/>
+    <p:sldId id="278" r:id="rId23"/>
+    <p:sldId id="273" r:id="rId24"/>
+    <p:sldId id="274" r:id="rId25"/>
+    <p:sldId id="288" r:id="rId26"/>
+    <p:sldId id="275" r:id="rId27"/>
+    <p:sldId id="281" r:id="rId28"/>
+    <p:sldId id="279" r:id="rId29"/>
+    <p:sldId id="277" r:id="rId30"/>
+    <p:sldId id="282" r:id="rId31"/>
+    <p:sldId id="289" r:id="rId32"/>
   </p:sldIdLst>
   <p:sldSz cx="9144000" cy="6858000" type="screen4x3"/>
   <p:notesSz cx="6858000" cy="9144000"/>
@@ -233,7 +238,7 @@
           <a:p>
             <a:fld id="{7FB74D45-CC88-7D46-9D48-9989C6A85D58}" type="datetimeFigureOut">
               <a:rPr lang="en-US" smtClean="0"/>
-              <a:t>5/14/18</a:t>
+              <a:t>11/21/18</a:t>
             </a:fld>
             <a:endParaRPr lang="en-US"/>
           </a:p>
@@ -642,20 +647,12 @@
           <a:lstStyle/>
           <a:p>
             <a:r>
-              <a:rPr lang="en-GB" dirty="0"/>
-              <a:t>Runtime</a:t>
+              <a:rPr lang="en-GB" dirty="0" err="1"/>
+              <a:t>ifdefs</a:t>
             </a:r>
             <a:r>
               <a:rPr lang="en-GB" baseline="0" dirty="0"/>
-              <a:t> can perform constant folding, constant propagation </a:t>
-            </a:r>
-            <a:r>
-              <a:rPr lang="en-GB" baseline="0" dirty="0" err="1"/>
-              <a:t>etc</a:t>
-            </a:r>
-            <a:r>
-              <a:rPr lang="en-GB" baseline="0" dirty="0"/>
-              <a:t> before finalizing to native ISA</a:t>
+              <a:t> for toggling functionality</a:t>
             </a:r>
             <a:endParaRPr lang="en-GB" dirty="0"/>
           </a:p>
@@ -678,7 +675,107 @@
           <a:p>
             <a:fld id="{E0B00886-CC17-8E42-AE02-995FCC132C1C}" type="slidenum">
               <a:rPr lang="en-US" smtClean="0"/>
-              <a:t>23</a:t>
+              <a:t>26</a:t>
+            </a:fld>
+            <a:endParaRPr lang="en-US"/>
+          </a:p>
+        </p:txBody>
+      </p:sp>
+    </p:spTree>
+    <p:extLst>
+      <p:ext uri="{BB962C8B-B14F-4D97-AF65-F5344CB8AC3E}">
+        <p14:creationId xmlns:p14="http://schemas.microsoft.com/office/powerpoint/2010/main" val="2018077648"/>
+      </p:ext>
+    </p:extLst>
+  </p:cSld>
+  <p:clrMapOvr>
+    <a:masterClrMapping/>
+  </p:clrMapOvr>
+</p:notes>
+</file>
+
+<file path=ppt/notesSlides/notesSlide11.xml><?xml version="1.0" encoding="utf-8"?>
+<p:notes xmlns:a="http://schemas.openxmlformats.org/drawingml/2006/main" xmlns:r="http://schemas.openxmlformats.org/officeDocument/2006/relationships" xmlns:p="http://schemas.openxmlformats.org/presentationml/2006/main">
+  <p:cSld>
+    <p:spTree>
+      <p:nvGrpSpPr>
+        <p:cNvPr id="1" name=""/>
+        <p:cNvGrpSpPr/>
+        <p:nvPr/>
+      </p:nvGrpSpPr>
+      <p:grpSpPr>
+        <a:xfrm>
+          <a:off x="0" y="0"/>
+          <a:ext cx="0" cy="0"/>
+          <a:chOff x="0" y="0"/>
+          <a:chExt cx="0" cy="0"/>
+        </a:xfrm>
+      </p:grpSpPr>
+      <p:sp>
+        <p:nvSpPr>
+          <p:cNvPr id="2" name="Slide Image Placeholder 1"/>
+          <p:cNvSpPr>
+            <a:spLocks noGrp="1" noRot="1" noChangeAspect="1"/>
+          </p:cNvSpPr>
+          <p:nvPr>
+            <p:ph type="sldImg"/>
+          </p:nvPr>
+        </p:nvSpPr>
+        <p:spPr/>
+      </p:sp>
+      <p:sp>
+        <p:nvSpPr>
+          <p:cNvPr id="3" name="Notes Placeholder 2"/>
+          <p:cNvSpPr>
+            <a:spLocks noGrp="1"/>
+          </p:cNvSpPr>
+          <p:nvPr>
+            <p:ph type="body" idx="1"/>
+          </p:nvPr>
+        </p:nvSpPr>
+        <p:spPr/>
+        <p:txBody>
+          <a:bodyPr/>
+          <a:lstStyle/>
+          <a:p>
+            <a:r>
+              <a:rPr lang="en-GB" dirty="0"/>
+              <a:t>Runtime</a:t>
+            </a:r>
+            <a:r>
+              <a:rPr lang="en-GB" baseline="0" dirty="0"/>
+              <a:t> can perform constant folding, constant propagation </a:t>
+            </a:r>
+            <a:r>
+              <a:rPr lang="en-GB" baseline="0" dirty="0" err="1"/>
+              <a:t>etc</a:t>
+            </a:r>
+            <a:r>
+              <a:rPr lang="en-GB" baseline="0" dirty="0"/>
+              <a:t> before finalizing to native ISA</a:t>
+            </a:r>
+            <a:endParaRPr lang="en-GB" dirty="0"/>
+          </a:p>
+        </p:txBody>
+      </p:sp>
+      <p:sp>
+        <p:nvSpPr>
+          <p:cNvPr id="4" name="Slide Number Placeholder 3"/>
+          <p:cNvSpPr>
+            <a:spLocks noGrp="1"/>
+          </p:cNvSpPr>
+          <p:nvPr>
+            <p:ph type="sldNum" sz="quarter" idx="10"/>
+          </p:nvPr>
+        </p:nvSpPr>
+        <p:spPr/>
+        <p:txBody>
+          <a:bodyPr/>
+          <a:lstStyle/>
+          <a:p>
+            <a:fld id="{E0B00886-CC17-8E42-AE02-995FCC132C1C}" type="slidenum">
+              <a:rPr lang="en-US" smtClean="0"/>
+              <a:t>27</a:t>
             </a:fld>
             <a:endParaRPr lang="en-US"/>
           </a:p>
@@ -854,7 +951,7 @@
           <a:p>
             <a:fld id="{E0B00886-CC17-8E42-AE02-995FCC132C1C}" type="slidenum">
               <a:rPr lang="en-US" smtClean="0"/>
-              <a:t>10</a:t>
+              <a:t>11</a:t>
             </a:fld>
             <a:endParaRPr lang="en-US"/>
           </a:p>
@@ -968,7 +1065,7 @@
           <a:p>
             <a:fld id="{E0B00886-CC17-8E42-AE02-995FCC132C1C}" type="slidenum">
               <a:rPr lang="en-US" smtClean="0"/>
-              <a:t>11</a:t>
+              <a:t>12</a:t>
             </a:fld>
             <a:endParaRPr lang="en-US"/>
           </a:p>
@@ -1068,7 +1165,7 @@
           <a:p>
             <a:fld id="{E0B00886-CC17-8E42-AE02-995FCC132C1C}" type="slidenum">
               <a:rPr lang="en-US" smtClean="0"/>
-              <a:t>12</a:t>
+              <a:t>13</a:t>
             </a:fld>
             <a:endParaRPr lang="en-US"/>
           </a:p>
@@ -1152,7 +1249,7 @@
           <a:p>
             <a:fld id="{E0B00886-CC17-8E42-AE02-995FCC132C1C}" type="slidenum">
               <a:rPr lang="en-US" smtClean="0"/>
-              <a:t>14</a:t>
+              <a:t>15</a:t>
             </a:fld>
             <a:endParaRPr lang="en-US"/>
           </a:p>
@@ -1244,7 +1341,7 @@
           <a:p>
             <a:fld id="{E0B00886-CC17-8E42-AE02-995FCC132C1C}" type="slidenum">
               <a:rPr lang="en-US" smtClean="0"/>
-              <a:t>15</a:t>
+              <a:t>16</a:t>
             </a:fld>
             <a:endParaRPr lang="en-US"/>
           </a:p>
@@ -1309,24 +1406,12 @@
           <a:p>
             <a:r>
               <a:rPr lang="en-GB" dirty="0"/>
-              <a:t>Hints</a:t>
+              <a:t>e.g. Image processing framework, allow third-parties</a:t>
             </a:r>
             <a:r>
               <a:rPr lang="en-GB" baseline="0" dirty="0"/>
-              <a:t> to compiler to make it potentially enable more optimizations.</a:t>
-            </a:r>
-          </a:p>
-          <a:p>
-            <a:r>
-              <a:rPr lang="en-GB" baseline="0" dirty="0" err="1"/>
-              <a:t>reqd_work_group_size</a:t>
-            </a:r>
-            <a:r>
-              <a:rPr lang="en-GB" baseline="0" dirty="0"/>
-              <a:t> requires that we know WGSIZE at compile-time, but can use meta-programming</a:t>
-            </a:r>
-          </a:p>
-          <a:p>
+              <a:t> to drop additional filter kernels into directory and automatically insert them into pipeline</a:t>
+            </a:r>
             <a:endParaRPr lang="en-GB" dirty="0"/>
           </a:p>
         </p:txBody>
@@ -1346,19 +1431,18 @@
           <a:bodyPr/>
           <a:lstStyle/>
           <a:p>
-            <a:fld id="{9B3F2D69-97A9-4C41-91BD-6A22F8270148}" type="slidenum">
-              <a:rPr lang="en-GB" smtClean="0"/>
-              <a:pPr/>
-              <a:t>19</a:t>
+            <a:fld id="{E0B00886-CC17-8E42-AE02-995FCC132C1C}" type="slidenum">
+              <a:rPr lang="en-US" smtClean="0"/>
+              <a:t>17</a:t>
             </a:fld>
-            <a:endParaRPr lang="en-GB"/>
+            <a:endParaRPr lang="en-US"/>
           </a:p>
         </p:txBody>
       </p:sp>
     </p:spTree>
     <p:extLst>
       <p:ext uri="{BB962C8B-B14F-4D97-AF65-F5344CB8AC3E}">
-        <p14:creationId xmlns:p14="http://schemas.microsoft.com/office/powerpoint/2010/main" val="393086129"/>
+        <p14:creationId xmlns:p14="http://schemas.microsoft.com/office/powerpoint/2010/main" val="1953409054"/>
       </p:ext>
     </p:extLst>
   </p:cSld>
@@ -1413,13 +1497,25 @@
           <a:lstStyle/>
           <a:p>
             <a:r>
-              <a:rPr lang="en-GB" dirty="0" err="1"/>
-              <a:t>ifdefs</a:t>
+              <a:rPr lang="en-GB" dirty="0"/>
+              <a:t>Hints</a:t>
             </a:r>
             <a:r>
               <a:rPr lang="en-GB" baseline="0" dirty="0"/>
-              <a:t> for toggling functionality</a:t>
-            </a:r>
+              <a:t> to compiler to make it potentially enable more optimizations.</a:t>
+            </a:r>
+          </a:p>
+          <a:p>
+            <a:r>
+              <a:rPr lang="en-GB" baseline="0" dirty="0" err="1"/>
+              <a:t>reqd_work_group_size</a:t>
+            </a:r>
+            <a:r>
+              <a:rPr lang="en-GB" baseline="0" dirty="0"/>
+              <a:t> requires that we know WGSIZE at compile-time, but can use meta-programming</a:t>
+            </a:r>
+          </a:p>
+          <a:p>
             <a:endParaRPr lang="en-GB" dirty="0"/>
           </a:p>
         </p:txBody>
@@ -1439,18 +1535,19 @@
           <a:bodyPr/>
           <a:lstStyle/>
           <a:p>
-            <a:fld id="{E0B00886-CC17-8E42-AE02-995FCC132C1C}" type="slidenum">
-              <a:rPr lang="en-US" smtClean="0"/>
+            <a:fld id="{9B3F2D69-97A9-4C41-91BD-6A22F8270148}" type="slidenum">
+              <a:rPr lang="en-GB" smtClean="0"/>
+              <a:pPr/>
               <a:t>22</a:t>
             </a:fld>
-            <a:endParaRPr lang="en-US"/>
+            <a:endParaRPr lang="en-GB"/>
           </a:p>
         </p:txBody>
       </p:sp>
     </p:spTree>
     <p:extLst>
       <p:ext uri="{BB962C8B-B14F-4D97-AF65-F5344CB8AC3E}">
-        <p14:creationId xmlns:p14="http://schemas.microsoft.com/office/powerpoint/2010/main" val="2018077648"/>
+        <p14:creationId xmlns:p14="http://schemas.microsoft.com/office/powerpoint/2010/main" val="393086129"/>
       </p:ext>
     </p:extLst>
   </p:cSld>
@@ -1639,7 +1736,7 @@
           <a:p>
             <a:fld id="{D735EA19-98D7-5F47-83EC-D97C4239F8D5}" type="datetimeFigureOut">
               <a:rPr lang="en-US" smtClean="0"/>
-              <a:t>5/14/18</a:t>
+              <a:t>11/21/18</a:t>
             </a:fld>
             <a:endParaRPr lang="en-GB"/>
           </a:p>
@@ -1807,7 +1904,7 @@
           <a:p>
             <a:fld id="{D735EA19-98D7-5F47-83EC-D97C4239F8D5}" type="datetimeFigureOut">
               <a:rPr lang="en-US" smtClean="0"/>
-              <a:t>5/14/18</a:t>
+              <a:t>11/21/18</a:t>
             </a:fld>
             <a:endParaRPr lang="en-GB"/>
           </a:p>
@@ -1985,7 +2082,7 @@
           <a:p>
             <a:fld id="{D735EA19-98D7-5F47-83EC-D97C4239F8D5}" type="datetimeFigureOut">
               <a:rPr lang="en-US" smtClean="0"/>
-              <a:t>5/14/18</a:t>
+              <a:t>11/21/18</a:t>
             </a:fld>
             <a:endParaRPr lang="en-GB"/>
           </a:p>
@@ -2153,7 +2250,7 @@
           <a:p>
             <a:fld id="{D735EA19-98D7-5F47-83EC-D97C4239F8D5}" type="datetimeFigureOut">
               <a:rPr lang="en-US" smtClean="0"/>
-              <a:t>5/14/18</a:t>
+              <a:t>11/21/18</a:t>
             </a:fld>
             <a:endParaRPr lang="en-GB"/>
           </a:p>
@@ -2398,7 +2495,7 @@
           <a:p>
             <a:fld id="{D735EA19-98D7-5F47-83EC-D97C4239F8D5}" type="datetimeFigureOut">
               <a:rPr lang="en-US" smtClean="0"/>
-              <a:t>5/14/18</a:t>
+              <a:t>11/21/18</a:t>
             </a:fld>
             <a:endParaRPr lang="en-GB"/>
           </a:p>
@@ -2683,7 +2780,7 @@
           <a:p>
             <a:fld id="{D735EA19-98D7-5F47-83EC-D97C4239F8D5}" type="datetimeFigureOut">
               <a:rPr lang="en-US" smtClean="0"/>
-              <a:t>5/14/18</a:t>
+              <a:t>11/21/18</a:t>
             </a:fld>
             <a:endParaRPr lang="en-GB"/>
           </a:p>
@@ -3102,7 +3199,7 @@
           <a:p>
             <a:fld id="{D735EA19-98D7-5F47-83EC-D97C4239F8D5}" type="datetimeFigureOut">
               <a:rPr lang="en-US" smtClean="0"/>
-              <a:t>5/14/18</a:t>
+              <a:t>11/21/18</a:t>
             </a:fld>
             <a:endParaRPr lang="en-GB"/>
           </a:p>
@@ -3219,7 +3316,7 @@
           <a:p>
             <a:fld id="{D735EA19-98D7-5F47-83EC-D97C4239F8D5}" type="datetimeFigureOut">
               <a:rPr lang="en-US" smtClean="0"/>
-              <a:t>5/14/18</a:t>
+              <a:t>11/21/18</a:t>
             </a:fld>
             <a:endParaRPr lang="en-GB"/>
           </a:p>
@@ -3314,7 +3411,7 @@
           <a:p>
             <a:fld id="{D735EA19-98D7-5F47-83EC-D97C4239F8D5}" type="datetimeFigureOut">
               <a:rPr lang="en-US" smtClean="0"/>
-              <a:t>5/14/18</a:t>
+              <a:t>11/21/18</a:t>
             </a:fld>
             <a:endParaRPr lang="en-GB"/>
           </a:p>
@@ -3589,7 +3686,7 @@
           <a:p>
             <a:fld id="{D735EA19-98D7-5F47-83EC-D97C4239F8D5}" type="datetimeFigureOut">
               <a:rPr lang="en-US" smtClean="0"/>
-              <a:t>5/14/18</a:t>
+              <a:t>11/21/18</a:t>
             </a:fld>
             <a:endParaRPr lang="en-GB"/>
           </a:p>
@@ -3841,7 +3938,7 @@
           <a:p>
             <a:fld id="{D735EA19-98D7-5F47-83EC-D97C4239F8D5}" type="datetimeFigureOut">
               <a:rPr lang="en-US" smtClean="0"/>
-              <a:t>5/14/18</a:t>
+              <a:t>11/21/18</a:t>
             </a:fld>
             <a:endParaRPr lang="en-GB"/>
           </a:p>
@@ -4052,7 +4149,7 @@
           <a:p>
             <a:fld id="{D735EA19-98D7-5F47-83EC-D97C4239F8D5}" type="datetimeFigureOut">
               <a:rPr lang="en-US" smtClean="0"/>
-              <a:t>5/14/18</a:t>
+              <a:t>11/21/18</a:t>
             </a:fld>
             <a:endParaRPr lang="en-GB"/>
           </a:p>
@@ -4522,6 +4619,109 @@
             <p:ph type="title"/>
           </p:nvPr>
         </p:nvSpPr>
+        <p:spPr/>
+        <p:txBody>
+          <a:bodyPr/>
+          <a:lstStyle/>
+          <a:p>
+            <a:r>
+              <a:rPr lang="en-GB" dirty="0"/>
+              <a:t>Precompiling OpenCL Kernels</a:t>
+            </a:r>
+          </a:p>
+        </p:txBody>
+      </p:sp>
+      <p:sp>
+        <p:nvSpPr>
+          <p:cNvPr id="3" name="Content Placeholder 2"/>
+          <p:cNvSpPr>
+            <a:spLocks noGrp="1"/>
+          </p:cNvSpPr>
+          <p:nvPr>
+            <p:ph idx="1"/>
+          </p:nvPr>
+        </p:nvSpPr>
+        <p:spPr/>
+        <p:txBody>
+          <a:bodyPr>
+            <a:normAutofit fontScale="92500" lnSpcReduction="20000"/>
+          </a:bodyPr>
+          <a:lstStyle/>
+          <a:p>
+            <a:pPr>
+              <a:lnSpc>
+                <a:spcPct val="110000"/>
+              </a:lnSpc>
+            </a:pPr>
+            <a:r>
+              <a:rPr lang="en-GB" dirty="0"/>
+              <a:t>These binaries are only valid on the devices for which they are compiled, so we potentially have to perform this compilation for every device we wish to target</a:t>
+            </a:r>
+          </a:p>
+          <a:p>
+            <a:pPr>
+              <a:lnSpc>
+                <a:spcPct val="110000"/>
+              </a:lnSpc>
+            </a:pPr>
+            <a:r>
+              <a:rPr lang="en-GB" dirty="0"/>
+              <a:t>A vendor might change the binary definition at any time, potentially breaking our shipped application</a:t>
+            </a:r>
+          </a:p>
+          <a:p>
+            <a:pPr>
+              <a:lnSpc>
+                <a:spcPct val="110000"/>
+              </a:lnSpc>
+            </a:pPr>
+            <a:r>
+              <a:rPr lang="en-GB" dirty="0"/>
+              <a:t>If a binary isn’t compatible with the target device, an error will be returned either when creating the program or building it</a:t>
+            </a:r>
+          </a:p>
+        </p:txBody>
+      </p:sp>
+    </p:spTree>
+    <p:extLst>
+      <p:ext uri="{BB962C8B-B14F-4D97-AF65-F5344CB8AC3E}">
+        <p14:creationId xmlns:p14="http://schemas.microsoft.com/office/powerpoint/2010/main" val="2237855219"/>
+      </p:ext>
+    </p:extLst>
+  </p:cSld>
+  <p:clrMapOvr>
+    <a:masterClrMapping/>
+  </p:clrMapOvr>
+</p:sld>
+</file>
+
+<file path=ppt/slides/slide11.xml><?xml version="1.0" encoding="utf-8"?>
+<p:sld xmlns:a="http://schemas.openxmlformats.org/drawingml/2006/main" xmlns:r="http://schemas.openxmlformats.org/officeDocument/2006/relationships" xmlns:p="http://schemas.openxmlformats.org/presentationml/2006/main">
+  <p:cSld>
+    <p:spTree>
+      <p:nvGrpSpPr>
+        <p:cNvPr id="1" name=""/>
+        <p:cNvGrpSpPr/>
+        <p:nvPr/>
+      </p:nvGrpSpPr>
+      <p:grpSpPr>
+        <a:xfrm>
+          <a:off x="0" y="0"/>
+          <a:ext cx="0" cy="0"/>
+          <a:chOff x="0" y="0"/>
+          <a:chExt cx="0" cy="0"/>
+        </a:xfrm>
+      </p:grpSpPr>
+      <p:sp>
+        <p:nvSpPr>
+          <p:cNvPr id="2" name="Title 1"/>
+          <p:cNvSpPr>
+            <a:spLocks noGrp="1"/>
+          </p:cNvSpPr>
+          <p:nvPr>
+            <p:ph type="title"/>
+          </p:nvPr>
+        </p:nvSpPr>
         <p:spPr>
           <a:xfrm>
             <a:off x="457200" y="274638"/>
@@ -4698,7 +4898,7 @@
 </p:sld>
 </file>
 
-<file path=ppt/slides/slide11.xml><?xml version="1.0" encoding="utf-8"?>
+<file path=ppt/slides/slide12.xml><?xml version="1.0" encoding="utf-8"?>
 <p:sld xmlns:a="http://schemas.openxmlformats.org/drawingml/2006/main" xmlns:r="http://schemas.openxmlformats.org/officeDocument/2006/relationships" xmlns:p="http://schemas.openxmlformats.org/presentationml/2006/main">
   <p:cSld>
     <p:spTree>
@@ -4969,7 +5169,7 @@
 </p:sld>
 </file>
 
-<file path=ppt/slides/slide12.xml><?xml version="1.0" encoding="utf-8"?>
+<file path=ppt/slides/slide13.xml><?xml version="1.0" encoding="utf-8"?>
 <p:sld xmlns:a="http://schemas.openxmlformats.org/drawingml/2006/main" xmlns:r="http://schemas.openxmlformats.org/officeDocument/2006/relationships" xmlns:p="http://schemas.openxmlformats.org/presentationml/2006/main">
   <p:cSld>
     <p:spTree>
@@ -5121,170 +5321,6 @@
 </p:sld>
 </file>
 
-<file path=ppt/slides/slide13.xml><?xml version="1.0" encoding="utf-8"?>
-<p:sld xmlns:a="http://schemas.openxmlformats.org/drawingml/2006/main" xmlns:r="http://schemas.openxmlformats.org/officeDocument/2006/relationships" xmlns:p="http://schemas.openxmlformats.org/presentationml/2006/main">
-  <p:cSld>
-    <p:spTree>
-      <p:nvGrpSpPr>
-        <p:cNvPr id="1" name=""/>
-        <p:cNvGrpSpPr/>
-        <p:nvPr/>
-      </p:nvGrpSpPr>
-      <p:grpSpPr>
-        <a:xfrm>
-          <a:off x="0" y="0"/>
-          <a:ext cx="0" cy="0"/>
-          <a:chOff x="0" y="0"/>
-          <a:chExt cx="0" cy="0"/>
-        </a:xfrm>
-      </p:grpSpPr>
-      <p:sp>
-        <p:nvSpPr>
-          <p:cNvPr id="2" name="Title 1"/>
-          <p:cNvSpPr>
-            <a:spLocks noGrp="1"/>
-          </p:cNvSpPr>
-          <p:nvPr>
-            <p:ph type="title"/>
-          </p:nvPr>
-        </p:nvSpPr>
-        <p:spPr/>
-        <p:txBody>
-          <a:bodyPr/>
-          <a:lstStyle/>
-          <a:p>
-            <a:r>
-              <a:rPr lang="en-GB" dirty="0"/>
-              <a:t>Generating Assembly Code</a:t>
-            </a:r>
-          </a:p>
-        </p:txBody>
-      </p:sp>
-      <p:sp>
-        <p:nvSpPr>
-          <p:cNvPr id="3" name="Content Placeholder 2"/>
-          <p:cNvSpPr>
-            <a:spLocks noGrp="1"/>
-          </p:cNvSpPr>
-          <p:nvPr>
-            <p:ph idx="1"/>
-          </p:nvPr>
-        </p:nvSpPr>
-        <p:spPr/>
-        <p:txBody>
-          <a:bodyPr>
-            <a:normAutofit fontScale="92500" lnSpcReduction="10000"/>
-          </a:bodyPr>
-          <a:lstStyle/>
-          <a:p>
-            <a:r>
-              <a:rPr lang="en-GB" dirty="0"/>
-              <a:t>It can be useful to inspect compiler output to see if the compiler is doing what you think it’s doing</a:t>
-            </a:r>
-          </a:p>
-          <a:p>
-            <a:r>
-              <a:rPr lang="en-GB" dirty="0"/>
-              <a:t>On NVIDIA platforms the ‘binary’ retrieved is actually PTX, their abstract assembly language</a:t>
-            </a:r>
-          </a:p>
-          <a:p>
-            <a:r>
-              <a:rPr lang="en-GB" dirty="0"/>
-              <a:t>On AMD platforms you can add </a:t>
-            </a:r>
-            <a:r>
-              <a:rPr lang="en-GB" b="1" dirty="0">
-                <a:solidFill>
-                  <a:srgbClr val="3366FF"/>
-                </a:solidFill>
-                <a:latin typeface="Courier New"/>
-                <a:cs typeface="Courier New"/>
-              </a:rPr>
-              <a:t>–save-temps</a:t>
-            </a:r>
-            <a:r>
-              <a:rPr lang="en-GB" dirty="0"/>
-              <a:t> to the build options to generate </a:t>
-            </a:r>
-            <a:r>
-              <a:rPr lang="en-GB" b="1" dirty="0">
-                <a:solidFill>
-                  <a:srgbClr val="3366FF"/>
-                </a:solidFill>
-                <a:latin typeface="Courier New"/>
-                <a:cs typeface="Courier New"/>
-              </a:rPr>
-              <a:t>.</a:t>
-            </a:r>
-            <a:r>
-              <a:rPr lang="en-GB" b="1" dirty="0" err="1">
-                <a:solidFill>
-                  <a:srgbClr val="3366FF"/>
-                </a:solidFill>
-                <a:latin typeface="Courier New"/>
-                <a:cs typeface="Courier New"/>
-              </a:rPr>
-              <a:t>il</a:t>
-            </a:r>
-            <a:r>
-              <a:rPr lang="en-GB" b="1" dirty="0">
-                <a:solidFill>
-                  <a:srgbClr val="3366FF"/>
-                </a:solidFill>
-              </a:rPr>
-              <a:t> </a:t>
-            </a:r>
-            <a:r>
-              <a:rPr lang="en-GB" dirty="0"/>
-              <a:t>and </a:t>
-            </a:r>
-            <a:r>
-              <a:rPr lang="en-GB" b="1" dirty="0">
-                <a:solidFill>
-                  <a:srgbClr val="3366FF"/>
-                </a:solidFill>
-                <a:latin typeface="Courier New"/>
-                <a:cs typeface="Courier New"/>
-              </a:rPr>
-              <a:t>.</a:t>
-            </a:r>
-            <a:r>
-              <a:rPr lang="en-GB" b="1" dirty="0" err="1">
-                <a:solidFill>
-                  <a:srgbClr val="3366FF"/>
-                </a:solidFill>
-                <a:latin typeface="Courier New"/>
-                <a:cs typeface="Courier New"/>
-              </a:rPr>
-              <a:t>isa</a:t>
-            </a:r>
-            <a:r>
-              <a:rPr lang="en-GB" dirty="0"/>
-              <a:t> files containing the intermediate representation and native assembly code</a:t>
-            </a:r>
-          </a:p>
-          <a:p>
-            <a:r>
-              <a:rPr lang="en-GB" dirty="0"/>
-              <a:t>Other vendors may provide an offline compiler which can generate LLVM/SPIR or assembly</a:t>
-            </a:r>
-          </a:p>
-        </p:txBody>
-      </p:sp>
-    </p:spTree>
-    <p:extLst>
-      <p:ext uri="{BB962C8B-B14F-4D97-AF65-F5344CB8AC3E}">
-        <p14:creationId xmlns:p14="http://schemas.microsoft.com/office/powerpoint/2010/main" val="1647771582"/>
-      </p:ext>
-    </p:extLst>
-  </p:cSld>
-  <p:clrMapOvr>
-    <a:masterClrMapping/>
-  </p:clrMapOvr>
-</p:sld>
-</file>
-
 <file path=ppt/slides/slide14.xml><?xml version="1.0" encoding="utf-8"?>
 <p:sld xmlns:a="http://schemas.openxmlformats.org/drawingml/2006/main" xmlns:r="http://schemas.openxmlformats.org/officeDocument/2006/relationships" xmlns:p="http://schemas.openxmlformats.org/presentationml/2006/main">
   <p:cSld>
@@ -5319,7 +5355,7 @@
           <a:p>
             <a:r>
               <a:rPr lang="en-GB" dirty="0"/>
-              <a:t>Kernel Introspection</a:t>
+              <a:t>Generating Assembly Code</a:t>
             </a:r>
           </a:p>
         </p:txBody>
@@ -5337,25 +5373,101 @@
         <p:spPr/>
         <p:txBody>
           <a:bodyPr>
-            <a:normAutofit/>
+            <a:normAutofit fontScale="92500" lnSpcReduction="20000"/>
           </a:bodyPr>
           <a:lstStyle/>
           <a:p>
             <a:r>
               <a:rPr lang="en-GB" dirty="0"/>
-              <a:t>A mechanism for automatically discovering and using new kernels, without having to write any new host code</a:t>
+              <a:t>It can be useful to inspect compiler output to see if the compiler is doing what you think it’s doing</a:t>
             </a:r>
           </a:p>
           <a:p>
             <a:r>
               <a:rPr lang="en-GB" dirty="0"/>
-              <a:t>This can make it much easier to add new kernels to an existing application</a:t>
+              <a:t>On NVIDIA platforms the ‘binary’ retrieved is actually PTX, their abstract assembly language</a:t>
             </a:r>
           </a:p>
           <a:p>
             <a:r>
               <a:rPr lang="en-GB" dirty="0"/>
-              <a:t>Provides a means for libraries and frameworks to accept additional kernels from third parties</a:t>
+              <a:t>On AMD platforms you can add </a:t>
+            </a:r>
+            <a:r>
+              <a:rPr lang="en-GB" b="1" dirty="0">
+                <a:solidFill>
+                  <a:srgbClr val="3366FF"/>
+                </a:solidFill>
+                <a:latin typeface="Courier New"/>
+                <a:cs typeface="Courier New"/>
+              </a:rPr>
+              <a:t>–save-temps</a:t>
+            </a:r>
+            <a:r>
+              <a:rPr lang="en-GB" dirty="0"/>
+              <a:t> to the build options to generate </a:t>
+            </a:r>
+            <a:r>
+              <a:rPr lang="en-GB" b="1" dirty="0">
+                <a:solidFill>
+                  <a:srgbClr val="3366FF"/>
+                </a:solidFill>
+                <a:latin typeface="Courier New"/>
+                <a:cs typeface="Courier New"/>
+              </a:rPr>
+              <a:t>.</a:t>
+            </a:r>
+            <a:r>
+              <a:rPr lang="en-GB" b="1" dirty="0" err="1">
+                <a:solidFill>
+                  <a:srgbClr val="3366FF"/>
+                </a:solidFill>
+                <a:latin typeface="Courier New"/>
+                <a:cs typeface="Courier New"/>
+              </a:rPr>
+              <a:t>il</a:t>
+            </a:r>
+            <a:r>
+              <a:rPr lang="en-GB" b="1" dirty="0">
+                <a:solidFill>
+                  <a:srgbClr val="3366FF"/>
+                </a:solidFill>
+              </a:rPr>
+              <a:t> </a:t>
+            </a:r>
+            <a:r>
+              <a:rPr lang="en-GB" dirty="0"/>
+              <a:t>and </a:t>
+            </a:r>
+            <a:r>
+              <a:rPr lang="en-GB" b="1" dirty="0">
+                <a:solidFill>
+                  <a:srgbClr val="3366FF"/>
+                </a:solidFill>
+                <a:latin typeface="Courier New"/>
+                <a:cs typeface="Courier New"/>
+              </a:rPr>
+              <a:t>.</a:t>
+            </a:r>
+            <a:r>
+              <a:rPr lang="en-GB" b="1" dirty="0" err="1">
+                <a:solidFill>
+                  <a:srgbClr val="3366FF"/>
+                </a:solidFill>
+                <a:latin typeface="Courier New"/>
+                <a:cs typeface="Courier New"/>
+              </a:rPr>
+              <a:t>isa</a:t>
+            </a:r>
+            <a:r>
+              <a:rPr lang="en-GB" dirty="0"/>
+              <a:t> files containing the intermediate representation and native assembly code</a:t>
+            </a:r>
+          </a:p>
+          <a:p>
+            <a:r>
+              <a:rPr lang="en-GB" dirty="0"/>
+              <a:t>Other vendors (such as Intel) may provide an offline compiler which can generate LLVM/SPIR or assembly</a:t>
             </a:r>
           </a:p>
         </p:txBody>
@@ -5363,7 +5475,7 @@
     </p:spTree>
     <p:extLst>
       <p:ext uri="{BB962C8B-B14F-4D97-AF65-F5344CB8AC3E}">
-        <p14:creationId xmlns:p14="http://schemas.microsoft.com/office/powerpoint/2010/main" val="1504436268"/>
+        <p14:creationId xmlns:p14="http://schemas.microsoft.com/office/powerpoint/2010/main" val="1647771582"/>
       </p:ext>
     </p:extLst>
   </p:cSld>
@@ -5422,6 +5534,94 @@
             <p:ph idx="1"/>
           </p:nvPr>
         </p:nvSpPr>
+        <p:spPr/>
+        <p:txBody>
+          <a:bodyPr>
+            <a:normAutofit/>
+          </a:bodyPr>
+          <a:lstStyle/>
+          <a:p>
+            <a:r>
+              <a:rPr lang="en-GB" dirty="0"/>
+              <a:t>A mechanism for automatically discovering and using new kernels, without having to write any new host code</a:t>
+            </a:r>
+          </a:p>
+          <a:p>
+            <a:r>
+              <a:rPr lang="en-GB" dirty="0"/>
+              <a:t>This can make it much easier to add new kernels to an existing application</a:t>
+            </a:r>
+          </a:p>
+          <a:p>
+            <a:r>
+              <a:rPr lang="en-GB" dirty="0"/>
+              <a:t>Provides a means for libraries and frameworks to accept additional kernels from third parties</a:t>
+            </a:r>
+          </a:p>
+        </p:txBody>
+      </p:sp>
+    </p:spTree>
+    <p:extLst>
+      <p:ext uri="{BB962C8B-B14F-4D97-AF65-F5344CB8AC3E}">
+        <p14:creationId xmlns:p14="http://schemas.microsoft.com/office/powerpoint/2010/main" val="1504436268"/>
+      </p:ext>
+    </p:extLst>
+  </p:cSld>
+  <p:clrMapOvr>
+    <a:masterClrMapping/>
+  </p:clrMapOvr>
+</p:sld>
+</file>
+
+<file path=ppt/slides/slide16.xml><?xml version="1.0" encoding="utf-8"?>
+<p:sld xmlns:a="http://schemas.openxmlformats.org/drawingml/2006/main" xmlns:r="http://schemas.openxmlformats.org/officeDocument/2006/relationships" xmlns:p="http://schemas.openxmlformats.org/presentationml/2006/main" show="0">
+  <p:cSld>
+    <p:spTree>
+      <p:nvGrpSpPr>
+        <p:cNvPr id="1" name=""/>
+        <p:cNvGrpSpPr/>
+        <p:nvPr/>
+      </p:nvGrpSpPr>
+      <p:grpSpPr>
+        <a:xfrm>
+          <a:off x="0" y="0"/>
+          <a:ext cx="0" cy="0"/>
+          <a:chOff x="0" y="0"/>
+          <a:chExt cx="0" cy="0"/>
+        </a:xfrm>
+      </p:grpSpPr>
+      <p:sp>
+        <p:nvSpPr>
+          <p:cNvPr id="2" name="Title 1"/>
+          <p:cNvSpPr>
+            <a:spLocks noGrp="1"/>
+          </p:cNvSpPr>
+          <p:nvPr>
+            <p:ph type="title"/>
+          </p:nvPr>
+        </p:nvSpPr>
+        <p:spPr/>
+        <p:txBody>
+          <a:bodyPr/>
+          <a:lstStyle/>
+          <a:p>
+            <a:r>
+              <a:rPr lang="en-GB" dirty="0"/>
+              <a:t>Kernel Introspection</a:t>
+            </a:r>
+          </a:p>
+        </p:txBody>
+      </p:sp>
+      <p:sp>
+        <p:nvSpPr>
+          <p:cNvPr id="3" name="Content Placeholder 2"/>
+          <p:cNvSpPr>
+            <a:spLocks noGrp="1"/>
+          </p:cNvSpPr>
+          <p:nvPr>
+            <p:ph idx="1"/>
+          </p:nvPr>
+        </p:nvSpPr>
         <p:spPr>
           <a:xfrm>
             <a:off x="457200" y="1600200"/>
@@ -5648,7 +5848,7 @@
 </p:sld>
 </file>
 
-<file path=ppt/slides/slide16.xml><?xml version="1.0" encoding="utf-8"?>
+<file path=ppt/slides/slide17.xml><?xml version="1.0" encoding="utf-8"?>
 <p:sld xmlns:a="http://schemas.openxmlformats.org/drawingml/2006/main" xmlns:r="http://schemas.openxmlformats.org/officeDocument/2006/relationships" xmlns:p="http://schemas.openxmlformats.org/presentationml/2006/main">
   <p:cSld>
     <p:spTree>
@@ -5677,6 +5877,261 @@
         </p:nvSpPr>
         <p:spPr/>
         <p:txBody>
+          <a:bodyPr/>
+          <a:lstStyle/>
+          <a:p>
+            <a:r>
+              <a:rPr lang="en-GB" dirty="0"/>
+              <a:t>Kernel Introspection</a:t>
+            </a:r>
+          </a:p>
+        </p:txBody>
+      </p:sp>
+      <p:sp>
+        <p:nvSpPr>
+          <p:cNvPr id="3" name="Content Placeholder 2"/>
+          <p:cNvSpPr>
+            <a:spLocks noGrp="1"/>
+          </p:cNvSpPr>
+          <p:nvPr>
+            <p:ph idx="1"/>
+          </p:nvPr>
+        </p:nvSpPr>
+        <p:spPr>
+          <a:xfrm>
+            <a:off x="457200" y="1600200"/>
+            <a:ext cx="8686800" cy="4525963"/>
+          </a:xfrm>
+        </p:spPr>
+        <p:txBody>
+          <a:bodyPr>
+            <a:normAutofit fontScale="77500" lnSpcReduction="20000"/>
+          </a:bodyPr>
+          <a:lstStyle/>
+          <a:p>
+            <a:r>
+              <a:rPr lang="en-GB" dirty="0"/>
+              <a:t>We can query a program object for the names of all the kernels that it contains:</a:t>
+            </a:r>
+          </a:p>
+          <a:p>
+            <a:pPr marL="400050" lvl="1" indent="0">
+              <a:buNone/>
+            </a:pPr>
+            <a:r>
+              <a:rPr lang="en-GB" b="1" dirty="0" err="1">
+                <a:solidFill>
+                  <a:schemeClr val="tx2">
+                    <a:lumMod val="75000"/>
+                  </a:schemeClr>
+                </a:solidFill>
+                <a:latin typeface="Courier New"/>
+                <a:cs typeface="Courier New"/>
+              </a:rPr>
+              <a:t>clGetProgramInfo</a:t>
+            </a:r>
+            <a:r>
+              <a:rPr lang="en-GB" b="1" dirty="0">
+                <a:latin typeface="Courier New"/>
+                <a:cs typeface="Courier New"/>
+              </a:rPr>
+              <a:t>(program, CL_PROGRAM_NUM_KERNELS, …);</a:t>
+            </a:r>
+          </a:p>
+          <a:p>
+            <a:pPr marL="400050" lvl="1" indent="0">
+              <a:buNone/>
+            </a:pPr>
+            <a:r>
+              <a:rPr lang="en-GB" b="1" dirty="0" err="1">
+                <a:solidFill>
+                  <a:schemeClr val="tx2">
+                    <a:lumMod val="75000"/>
+                  </a:schemeClr>
+                </a:solidFill>
+                <a:latin typeface="Courier New"/>
+                <a:cs typeface="Courier New"/>
+              </a:rPr>
+              <a:t>clGetProgramInfo</a:t>
+            </a:r>
+            <a:r>
+              <a:rPr lang="en-GB" b="1" dirty="0">
+                <a:latin typeface="Courier New"/>
+                <a:cs typeface="Courier New"/>
+              </a:rPr>
+              <a:t>(program, CL_PROGRAM_KERNEL_NAMES, …);</a:t>
+            </a:r>
+          </a:p>
+          <a:p>
+            <a:r>
+              <a:rPr lang="en-GB" dirty="0"/>
+              <a:t>We can also query information about kernel arguments (from OpenCL 1.2 onwards):</a:t>
+            </a:r>
+          </a:p>
+          <a:p>
+            <a:pPr marL="400050" lvl="1" indent="0">
+              <a:buNone/>
+            </a:pPr>
+            <a:r>
+              <a:rPr lang="en-GB" b="1" dirty="0" err="1">
+                <a:solidFill>
+                  <a:schemeClr val="tx2">
+                    <a:lumMod val="75000"/>
+                  </a:schemeClr>
+                </a:solidFill>
+                <a:latin typeface="Courier New"/>
+                <a:cs typeface="Courier New"/>
+              </a:rPr>
+              <a:t>clGetKernelInfo</a:t>
+            </a:r>
+            <a:r>
+              <a:rPr lang="en-GB" b="1" dirty="0">
+                <a:latin typeface="Courier New"/>
+                <a:cs typeface="Courier New"/>
+              </a:rPr>
+              <a:t>(kernel, CL_KERNEL_NUM_ARGS, …);</a:t>
+            </a:r>
+          </a:p>
+          <a:p>
+            <a:pPr marL="400050" lvl="1" indent="0">
+              <a:buNone/>
+            </a:pPr>
+            <a:r>
+              <a:rPr lang="en-GB" b="1" dirty="0" err="1">
+                <a:solidFill>
+                  <a:schemeClr val="tx2">
+                    <a:lumMod val="75000"/>
+                  </a:schemeClr>
+                </a:solidFill>
+                <a:latin typeface="Courier New"/>
+                <a:cs typeface="Courier New"/>
+              </a:rPr>
+              <a:t>clGetKernelInfo</a:t>
+            </a:r>
+            <a:r>
+              <a:rPr lang="en-GB" b="1" dirty="0">
+                <a:latin typeface="Courier New"/>
+                <a:cs typeface="Courier New"/>
+              </a:rPr>
+              <a:t>(kernel, CL_KERNEL_ARG_*, …);</a:t>
+            </a:r>
+          </a:p>
+          <a:p>
+            <a:pPr marL="0" indent="0">
+              <a:buNone/>
+            </a:pPr>
+            <a:r>
+              <a:rPr lang="en-GB" dirty="0">
+                <a:latin typeface="Trebuchet MS"/>
+                <a:cs typeface="Trebuchet MS"/>
+              </a:rPr>
+              <a:t>	(the program should be compiled using the</a:t>
+            </a:r>
+          </a:p>
+          <a:p>
+            <a:pPr marL="0" indent="0">
+              <a:buNone/>
+            </a:pPr>
+            <a:r>
+              <a:rPr lang="en-GB" b="1" dirty="0">
+                <a:solidFill>
+                  <a:srgbClr val="3366FF"/>
+                </a:solidFill>
+                <a:latin typeface="Courier New"/>
+                <a:cs typeface="Courier New"/>
+              </a:rPr>
+              <a:t>	-cl-kernel-</a:t>
+            </a:r>
+            <a:r>
+              <a:rPr lang="en-GB" b="1" dirty="0" err="1">
+                <a:solidFill>
+                  <a:srgbClr val="3366FF"/>
+                </a:solidFill>
+                <a:latin typeface="Courier New"/>
+                <a:cs typeface="Courier New"/>
+              </a:rPr>
+              <a:t>arg</a:t>
+            </a:r>
+            <a:r>
+              <a:rPr lang="en-GB" b="1" dirty="0">
+                <a:solidFill>
+                  <a:srgbClr val="3366FF"/>
+                </a:solidFill>
+                <a:latin typeface="Courier New"/>
+                <a:cs typeface="Courier New"/>
+              </a:rPr>
+              <a:t>-info </a:t>
+            </a:r>
+            <a:r>
+              <a:rPr lang="en-GB" dirty="0">
+                <a:solidFill>
+                  <a:srgbClr val="000000"/>
+                </a:solidFill>
+                <a:latin typeface="Trebuchet MS"/>
+                <a:cs typeface="Trebuchet MS"/>
+              </a:rPr>
+              <a:t>option</a:t>
+            </a:r>
+            <a:r>
+              <a:rPr lang="en-GB" dirty="0">
+                <a:solidFill>
+                  <a:srgbClr val="000000"/>
+                </a:solidFill>
+                <a:cs typeface="Courier New"/>
+              </a:rPr>
+              <a:t>)</a:t>
+            </a:r>
+            <a:endParaRPr lang="en-GB" dirty="0">
+              <a:solidFill>
+                <a:srgbClr val="3366FF"/>
+              </a:solidFill>
+              <a:cs typeface="Courier New"/>
+            </a:endParaRPr>
+          </a:p>
+        </p:txBody>
+      </p:sp>
+    </p:spTree>
+    <p:extLst>
+      <p:ext uri="{BB962C8B-B14F-4D97-AF65-F5344CB8AC3E}">
+        <p14:creationId xmlns:p14="http://schemas.microsoft.com/office/powerpoint/2010/main" val="3788509325"/>
+      </p:ext>
+    </p:extLst>
+  </p:cSld>
+  <p:clrMapOvr>
+    <a:masterClrMapping/>
+  </p:clrMapOvr>
+</p:sld>
+</file>
+
+<file path=ppt/slides/slide18.xml><?xml version="1.0" encoding="utf-8"?>
+<p:sld xmlns:a="http://schemas.openxmlformats.org/drawingml/2006/main" xmlns:r="http://schemas.openxmlformats.org/officeDocument/2006/relationships" xmlns:p="http://schemas.openxmlformats.org/presentationml/2006/main" show="0">
+  <p:cSld>
+    <p:spTree>
+      <p:nvGrpSpPr>
+        <p:cNvPr id="1" name=""/>
+        <p:cNvGrpSpPr/>
+        <p:nvPr/>
+      </p:nvGrpSpPr>
+      <p:grpSpPr>
+        <a:xfrm>
+          <a:off x="0" y="0"/>
+          <a:ext cx="0" cy="0"/>
+          <a:chOff x="0" y="0"/>
+          <a:chExt cx="0" cy="0"/>
+        </a:xfrm>
+      </p:grpSpPr>
+      <p:sp>
+        <p:nvSpPr>
+          <p:cNvPr id="2" name="Title 1"/>
+          <p:cNvSpPr>
+            <a:spLocks noGrp="1"/>
+          </p:cNvSpPr>
+          <p:nvPr>
+            <p:ph type="title"/>
+          </p:nvPr>
+        </p:nvSpPr>
+        <p:spPr/>
+        <p:txBody>
           <a:bodyPr>
             <a:normAutofit/>
           </a:bodyPr>
@@ -5796,7 +6251,342 @@
 </p:sld>
 </file>
 
-<file path=ppt/slides/slide17.xml><?xml version="1.0" encoding="utf-8"?>
+<file path=ppt/slides/slide19.xml><?xml version="1.0" encoding="utf-8"?>
+<p:sld xmlns:a="http://schemas.openxmlformats.org/drawingml/2006/main" xmlns:r="http://schemas.openxmlformats.org/officeDocument/2006/relationships" xmlns:p="http://schemas.openxmlformats.org/presentationml/2006/main">
+  <p:cSld>
+    <p:spTree>
+      <p:nvGrpSpPr>
+        <p:cNvPr id="1" name=""/>
+        <p:cNvGrpSpPr/>
+        <p:nvPr/>
+      </p:nvGrpSpPr>
+      <p:grpSpPr>
+        <a:xfrm>
+          <a:off x="0" y="0"/>
+          <a:ext cx="0" cy="0"/>
+          <a:chOff x="0" y="0"/>
+          <a:chExt cx="0" cy="0"/>
+        </a:xfrm>
+      </p:grpSpPr>
+      <p:sp>
+        <p:nvSpPr>
+          <p:cNvPr id="2" name="Title 1"/>
+          <p:cNvSpPr>
+            <a:spLocks noGrp="1"/>
+          </p:cNvSpPr>
+          <p:nvPr>
+            <p:ph type="title"/>
+          </p:nvPr>
+        </p:nvSpPr>
+        <p:spPr/>
+        <p:txBody>
+          <a:bodyPr>
+            <a:normAutofit/>
+          </a:bodyPr>
+          <a:lstStyle/>
+          <a:p>
+            <a:r>
+              <a:rPr lang="en-GB" dirty="0"/>
+              <a:t>Separate Compilation and Linking</a:t>
+            </a:r>
+          </a:p>
+        </p:txBody>
+      </p:sp>
+      <p:sp>
+        <p:nvSpPr>
+          <p:cNvPr id="3" name="Content Placeholder 2"/>
+          <p:cNvSpPr>
+            <a:spLocks noGrp="1"/>
+          </p:cNvSpPr>
+          <p:nvPr>
+            <p:ph idx="1"/>
+          </p:nvPr>
+        </p:nvSpPr>
+        <p:spPr/>
+        <p:txBody>
+          <a:bodyPr>
+            <a:normAutofit fontScale="92500" lnSpcReduction="10000"/>
+          </a:bodyPr>
+          <a:lstStyle/>
+          <a:p>
+            <a:r>
+              <a:rPr lang="en-GB" dirty="0"/>
+              <a:t>OpenCL 1.2 gives more control over the build process by adding two new functions:</a:t>
+            </a:r>
+          </a:p>
+          <a:p>
+            <a:pPr marL="400050" lvl="1" indent="0">
+              <a:buNone/>
+            </a:pPr>
+            <a:r>
+              <a:rPr lang="en-GB" b="1" dirty="0" err="1">
+                <a:solidFill>
+                  <a:schemeClr val="tx2">
+                    <a:lumMod val="75000"/>
+                  </a:schemeClr>
+                </a:solidFill>
+                <a:latin typeface="Courier New"/>
+                <a:cs typeface="Courier New"/>
+              </a:rPr>
+              <a:t>clCompileProgram</a:t>
+            </a:r>
+            <a:r>
+              <a:rPr lang="en-GB" b="1" dirty="0">
+                <a:latin typeface="Courier New"/>
+                <a:cs typeface="Courier New"/>
+              </a:rPr>
+              <a:t>(programs[0], …);</a:t>
+            </a:r>
+          </a:p>
+          <a:p>
+            <a:pPr marL="400050" lvl="1" indent="0">
+              <a:buNone/>
+            </a:pPr>
+            <a:r>
+              <a:rPr lang="en-GB" b="1" dirty="0">
+                <a:latin typeface="Courier New"/>
+                <a:cs typeface="Courier New"/>
+              </a:rPr>
+              <a:t>program = </a:t>
+            </a:r>
+            <a:r>
+              <a:rPr lang="en-GB" b="1" dirty="0" err="1">
+                <a:solidFill>
+                  <a:schemeClr val="tx2">
+                    <a:lumMod val="75000"/>
+                  </a:schemeClr>
+                </a:solidFill>
+                <a:latin typeface="Courier New"/>
+                <a:cs typeface="Courier New"/>
+              </a:rPr>
+              <a:t>clLinkProgram</a:t>
+            </a:r>
+            <a:r>
+              <a:rPr lang="en-GB" b="1" dirty="0">
+                <a:latin typeface="Courier New"/>
+                <a:cs typeface="Courier New"/>
+              </a:rPr>
+              <a:t>(context, …, programs);</a:t>
+            </a:r>
+            <a:endParaRPr lang="en-GB" b="1" dirty="0">
+              <a:solidFill>
+                <a:srgbClr val="3366FF"/>
+              </a:solidFill>
+              <a:latin typeface="Courier New"/>
+              <a:cs typeface="Courier New"/>
+            </a:endParaRPr>
+          </a:p>
+          <a:p>
+            <a:pPr marL="400050" lvl="1" indent="0">
+              <a:buNone/>
+            </a:pPr>
+            <a:r>
+              <a:rPr lang="en-GB" dirty="0"/>
+              <a:t>This enables the creation of libraries of compiled OpenCL functions, that can be linked to multiple program objects</a:t>
+            </a:r>
+          </a:p>
+          <a:p>
+            <a:r>
+              <a:rPr lang="en-GB" dirty="0"/>
+              <a:t>Can improve program build times, by allowing code shared across multiple programs to be extracted into a common library</a:t>
+            </a:r>
+          </a:p>
+        </p:txBody>
+      </p:sp>
+    </p:spTree>
+    <p:extLst>
+      <p:ext uri="{BB962C8B-B14F-4D97-AF65-F5344CB8AC3E}">
+        <p14:creationId xmlns:p14="http://schemas.microsoft.com/office/powerpoint/2010/main" val="3457248506"/>
+      </p:ext>
+    </p:extLst>
+  </p:cSld>
+  <p:clrMapOvr>
+    <a:masterClrMapping/>
+  </p:clrMapOvr>
+</p:sld>
+</file>
+
+<file path=ppt/slides/slide2.xml><?xml version="1.0" encoding="utf-8"?>
+<p:sld xmlns:a="http://schemas.openxmlformats.org/drawingml/2006/main" xmlns:r="http://schemas.openxmlformats.org/officeDocument/2006/relationships" xmlns:p="http://schemas.openxmlformats.org/presentationml/2006/main" show="0">
+  <p:cSld>
+    <p:spTree>
+      <p:nvGrpSpPr>
+        <p:cNvPr id="1" name=""/>
+        <p:cNvGrpSpPr/>
+        <p:nvPr/>
+      </p:nvGrpSpPr>
+      <p:grpSpPr>
+        <a:xfrm>
+          <a:off x="0" y="0"/>
+          <a:ext cx="0" cy="0"/>
+          <a:chOff x="0" y="0"/>
+          <a:chExt cx="0" cy="0"/>
+        </a:xfrm>
+      </p:grpSpPr>
+      <p:sp>
+        <p:nvSpPr>
+          <p:cNvPr id="2" name="Title 1"/>
+          <p:cNvSpPr>
+            <a:spLocks noGrp="1"/>
+          </p:cNvSpPr>
+          <p:nvPr>
+            <p:ph type="title"/>
+          </p:nvPr>
+        </p:nvSpPr>
+        <p:spPr/>
+        <p:txBody>
+          <a:bodyPr/>
+          <a:lstStyle/>
+          <a:p>
+            <a:r>
+              <a:rPr lang="en-GB" dirty="0" err="1"/>
+              <a:t>Stringifying</a:t>
+            </a:r>
+            <a:r>
+              <a:rPr lang="en-GB" dirty="0"/>
+              <a:t> Kernel Source</a:t>
+            </a:r>
+          </a:p>
+        </p:txBody>
+      </p:sp>
+      <p:sp>
+        <p:nvSpPr>
+          <p:cNvPr id="3" name="Content Placeholder 2"/>
+          <p:cNvSpPr>
+            <a:spLocks noGrp="1"/>
+          </p:cNvSpPr>
+          <p:nvPr>
+            <p:ph idx="1"/>
+          </p:nvPr>
+        </p:nvSpPr>
+        <p:spPr/>
+        <p:txBody>
+          <a:bodyPr>
+            <a:normAutofit lnSpcReduction="10000"/>
+          </a:bodyPr>
+          <a:lstStyle/>
+          <a:p>
+            <a:r>
+              <a:rPr lang="en-GB" dirty="0"/>
+              <a:t>We usually load our OpenCL kernel source code from file(s) at runtime</a:t>
+            </a:r>
+          </a:p>
+          <a:p>
+            <a:r>
+              <a:rPr lang="en-GB" dirty="0"/>
+              <a:t>We can make things easier by using a script to convert OpenCL source files into string literals defined inside header files</a:t>
+            </a:r>
+          </a:p>
+          <a:p>
+            <a:r>
+              <a:rPr lang="en-GB" dirty="0"/>
+              <a:t>This script then becomes part of the build process in the </a:t>
+            </a:r>
+            <a:r>
+              <a:rPr lang="en-GB" dirty="0" err="1"/>
+              <a:t>Makefile</a:t>
+            </a:r>
+            <a:r>
+              <a:rPr lang="en-GB" dirty="0"/>
+              <a:t>:</a:t>
+            </a:r>
+          </a:p>
+          <a:p>
+            <a:pPr marL="400050" lvl="1" indent="0">
+              <a:buNone/>
+            </a:pPr>
+            <a:r>
+              <a:rPr lang="en-GB" b="1" dirty="0" err="1">
+                <a:solidFill>
+                  <a:schemeClr val="accent3"/>
+                </a:solidFill>
+                <a:latin typeface="Courier New"/>
+                <a:cs typeface="Courier New"/>
+              </a:rPr>
+              <a:t>foo.h</a:t>
+            </a:r>
+            <a:r>
+              <a:rPr lang="en-GB" b="1" dirty="0">
+                <a:solidFill>
+                  <a:schemeClr val="accent3"/>
+                </a:solidFill>
+                <a:latin typeface="Courier New"/>
+                <a:cs typeface="Courier New"/>
+              </a:rPr>
+              <a:t>:</a:t>
+            </a:r>
+            <a:r>
+              <a:rPr lang="en-GB" b="1" dirty="0">
+                <a:latin typeface="Courier New"/>
+                <a:cs typeface="Courier New"/>
+              </a:rPr>
+              <a:t> </a:t>
+            </a:r>
+            <a:r>
+              <a:rPr lang="en-GB" b="1" dirty="0" err="1">
+                <a:latin typeface="Courier New"/>
+                <a:cs typeface="Courier New"/>
+              </a:rPr>
+              <a:t>foo.cl</a:t>
+            </a:r>
+            <a:endParaRPr lang="en-GB" b="1" dirty="0">
+              <a:latin typeface="Courier New"/>
+              <a:cs typeface="Courier New"/>
+            </a:endParaRPr>
+          </a:p>
+          <a:p>
+            <a:pPr marL="400050" lvl="1" indent="0">
+              <a:buNone/>
+            </a:pPr>
+            <a:r>
+              <a:rPr lang="en-GB" b="1" dirty="0">
+                <a:latin typeface="Courier New"/>
+                <a:cs typeface="Courier New"/>
+              </a:rPr>
+              <a:t>    ./</a:t>
+            </a:r>
+            <a:r>
+              <a:rPr lang="en-GB" b="1" dirty="0" err="1">
+                <a:latin typeface="Courier New"/>
+                <a:cs typeface="Courier New"/>
+              </a:rPr>
+              <a:t>stringify_ocl</a:t>
+            </a:r>
+            <a:r>
+              <a:rPr lang="en-GB" b="1" dirty="0">
+                <a:latin typeface="Courier New"/>
+                <a:cs typeface="Courier New"/>
+              </a:rPr>
+              <a:t> </a:t>
+            </a:r>
+            <a:r>
+              <a:rPr lang="en-GB" b="1" dirty="0" err="1">
+                <a:latin typeface="Courier New"/>
+                <a:cs typeface="Courier New"/>
+              </a:rPr>
+              <a:t>foo.cl</a:t>
+            </a:r>
+            <a:endParaRPr lang="en-GB" b="1" dirty="0">
+              <a:latin typeface="Courier New"/>
+              <a:cs typeface="Courier New"/>
+            </a:endParaRPr>
+          </a:p>
+        </p:txBody>
+      </p:sp>
+    </p:spTree>
+    <p:extLst>
+      <p:ext uri="{BB962C8B-B14F-4D97-AF65-F5344CB8AC3E}">
+        <p14:creationId xmlns:p14="http://schemas.microsoft.com/office/powerpoint/2010/main" val="1274509593"/>
+      </p:ext>
+    </p:extLst>
+  </p:cSld>
+  <p:clrMapOvr>
+    <a:masterClrMapping/>
+  </p:clrMapOvr>
+</p:sld>
+</file>
+
+<file path=ppt/slides/slide20.xml><?xml version="1.0" encoding="utf-8"?>
 <p:sld xmlns:a="http://schemas.openxmlformats.org/drawingml/2006/main" xmlns:r="http://schemas.openxmlformats.org/officeDocument/2006/relationships" xmlns:p="http://schemas.openxmlformats.org/presentationml/2006/main">
   <p:cSld>
     <p:spTree>
@@ -6277,7 +7067,7 @@
 </p:sld>
 </file>
 
-<file path=ppt/slides/slide18.xml><?xml version="1.0" encoding="utf-8"?>
+<file path=ppt/slides/slide21.xml><?xml version="1.0" encoding="utf-8"?>
 <p:sld xmlns:a="http://schemas.openxmlformats.org/drawingml/2006/main" xmlns:r="http://schemas.openxmlformats.org/officeDocument/2006/relationships" xmlns:p="http://schemas.openxmlformats.org/presentationml/2006/main">
   <p:cSld>
     <p:spTree>
@@ -6515,7 +7305,7 @@
 </p:sld>
 </file>
 
-<file path=ppt/slides/slide19.xml><?xml version="1.0" encoding="utf-8"?>
+<file path=ppt/slides/slide22.xml><?xml version="1.0" encoding="utf-8"?>
 <p:sld xmlns:a="http://schemas.openxmlformats.org/drawingml/2006/main" xmlns:r="http://schemas.openxmlformats.org/officeDocument/2006/relationships" xmlns:p="http://schemas.openxmlformats.org/presentationml/2006/main">
   <p:cSld>
     <p:spTree>
@@ -6698,187 +7488,7 @@
 </p:sld>
 </file>
 
-<file path=ppt/slides/slide2.xml><?xml version="1.0" encoding="utf-8"?>
-<p:sld xmlns:a="http://schemas.openxmlformats.org/drawingml/2006/main" xmlns:r="http://schemas.openxmlformats.org/officeDocument/2006/relationships" xmlns:p="http://schemas.openxmlformats.org/presentationml/2006/main" show="0">
-  <p:cSld>
-    <p:spTree>
-      <p:nvGrpSpPr>
-        <p:cNvPr id="1" name=""/>
-        <p:cNvGrpSpPr/>
-        <p:nvPr/>
-      </p:nvGrpSpPr>
-      <p:grpSpPr>
-        <a:xfrm>
-          <a:off x="0" y="0"/>
-          <a:ext cx="0" cy="0"/>
-          <a:chOff x="0" y="0"/>
-          <a:chExt cx="0" cy="0"/>
-        </a:xfrm>
-      </p:grpSpPr>
-      <p:sp>
-        <p:nvSpPr>
-          <p:cNvPr id="2" name="Title 1"/>
-          <p:cNvSpPr>
-            <a:spLocks noGrp="1"/>
-          </p:cNvSpPr>
-          <p:nvPr>
-            <p:ph type="title"/>
-          </p:nvPr>
-        </p:nvSpPr>
-        <p:spPr/>
-        <p:txBody>
-          <a:bodyPr/>
-          <a:lstStyle/>
-          <a:p>
-            <a:r>
-              <a:rPr lang="en-GB" dirty="0" err="1"/>
-              <a:t>Stringifying</a:t>
-            </a:r>
-            <a:r>
-              <a:rPr lang="en-GB" dirty="0"/>
-              <a:t> Kernel Source</a:t>
-            </a:r>
-          </a:p>
-        </p:txBody>
-      </p:sp>
-      <p:sp>
-        <p:nvSpPr>
-          <p:cNvPr id="3" name="Content Placeholder 2"/>
-          <p:cNvSpPr>
-            <a:spLocks noGrp="1"/>
-          </p:cNvSpPr>
-          <p:nvPr>
-            <p:ph idx="1"/>
-          </p:nvPr>
-        </p:nvSpPr>
-        <p:spPr/>
-        <p:txBody>
-          <a:bodyPr>
-            <a:normAutofit lnSpcReduction="10000"/>
-          </a:bodyPr>
-          <a:lstStyle/>
-          <a:p>
-            <a:r>
-              <a:rPr lang="en-GB" dirty="0"/>
-              <a:t>We usually load our OpenCL kernel source code from file(s) at runtime</a:t>
-            </a:r>
-          </a:p>
-          <a:p>
-            <a:r>
-              <a:rPr lang="en-GB" dirty="0"/>
-              <a:t>We can make things easier by using a script to convert OpenCL source files into string literals defined inside header files</a:t>
-            </a:r>
-          </a:p>
-          <a:p>
-            <a:r>
-              <a:rPr lang="en-GB" dirty="0"/>
-              <a:t>This script then becomes part of the build process in the </a:t>
-            </a:r>
-            <a:r>
-              <a:rPr lang="en-GB" dirty="0" err="1"/>
-              <a:t>Makefile</a:t>
-            </a:r>
-            <a:r>
-              <a:rPr lang="en-GB" dirty="0"/>
-              <a:t>:</a:t>
-            </a:r>
-          </a:p>
-          <a:p>
-            <a:pPr marL="400050" lvl="1" indent="0">
-              <a:buNone/>
-            </a:pPr>
-            <a:r>
-              <a:rPr lang="en-GB" b="1" dirty="0" err="1">
-                <a:solidFill>
-                  <a:schemeClr val="accent3"/>
-                </a:solidFill>
-                <a:latin typeface="Courier New"/>
-                <a:cs typeface="Courier New"/>
-              </a:rPr>
-              <a:t>foo.h</a:t>
-            </a:r>
-            <a:r>
-              <a:rPr lang="en-GB" b="1" dirty="0">
-                <a:solidFill>
-                  <a:schemeClr val="accent3"/>
-                </a:solidFill>
-                <a:latin typeface="Courier New"/>
-                <a:cs typeface="Courier New"/>
-              </a:rPr>
-              <a:t>:</a:t>
-            </a:r>
-            <a:r>
-              <a:rPr lang="en-GB" b="1" dirty="0">
-                <a:latin typeface="Courier New"/>
-                <a:cs typeface="Courier New"/>
-              </a:rPr>
-              <a:t> </a:t>
-            </a:r>
-            <a:r>
-              <a:rPr lang="en-GB" b="1" dirty="0" err="1">
-                <a:latin typeface="Courier New"/>
-                <a:cs typeface="Courier New"/>
-              </a:rPr>
-              <a:t>foo.cl</a:t>
-            </a:r>
-            <a:endParaRPr lang="en-GB" b="1" dirty="0">
-              <a:latin typeface="Courier New"/>
-              <a:cs typeface="Courier New"/>
-            </a:endParaRPr>
-          </a:p>
-          <a:p>
-            <a:pPr marL="400050" lvl="1" indent="0">
-              <a:buNone/>
-            </a:pPr>
-            <a:r>
-              <a:rPr lang="en-GB" b="1" dirty="0">
-                <a:latin typeface="Courier New"/>
-                <a:cs typeface="Courier New"/>
-              </a:rPr>
-              <a:t>    ./</a:t>
-            </a:r>
-            <a:r>
-              <a:rPr lang="en-GB" b="1" dirty="0" err="1">
-                <a:latin typeface="Courier New"/>
-                <a:cs typeface="Courier New"/>
-              </a:rPr>
-              <a:t>stringify_ocl</a:t>
-            </a:r>
-            <a:r>
-              <a:rPr lang="en-GB" b="1" dirty="0">
-                <a:latin typeface="Courier New"/>
-                <a:cs typeface="Courier New"/>
-              </a:rPr>
-              <a:t> </a:t>
-            </a:r>
-            <a:r>
-              <a:rPr lang="en-GB" b="1" dirty="0" err="1">
-                <a:latin typeface="Courier New"/>
-                <a:cs typeface="Courier New"/>
-              </a:rPr>
-              <a:t>foo.cl</a:t>
-            </a:r>
-            <a:endParaRPr lang="en-GB" b="1" dirty="0">
-              <a:latin typeface="Courier New"/>
-              <a:cs typeface="Courier New"/>
-            </a:endParaRPr>
-          </a:p>
-        </p:txBody>
-      </p:sp>
-    </p:spTree>
-    <p:extLst>
-      <p:ext uri="{BB962C8B-B14F-4D97-AF65-F5344CB8AC3E}">
-        <p14:creationId xmlns:p14="http://schemas.microsoft.com/office/powerpoint/2010/main" val="1274509593"/>
-      </p:ext>
-    </p:extLst>
-  </p:cSld>
-  <p:clrMapOvr>
-    <a:masterClrMapping/>
-  </p:clrMapOvr>
-</p:sld>
-</file>
-
-<file path=ppt/slides/slide20.xml><?xml version="1.0" encoding="utf-8"?>
+<file path=ppt/slides/slide23.xml><?xml version="1.0" encoding="utf-8"?>
 <p:sld xmlns:a="http://schemas.openxmlformats.org/drawingml/2006/main" xmlns:r="http://schemas.openxmlformats.org/officeDocument/2006/relationships" xmlns:p="http://schemas.openxmlformats.org/presentationml/2006/main">
   <p:cSld>
     <p:spTree>
@@ -7054,8 +7664,8 @@
 </p:sld>
 </file>
 
-<file path=ppt/slides/slide21.xml><?xml version="1.0" encoding="utf-8"?>
-<p:sld xmlns:a="http://schemas.openxmlformats.org/drawingml/2006/main" xmlns:r="http://schemas.openxmlformats.org/officeDocument/2006/relationships" xmlns:p="http://schemas.openxmlformats.org/presentationml/2006/main">
+<file path=ppt/slides/slide24.xml><?xml version="1.0" encoding="utf-8"?>
+<p:sld xmlns:a="http://schemas.openxmlformats.org/drawingml/2006/main" xmlns:r="http://schemas.openxmlformats.org/officeDocument/2006/relationships" xmlns:p="http://schemas.openxmlformats.org/presentationml/2006/main" show="0">
   <p:cSld>
     <p:spTree>
       <p:nvGrpSpPr>
@@ -8876,7 +9486,7 @@
 </p:sld>
 </file>
 
-<file path=ppt/slides/slide22.xml><?xml version="1.0" encoding="utf-8"?>
+<file path=ppt/slides/slide25.xml><?xml version="1.0" encoding="utf-8"?>
 <p:sld xmlns:a="http://schemas.openxmlformats.org/drawingml/2006/main" xmlns:r="http://schemas.openxmlformats.org/officeDocument/2006/relationships" xmlns:p="http://schemas.openxmlformats.org/presentationml/2006/main">
   <p:cSld>
     <p:spTree>
@@ -8905,6 +9515,1507 @@
         </p:nvSpPr>
         <p:spPr/>
         <p:txBody>
+          <a:bodyPr>
+            <a:normAutofit fontScale="90000"/>
+          </a:bodyPr>
+          <a:lstStyle/>
+          <a:p>
+            <a:r>
+              <a:rPr lang="en-GB" dirty="0"/>
+              <a:t>Example: Multiply a vector by a constant value</a:t>
+            </a:r>
+          </a:p>
+        </p:txBody>
+      </p:sp>
+      <p:sp>
+        <p:nvSpPr>
+          <p:cNvPr id="3" name="Text Placeholder 2"/>
+          <p:cNvSpPr>
+            <a:spLocks noGrp="1"/>
+          </p:cNvSpPr>
+          <p:nvPr>
+            <p:ph type="body" idx="1"/>
+          </p:nvPr>
+        </p:nvSpPr>
+        <p:spPr/>
+        <p:txBody>
+          <a:bodyPr>
+            <a:normAutofit fontScale="92500"/>
+          </a:bodyPr>
+          <a:lstStyle/>
+          <a:p>
+            <a:r>
+              <a:rPr lang="en-GB" dirty="0"/>
+              <a:t>Passing the value as an argument</a:t>
+            </a:r>
+          </a:p>
+        </p:txBody>
+      </p:sp>
+      <p:sp>
+        <p:nvSpPr>
+          <p:cNvPr id="4" name="Content Placeholder 3"/>
+          <p:cNvSpPr>
+            <a:spLocks noGrp="1"/>
+          </p:cNvSpPr>
+          <p:nvPr>
+            <p:ph sz="half" idx="2"/>
+          </p:nvPr>
+        </p:nvSpPr>
+        <p:spPr/>
+        <p:txBody>
+          <a:bodyPr>
+            <a:normAutofit fontScale="55000" lnSpcReduction="20000"/>
+          </a:bodyPr>
+          <a:lstStyle/>
+          <a:p>
+            <a:pPr marL="0" indent="0">
+              <a:buNone/>
+            </a:pPr>
+            <a:r>
+              <a:rPr lang="en-GB" b="1" dirty="0">
+                <a:solidFill>
+                  <a:schemeClr val="accent2"/>
+                </a:solidFill>
+                <a:latin typeface="Courier New"/>
+                <a:cs typeface="Courier New"/>
+              </a:rPr>
+              <a:t>kernel</a:t>
+            </a:r>
+            <a:r>
+              <a:rPr lang="en-GB" b="1" dirty="0">
+                <a:latin typeface="Courier New"/>
+                <a:cs typeface="Courier New"/>
+              </a:rPr>
+              <a:t> </a:t>
+            </a:r>
+            <a:r>
+              <a:rPr lang="en-GB" b="1" i="1" dirty="0">
+                <a:solidFill>
+                  <a:srgbClr val="3366FF"/>
+                </a:solidFill>
+                <a:latin typeface="Courier New"/>
+                <a:cs typeface="Courier New"/>
+              </a:rPr>
+              <a:t>void</a:t>
+            </a:r>
+            <a:r>
+              <a:rPr lang="en-GB" b="1" dirty="0">
+                <a:latin typeface="Courier New"/>
+                <a:cs typeface="Courier New"/>
+              </a:rPr>
+              <a:t> </a:t>
+            </a:r>
+            <a:r>
+              <a:rPr lang="en-GB" b="1" dirty="0" err="1">
+                <a:solidFill>
+                  <a:schemeClr val="accent3"/>
+                </a:solidFill>
+                <a:latin typeface="Courier New"/>
+                <a:cs typeface="Courier New"/>
+              </a:rPr>
+              <a:t>vecmul</a:t>
+            </a:r>
+            <a:r>
+              <a:rPr lang="en-GB" b="1" dirty="0">
+                <a:latin typeface="Courier New"/>
+                <a:cs typeface="Courier New"/>
+              </a:rPr>
+              <a:t>(</a:t>
+            </a:r>
+          </a:p>
+          <a:p>
+            <a:pPr marL="0" indent="0">
+              <a:buNone/>
+            </a:pPr>
+            <a:r>
+              <a:rPr lang="en-GB" b="1" dirty="0">
+                <a:latin typeface="Courier New"/>
+                <a:cs typeface="Courier New"/>
+              </a:rPr>
+              <a:t>  </a:t>
+            </a:r>
+            <a:r>
+              <a:rPr lang="en-GB" b="1" dirty="0">
+                <a:solidFill>
+                  <a:srgbClr val="C0504D"/>
+                </a:solidFill>
+                <a:latin typeface="Courier New"/>
+                <a:cs typeface="Courier New"/>
+              </a:rPr>
+              <a:t>global</a:t>
+            </a:r>
+            <a:r>
+              <a:rPr lang="en-GB" b="1" dirty="0">
+                <a:latin typeface="Courier New"/>
+                <a:cs typeface="Courier New"/>
+              </a:rPr>
+              <a:t> </a:t>
+            </a:r>
+            <a:r>
+              <a:rPr lang="en-GB" b="1" i="1" dirty="0">
+                <a:solidFill>
+                  <a:srgbClr val="3366FF"/>
+                </a:solidFill>
+                <a:latin typeface="Courier New"/>
+                <a:cs typeface="Courier New"/>
+              </a:rPr>
+              <a:t>float</a:t>
+            </a:r>
+            <a:r>
+              <a:rPr lang="en-GB" b="1" dirty="0">
+                <a:latin typeface="Courier New"/>
+                <a:cs typeface="Courier New"/>
+              </a:rPr>
+              <a:t> *data,</a:t>
+            </a:r>
+          </a:p>
+          <a:p>
+            <a:pPr marL="0" indent="0">
+              <a:buNone/>
+            </a:pPr>
+            <a:r>
+              <a:rPr lang="en-GB" b="1" dirty="0">
+                <a:latin typeface="Courier New"/>
+                <a:cs typeface="Courier New"/>
+              </a:rPr>
+              <a:t>  </a:t>
+            </a:r>
+            <a:r>
+              <a:rPr lang="en-GB" b="1" dirty="0" err="1">
+                <a:solidFill>
+                  <a:srgbClr val="C0504D"/>
+                </a:solidFill>
+                <a:latin typeface="Courier New"/>
+                <a:cs typeface="Courier New"/>
+              </a:rPr>
+              <a:t>const</a:t>
+            </a:r>
+            <a:r>
+              <a:rPr lang="en-GB" b="1" dirty="0">
+                <a:latin typeface="Courier New"/>
+                <a:cs typeface="Courier New"/>
+              </a:rPr>
+              <a:t>  </a:t>
+            </a:r>
+            <a:r>
+              <a:rPr lang="en-GB" b="1" i="1" dirty="0">
+                <a:solidFill>
+                  <a:srgbClr val="3366FF"/>
+                </a:solidFill>
+                <a:latin typeface="Courier New"/>
+                <a:cs typeface="Courier New"/>
+              </a:rPr>
+              <a:t>float</a:t>
+            </a:r>
+            <a:r>
+              <a:rPr lang="en-GB" b="1" i="1" dirty="0">
+                <a:latin typeface="Courier New"/>
+                <a:cs typeface="Courier New"/>
+              </a:rPr>
+              <a:t>  </a:t>
+            </a:r>
+            <a:r>
+              <a:rPr lang="en-GB" b="1" dirty="0">
+                <a:latin typeface="Courier New"/>
+                <a:cs typeface="Courier New"/>
+              </a:rPr>
+              <a:t>factor)</a:t>
+            </a:r>
+          </a:p>
+          <a:p>
+            <a:pPr marL="0" indent="0">
+              <a:buNone/>
+            </a:pPr>
+            <a:r>
+              <a:rPr lang="en-GB" b="1" dirty="0">
+                <a:latin typeface="Courier New"/>
+                <a:cs typeface="Courier New"/>
+              </a:rPr>
+              <a:t>{</a:t>
+            </a:r>
+          </a:p>
+          <a:p>
+            <a:pPr marL="0" indent="0">
+              <a:buNone/>
+            </a:pPr>
+            <a:r>
+              <a:rPr lang="en-GB" b="1" dirty="0">
+                <a:latin typeface="Courier New"/>
+                <a:cs typeface="Courier New"/>
+              </a:rPr>
+              <a:t>  </a:t>
+            </a:r>
+            <a:r>
+              <a:rPr lang="en-GB" b="1" i="1" dirty="0" err="1">
+                <a:solidFill>
+                  <a:srgbClr val="3366FF"/>
+                </a:solidFill>
+                <a:latin typeface="Courier New"/>
+                <a:cs typeface="Courier New"/>
+              </a:rPr>
+              <a:t>int</a:t>
+            </a:r>
+            <a:r>
+              <a:rPr lang="en-GB" b="1" dirty="0">
+                <a:latin typeface="Courier New"/>
+                <a:cs typeface="Courier New"/>
+              </a:rPr>
+              <a:t> </a:t>
+            </a:r>
+            <a:r>
+              <a:rPr lang="en-GB" b="1" dirty="0" err="1">
+                <a:latin typeface="Courier New"/>
+                <a:cs typeface="Courier New"/>
+              </a:rPr>
+              <a:t>i</a:t>
+            </a:r>
+            <a:r>
+              <a:rPr lang="en-GB" b="1" dirty="0">
+                <a:latin typeface="Courier New"/>
+                <a:cs typeface="Courier New"/>
+              </a:rPr>
+              <a:t> = </a:t>
+            </a:r>
+            <a:r>
+              <a:rPr lang="en-GB" b="1" dirty="0" err="1">
+                <a:solidFill>
+                  <a:srgbClr val="3366FF"/>
+                </a:solidFill>
+                <a:latin typeface="Courier New"/>
+                <a:cs typeface="Courier New"/>
+              </a:rPr>
+              <a:t>get_global_id</a:t>
+            </a:r>
+            <a:r>
+              <a:rPr lang="en-GB" b="1" dirty="0">
+                <a:latin typeface="Courier New"/>
+                <a:cs typeface="Courier New"/>
+              </a:rPr>
+              <a:t>(</a:t>
+            </a:r>
+            <a:r>
+              <a:rPr lang="en-GB" b="1" dirty="0">
+                <a:solidFill>
+                  <a:srgbClr val="FF00FF"/>
+                </a:solidFill>
+                <a:latin typeface="Courier New"/>
+                <a:cs typeface="Courier New"/>
+              </a:rPr>
+              <a:t>0</a:t>
+            </a:r>
+            <a:r>
+              <a:rPr lang="en-GB" b="1" dirty="0">
+                <a:latin typeface="Courier New"/>
+                <a:cs typeface="Courier New"/>
+              </a:rPr>
+              <a:t>);</a:t>
+            </a:r>
+          </a:p>
+          <a:p>
+            <a:pPr marL="0" indent="0">
+              <a:buNone/>
+            </a:pPr>
+            <a:r>
+              <a:rPr lang="en-GB" b="1" dirty="0">
+                <a:latin typeface="Courier New"/>
+                <a:cs typeface="Courier New"/>
+              </a:rPr>
+              <a:t>  data[</a:t>
+            </a:r>
+            <a:r>
+              <a:rPr lang="en-GB" b="1" dirty="0" err="1">
+                <a:latin typeface="Courier New"/>
+                <a:cs typeface="Courier New"/>
+              </a:rPr>
+              <a:t>i</a:t>
+            </a:r>
+            <a:r>
+              <a:rPr lang="en-GB" b="1" dirty="0">
+                <a:latin typeface="Courier New"/>
+                <a:cs typeface="Courier New"/>
+              </a:rPr>
+              <a:t>] *= factor;</a:t>
+            </a:r>
+            <a:br>
+              <a:rPr lang="en-GB" b="1" dirty="0">
+                <a:latin typeface="Courier New"/>
+                <a:cs typeface="Courier New"/>
+              </a:rPr>
+            </a:br>
+            <a:r>
+              <a:rPr lang="en-GB" b="1" dirty="0">
+                <a:latin typeface="Courier New"/>
+                <a:cs typeface="Courier New"/>
+              </a:rPr>
+              <a:t>}</a:t>
+            </a:r>
+          </a:p>
+          <a:p>
+            <a:pPr marL="0" indent="0">
+              <a:buNone/>
+            </a:pPr>
+            <a:endParaRPr lang="en-GB" dirty="0">
+              <a:cs typeface="Trebuchet MS"/>
+            </a:endParaRPr>
+          </a:p>
+          <a:p>
+            <a:pPr marL="0" indent="0">
+              <a:buNone/>
+            </a:pPr>
+            <a:endParaRPr lang="en-GB" dirty="0">
+              <a:cs typeface="Trebuchet MS"/>
+            </a:endParaRPr>
+          </a:p>
+          <a:p>
+            <a:pPr marL="0" indent="0">
+              <a:buNone/>
+            </a:pPr>
+            <a:endParaRPr lang="en-GB" dirty="0">
+              <a:cs typeface="Trebuchet MS"/>
+            </a:endParaRPr>
+          </a:p>
+          <a:p>
+            <a:pPr marL="0" indent="0">
+              <a:buNone/>
+            </a:pPr>
+            <a:endParaRPr lang="en-GB" b="1" dirty="0">
+              <a:latin typeface="Courier New"/>
+              <a:cs typeface="Courier New"/>
+            </a:endParaRPr>
+          </a:p>
+          <a:p>
+            <a:pPr marL="0" indent="0">
+              <a:buNone/>
+            </a:pPr>
+            <a:endParaRPr lang="en-GB" b="1" dirty="0">
+              <a:latin typeface="Courier New"/>
+              <a:cs typeface="Courier New"/>
+            </a:endParaRPr>
+          </a:p>
+          <a:p>
+            <a:pPr marL="0" indent="0">
+              <a:buNone/>
+            </a:pPr>
+            <a:endParaRPr lang="en-GB" b="1" dirty="0">
+              <a:latin typeface="Courier New"/>
+              <a:cs typeface="Courier New"/>
+            </a:endParaRPr>
+          </a:p>
+          <a:p>
+            <a:pPr marL="0" indent="0">
+              <a:buNone/>
+            </a:pPr>
+            <a:endParaRPr lang="en-GB" b="1" dirty="0">
+              <a:latin typeface="Courier New"/>
+              <a:cs typeface="Courier New"/>
+            </a:endParaRPr>
+          </a:p>
+          <a:p>
+            <a:pPr marL="0" indent="0">
+              <a:buNone/>
+            </a:pPr>
+            <a:endParaRPr lang="en-GB" b="1" dirty="0">
+              <a:latin typeface="Courier New"/>
+              <a:cs typeface="Courier New"/>
+            </a:endParaRPr>
+          </a:p>
+          <a:p>
+            <a:pPr marL="0" indent="0">
+              <a:buNone/>
+            </a:pPr>
+            <a:endParaRPr lang="en-GB" b="1" dirty="0">
+              <a:latin typeface="Courier New"/>
+              <a:cs typeface="Courier New"/>
+            </a:endParaRPr>
+          </a:p>
+          <a:p>
+            <a:pPr marL="0" indent="0">
+              <a:buNone/>
+            </a:pPr>
+            <a:endParaRPr lang="en-GB" b="1" dirty="0">
+              <a:latin typeface="Courier New"/>
+              <a:cs typeface="Courier New"/>
+            </a:endParaRPr>
+          </a:p>
+          <a:p>
+            <a:pPr marL="0" indent="0">
+              <a:buNone/>
+            </a:pPr>
+            <a:r>
+              <a:rPr lang="en-GB" b="1" dirty="0" err="1">
+                <a:latin typeface="Courier New"/>
+                <a:cs typeface="Courier New"/>
+              </a:rPr>
+              <a:t>clBuildProgram</a:t>
+            </a:r>
+            <a:r>
+              <a:rPr lang="en-GB" b="1" dirty="0">
+                <a:latin typeface="Courier New"/>
+                <a:cs typeface="Courier New"/>
+              </a:rPr>
+              <a:t>(program, 0, NULL, NULL, NULL, NULL);</a:t>
+            </a:r>
+          </a:p>
+          <a:p>
+            <a:pPr marL="0" indent="0">
+              <a:buNone/>
+            </a:pPr>
+            <a:endParaRPr lang="en-GB" b="1" dirty="0">
+              <a:latin typeface="Courier New"/>
+              <a:cs typeface="Courier New"/>
+            </a:endParaRPr>
+          </a:p>
+        </p:txBody>
+      </p:sp>
+      <p:sp>
+        <p:nvSpPr>
+          <p:cNvPr id="5" name="Text Placeholder 4"/>
+          <p:cNvSpPr>
+            <a:spLocks noGrp="1"/>
+          </p:cNvSpPr>
+          <p:nvPr>
+            <p:ph type="body" sz="quarter" idx="3"/>
+          </p:nvPr>
+        </p:nvSpPr>
+        <p:spPr/>
+        <p:txBody>
+          <a:bodyPr>
+            <a:normAutofit fontScale="92500" lnSpcReduction="20000"/>
+          </a:bodyPr>
+          <a:lstStyle/>
+          <a:p>
+            <a:r>
+              <a:rPr lang="en-GB" dirty="0"/>
+              <a:t>Defining the value as a </a:t>
+            </a:r>
+            <a:r>
+              <a:rPr lang="en-GB" dirty="0" err="1"/>
+              <a:t>preprocessor</a:t>
+            </a:r>
+            <a:r>
+              <a:rPr lang="en-GB" dirty="0"/>
+              <a:t> macro</a:t>
+            </a:r>
+          </a:p>
+        </p:txBody>
+      </p:sp>
+      <p:sp>
+        <p:nvSpPr>
+          <p:cNvPr id="6" name="Content Placeholder 5"/>
+          <p:cNvSpPr>
+            <a:spLocks noGrp="1"/>
+          </p:cNvSpPr>
+          <p:nvPr>
+            <p:ph sz="quarter" idx="4"/>
+          </p:nvPr>
+        </p:nvSpPr>
+        <p:spPr>
+          <a:xfrm>
+            <a:off x="4645025" y="2174875"/>
+            <a:ext cx="4699391" cy="3951288"/>
+          </a:xfrm>
+        </p:spPr>
+        <p:txBody>
+          <a:bodyPr>
+            <a:normAutofit fontScale="55000" lnSpcReduction="20000"/>
+          </a:bodyPr>
+          <a:lstStyle/>
+          <a:p>
+            <a:pPr marL="0" indent="0">
+              <a:buNone/>
+            </a:pPr>
+            <a:r>
+              <a:rPr lang="en-GB" b="1" dirty="0">
+                <a:solidFill>
+                  <a:srgbClr val="C0504D"/>
+                </a:solidFill>
+                <a:latin typeface="Courier New"/>
+                <a:cs typeface="Courier New"/>
+              </a:rPr>
+              <a:t>kernel</a:t>
+            </a:r>
+            <a:r>
+              <a:rPr lang="en-GB" b="1" dirty="0">
+                <a:latin typeface="Courier New"/>
+                <a:cs typeface="Courier New"/>
+              </a:rPr>
+              <a:t> </a:t>
+            </a:r>
+            <a:r>
+              <a:rPr lang="en-GB" b="1" i="1" dirty="0">
+                <a:solidFill>
+                  <a:srgbClr val="3366FF"/>
+                </a:solidFill>
+                <a:latin typeface="Courier New"/>
+                <a:cs typeface="Courier New"/>
+              </a:rPr>
+              <a:t>void</a:t>
+            </a:r>
+            <a:r>
+              <a:rPr lang="en-GB" b="1" dirty="0">
+                <a:latin typeface="Courier New"/>
+                <a:cs typeface="Courier New"/>
+              </a:rPr>
+              <a:t> </a:t>
+            </a:r>
+            <a:r>
+              <a:rPr lang="en-GB" b="1" dirty="0" err="1">
+                <a:solidFill>
+                  <a:schemeClr val="accent3"/>
+                </a:solidFill>
+                <a:latin typeface="Courier New"/>
+                <a:cs typeface="Courier New"/>
+              </a:rPr>
+              <a:t>vecmul</a:t>
+            </a:r>
+            <a:r>
+              <a:rPr lang="en-GB" b="1" dirty="0">
+                <a:latin typeface="Courier New"/>
+                <a:cs typeface="Courier New"/>
+              </a:rPr>
+              <a:t>(</a:t>
+            </a:r>
+          </a:p>
+          <a:p>
+            <a:pPr marL="0" indent="0">
+              <a:buNone/>
+            </a:pPr>
+            <a:r>
+              <a:rPr lang="en-GB" b="1" dirty="0">
+                <a:latin typeface="Courier New"/>
+                <a:cs typeface="Courier New"/>
+              </a:rPr>
+              <a:t>  </a:t>
+            </a:r>
+            <a:r>
+              <a:rPr lang="en-GB" b="1" dirty="0">
+                <a:solidFill>
+                  <a:srgbClr val="C0504D"/>
+                </a:solidFill>
+                <a:latin typeface="Courier New"/>
+                <a:cs typeface="Courier New"/>
+              </a:rPr>
+              <a:t>global</a:t>
+            </a:r>
+            <a:r>
+              <a:rPr lang="en-GB" b="1" dirty="0">
+                <a:latin typeface="Courier New"/>
+                <a:cs typeface="Courier New"/>
+              </a:rPr>
+              <a:t> </a:t>
+            </a:r>
+            <a:r>
+              <a:rPr lang="en-GB" b="1" i="1" dirty="0">
+                <a:solidFill>
+                  <a:srgbClr val="3366FF"/>
+                </a:solidFill>
+                <a:latin typeface="Courier New"/>
+                <a:cs typeface="Courier New"/>
+              </a:rPr>
+              <a:t>float</a:t>
+            </a:r>
+            <a:r>
+              <a:rPr lang="en-GB" b="1" dirty="0">
+                <a:latin typeface="Courier New"/>
+                <a:cs typeface="Courier New"/>
+              </a:rPr>
+              <a:t> *data)</a:t>
+            </a:r>
+          </a:p>
+          <a:p>
+            <a:pPr marL="0" indent="0">
+              <a:buNone/>
+            </a:pPr>
+            <a:endParaRPr lang="en-GB" b="1" dirty="0">
+              <a:latin typeface="Courier New"/>
+              <a:cs typeface="Courier New"/>
+            </a:endParaRPr>
+          </a:p>
+          <a:p>
+            <a:pPr marL="0" indent="0">
+              <a:buNone/>
+            </a:pPr>
+            <a:r>
+              <a:rPr lang="en-GB" b="1" dirty="0">
+                <a:latin typeface="Courier New"/>
+                <a:cs typeface="Courier New"/>
+              </a:rPr>
+              <a:t>{</a:t>
+            </a:r>
+          </a:p>
+          <a:p>
+            <a:pPr marL="0" indent="0">
+              <a:buNone/>
+            </a:pPr>
+            <a:r>
+              <a:rPr lang="en-GB" b="1" dirty="0">
+                <a:latin typeface="Courier New"/>
+                <a:cs typeface="Courier New"/>
+              </a:rPr>
+              <a:t>  </a:t>
+            </a:r>
+            <a:r>
+              <a:rPr lang="en-GB" b="1" i="1" dirty="0" err="1">
+                <a:solidFill>
+                  <a:srgbClr val="3366FF"/>
+                </a:solidFill>
+                <a:latin typeface="Courier New"/>
+                <a:cs typeface="Courier New"/>
+              </a:rPr>
+              <a:t>int</a:t>
+            </a:r>
+            <a:r>
+              <a:rPr lang="en-GB" b="1" dirty="0">
+                <a:latin typeface="Courier New"/>
+                <a:cs typeface="Courier New"/>
+              </a:rPr>
+              <a:t> </a:t>
+            </a:r>
+            <a:r>
+              <a:rPr lang="en-GB" b="1" dirty="0" err="1">
+                <a:latin typeface="Courier New"/>
+                <a:cs typeface="Courier New"/>
+              </a:rPr>
+              <a:t>i</a:t>
+            </a:r>
+            <a:r>
+              <a:rPr lang="en-GB" b="1" dirty="0">
+                <a:latin typeface="Courier New"/>
+                <a:cs typeface="Courier New"/>
+              </a:rPr>
+              <a:t> = </a:t>
+            </a:r>
+            <a:r>
+              <a:rPr lang="en-GB" b="1" dirty="0" err="1">
+                <a:solidFill>
+                  <a:srgbClr val="3366FF"/>
+                </a:solidFill>
+                <a:latin typeface="Courier New"/>
+                <a:cs typeface="Courier New"/>
+              </a:rPr>
+              <a:t>get_global_id</a:t>
+            </a:r>
+            <a:r>
+              <a:rPr lang="en-GB" b="1" dirty="0">
+                <a:latin typeface="Courier New"/>
+                <a:cs typeface="Courier New"/>
+              </a:rPr>
+              <a:t>(</a:t>
+            </a:r>
+            <a:r>
+              <a:rPr lang="en-GB" b="1" dirty="0">
+                <a:solidFill>
+                  <a:srgbClr val="FF00FF"/>
+                </a:solidFill>
+                <a:latin typeface="Courier New"/>
+                <a:cs typeface="Courier New"/>
+              </a:rPr>
+              <a:t>0</a:t>
+            </a:r>
+            <a:r>
+              <a:rPr lang="en-GB" b="1" dirty="0">
+                <a:latin typeface="Courier New"/>
+                <a:cs typeface="Courier New"/>
+              </a:rPr>
+              <a:t>);</a:t>
+            </a:r>
+          </a:p>
+          <a:p>
+            <a:pPr marL="0" indent="0">
+              <a:buNone/>
+            </a:pPr>
+            <a:r>
+              <a:rPr lang="en-GB" b="1" dirty="0">
+                <a:latin typeface="Courier New"/>
+                <a:cs typeface="Courier New"/>
+              </a:rPr>
+              <a:t>  data[</a:t>
+            </a:r>
+            <a:r>
+              <a:rPr lang="en-GB" b="1" dirty="0" err="1">
+                <a:latin typeface="Courier New"/>
+                <a:cs typeface="Courier New"/>
+              </a:rPr>
+              <a:t>i</a:t>
+            </a:r>
+            <a:r>
+              <a:rPr lang="en-GB" b="1" dirty="0">
+                <a:latin typeface="Courier New"/>
+                <a:cs typeface="Courier New"/>
+              </a:rPr>
+              <a:t>] *= factor;</a:t>
+            </a:r>
+            <a:br>
+              <a:rPr lang="en-GB" b="1" dirty="0">
+                <a:latin typeface="Courier New"/>
+                <a:cs typeface="Courier New"/>
+              </a:rPr>
+            </a:br>
+            <a:r>
+              <a:rPr lang="en-GB" b="1" dirty="0">
+                <a:latin typeface="Courier New"/>
+                <a:cs typeface="Courier New"/>
+              </a:rPr>
+              <a:t>}</a:t>
+            </a:r>
+          </a:p>
+          <a:p>
+            <a:pPr marL="0" indent="0">
+              <a:buNone/>
+            </a:pPr>
+            <a:endParaRPr lang="en-GB" b="1" dirty="0">
+              <a:latin typeface="Courier New"/>
+              <a:cs typeface="Courier New"/>
+            </a:endParaRPr>
+          </a:p>
+          <a:p>
+            <a:pPr marL="0" indent="0">
+              <a:buNone/>
+            </a:pPr>
+            <a:endParaRPr lang="en-GB" b="1" dirty="0">
+              <a:latin typeface="Courier New"/>
+              <a:cs typeface="Courier New"/>
+            </a:endParaRPr>
+          </a:p>
+          <a:p>
+            <a:pPr marL="0" indent="0">
+              <a:buNone/>
+            </a:pPr>
+            <a:endParaRPr lang="en-GB" b="1" dirty="0">
+              <a:latin typeface="Courier New"/>
+              <a:cs typeface="Courier New"/>
+            </a:endParaRPr>
+          </a:p>
+          <a:p>
+            <a:pPr marL="0" indent="0">
+              <a:buNone/>
+            </a:pPr>
+            <a:endParaRPr lang="en-GB" b="1" dirty="0">
+              <a:latin typeface="Courier New"/>
+              <a:cs typeface="Courier New"/>
+            </a:endParaRPr>
+          </a:p>
+          <a:p>
+            <a:pPr marL="0" indent="0">
+              <a:buNone/>
+            </a:pPr>
+            <a:r>
+              <a:rPr lang="en-GB" b="1" dirty="0" err="1">
+                <a:latin typeface="Courier New"/>
+                <a:cs typeface="Courier New"/>
+              </a:rPr>
+              <a:t>sprintf</a:t>
+            </a:r>
+            <a:r>
+              <a:rPr lang="en-GB" b="1" dirty="0">
+                <a:latin typeface="Courier New"/>
+                <a:cs typeface="Courier New"/>
+              </a:rPr>
+              <a:t>(options, “-</a:t>
+            </a:r>
+            <a:r>
+              <a:rPr lang="en-GB" b="1" dirty="0" err="1">
+                <a:latin typeface="Courier New"/>
+                <a:cs typeface="Courier New"/>
+              </a:rPr>
+              <a:t>Dfactor</a:t>
+            </a:r>
+            <a:r>
+              <a:rPr lang="en-GB" b="1" dirty="0">
+                <a:latin typeface="Courier New"/>
+                <a:cs typeface="Courier New"/>
+              </a:rPr>
+              <a:t>=%f”, </a:t>
+            </a:r>
+            <a:r>
+              <a:rPr lang="en-GB" b="1" dirty="0" err="1">
+                <a:latin typeface="Courier New"/>
+                <a:cs typeface="Courier New"/>
+              </a:rPr>
+              <a:t>userFactor</a:t>
+            </a:r>
+            <a:r>
+              <a:rPr lang="en-GB" b="1" dirty="0">
+                <a:latin typeface="Courier New"/>
+                <a:cs typeface="Courier New"/>
+              </a:rPr>
+              <a:t>);</a:t>
+            </a:r>
+          </a:p>
+          <a:p>
+            <a:pPr marL="0" indent="0">
+              <a:buNone/>
+            </a:pPr>
+            <a:r>
+              <a:rPr lang="en-GB" b="1" dirty="0" err="1">
+                <a:latin typeface="Courier New"/>
+                <a:cs typeface="Courier New"/>
+              </a:rPr>
+              <a:t>clBuildProgram</a:t>
+            </a:r>
+            <a:r>
+              <a:rPr lang="en-GB" b="1" dirty="0">
+                <a:latin typeface="Courier New"/>
+                <a:cs typeface="Courier New"/>
+              </a:rPr>
+              <a:t>(program, 0, NULL, options, NULL, NULL);</a:t>
+            </a:r>
+          </a:p>
+        </p:txBody>
+      </p:sp>
+      <p:sp>
+        <p:nvSpPr>
+          <p:cNvPr id="7" name="TextBox 6"/>
+          <p:cNvSpPr txBox="1"/>
+          <p:nvPr/>
+        </p:nvSpPr>
+        <p:spPr>
+          <a:xfrm>
+            <a:off x="3496695" y="2112337"/>
+            <a:ext cx="3096344" cy="923330"/>
+          </a:xfrm>
+          <a:prstGeom prst="rect">
+            <a:avLst/>
+          </a:prstGeom>
+          <a:noFill/>
+          <a:ln w="19050">
+            <a:solidFill>
+              <a:srgbClr val="FF0000"/>
+            </a:solidFill>
+          </a:ln>
+        </p:spPr>
+        <p:txBody>
+          <a:bodyPr wrap="square" rtlCol="0">
+            <a:spAutoFit/>
+          </a:bodyPr>
+          <a:lstStyle/>
+          <a:p>
+            <a:r>
+              <a:rPr lang="en-GB" dirty="0">
+                <a:solidFill>
+                  <a:srgbClr val="FF0000"/>
+                </a:solidFill>
+              </a:rPr>
+              <a:t>Not known at application build time (e.g. passed as command-line argument)</a:t>
+            </a:r>
+          </a:p>
+        </p:txBody>
+      </p:sp>
+      <p:cxnSp>
+        <p:nvCxnSpPr>
+          <p:cNvPr id="9" name="Straight Connector 8"/>
+          <p:cNvCxnSpPr/>
+          <p:nvPr/>
+        </p:nvCxnSpPr>
+        <p:spPr>
+          <a:xfrm>
+            <a:off x="2128543" y="2819841"/>
+            <a:ext cx="792088" cy="0"/>
+          </a:xfrm>
+          <a:prstGeom prst="line">
+            <a:avLst/>
+          </a:prstGeom>
+          <a:ln>
+            <a:solidFill>
+              <a:srgbClr val="FF0000"/>
+            </a:solidFill>
+          </a:ln>
+        </p:spPr>
+        <p:style>
+          <a:lnRef idx="2">
+            <a:schemeClr val="accent1"/>
+          </a:lnRef>
+          <a:fillRef idx="0">
+            <a:schemeClr val="accent1"/>
+          </a:fillRef>
+          <a:effectRef idx="1">
+            <a:schemeClr val="accent1"/>
+          </a:effectRef>
+          <a:fontRef idx="minor">
+            <a:schemeClr val="tx1"/>
+          </a:fontRef>
+        </p:style>
+      </p:cxnSp>
+      <p:cxnSp>
+        <p:nvCxnSpPr>
+          <p:cNvPr id="11" name="Straight Connector 10"/>
+          <p:cNvCxnSpPr>
+            <a:cxnSpLocks/>
+            <a:endCxn id="7" idx="1"/>
+          </p:cNvCxnSpPr>
+          <p:nvPr/>
+        </p:nvCxnSpPr>
+        <p:spPr>
+          <a:xfrm flipV="1">
+            <a:off x="2920631" y="2574002"/>
+            <a:ext cx="576064" cy="245839"/>
+          </a:xfrm>
+          <a:prstGeom prst="line">
+            <a:avLst/>
+          </a:prstGeom>
+          <a:ln>
+            <a:solidFill>
+              <a:srgbClr val="FF0000"/>
+            </a:solidFill>
+          </a:ln>
+        </p:spPr>
+        <p:style>
+          <a:lnRef idx="2">
+            <a:schemeClr val="accent1"/>
+          </a:lnRef>
+          <a:fillRef idx="0">
+            <a:schemeClr val="accent1"/>
+          </a:fillRef>
+          <a:effectRef idx="1">
+            <a:schemeClr val="accent1"/>
+          </a:effectRef>
+          <a:fontRef idx="minor">
+            <a:schemeClr val="tx1"/>
+          </a:fontRef>
+        </p:style>
+      </p:cxnSp>
+    </p:spTree>
+    <p:extLst>
+      <p:ext uri="{BB962C8B-B14F-4D97-AF65-F5344CB8AC3E}">
+        <p14:creationId xmlns:p14="http://schemas.microsoft.com/office/powerpoint/2010/main" val="818338625"/>
+      </p:ext>
+    </p:extLst>
+  </p:cSld>
+  <p:clrMapOvr>
+    <a:masterClrMapping/>
+  </p:clrMapOvr>
+  <p:timing>
+    <p:tnLst>
+      <p:par>
+        <p:cTn id="1" dur="indefinite" restart="never" nodeType="tmRoot">
+          <p:childTnLst>
+            <p:seq concurrent="1" nextAc="seek">
+              <p:cTn id="2" dur="indefinite" nodeType="mainSeq">
+                <p:childTnLst>
+                  <p:par>
+                    <p:cTn id="3" fill="hold">
+                      <p:stCondLst>
+                        <p:cond delay="indefinite"/>
+                      </p:stCondLst>
+                      <p:childTnLst>
+                        <p:par>
+                          <p:cTn id="4" fill="hold">
+                            <p:stCondLst>
+                              <p:cond delay="0"/>
+                            </p:stCondLst>
+                            <p:childTnLst>
+                              <p:par>
+                                <p:cTn id="5" presetID="1" presetClass="entr" presetSubtype="0" fill="hold" grpId="0" nodeType="clickEffect">
+                                  <p:stCondLst>
+                                    <p:cond delay="0"/>
+                                  </p:stCondLst>
+                                  <p:childTnLst>
+                                    <p:set>
+                                      <p:cBhvr>
+                                        <p:cTn id="6" dur="1" fill="hold">
+                                          <p:stCondLst>
+                                            <p:cond delay="0"/>
+                                          </p:stCondLst>
+                                        </p:cTn>
+                                        <p:tgtEl>
+                                          <p:spTgt spid="7"/>
+                                        </p:tgtEl>
+                                        <p:attrNameLst>
+                                          <p:attrName>style.visibility</p:attrName>
+                                        </p:attrNameLst>
+                                      </p:cBhvr>
+                                      <p:to>
+                                        <p:strVal val="visible"/>
+                                      </p:to>
+                                    </p:set>
+                                  </p:childTnLst>
+                                </p:cTn>
+                              </p:par>
+                              <p:par>
+                                <p:cTn id="7" presetID="1" presetClass="entr" presetSubtype="0" fill="hold" nodeType="withEffect">
+                                  <p:stCondLst>
+                                    <p:cond delay="0"/>
+                                  </p:stCondLst>
+                                  <p:childTnLst>
+                                    <p:set>
+                                      <p:cBhvr>
+                                        <p:cTn id="8" dur="1" fill="hold">
+                                          <p:stCondLst>
+                                            <p:cond delay="0"/>
+                                          </p:stCondLst>
+                                        </p:cTn>
+                                        <p:tgtEl>
+                                          <p:spTgt spid="11"/>
+                                        </p:tgtEl>
+                                        <p:attrNameLst>
+                                          <p:attrName>style.visibility</p:attrName>
+                                        </p:attrNameLst>
+                                      </p:cBhvr>
+                                      <p:to>
+                                        <p:strVal val="visible"/>
+                                      </p:to>
+                                    </p:set>
+                                  </p:childTnLst>
+                                </p:cTn>
+                              </p:par>
+                              <p:par>
+                                <p:cTn id="9" presetID="1" presetClass="entr" presetSubtype="0" fill="hold" nodeType="withEffect">
+                                  <p:stCondLst>
+                                    <p:cond delay="0"/>
+                                  </p:stCondLst>
+                                  <p:childTnLst>
+                                    <p:set>
+                                      <p:cBhvr>
+                                        <p:cTn id="10" dur="1" fill="hold">
+                                          <p:stCondLst>
+                                            <p:cond delay="0"/>
+                                          </p:stCondLst>
+                                        </p:cTn>
+                                        <p:tgtEl>
+                                          <p:spTgt spid="9"/>
+                                        </p:tgtEl>
+                                        <p:attrNameLst>
+                                          <p:attrName>style.visibility</p:attrName>
+                                        </p:attrNameLst>
+                                      </p:cBhvr>
+                                      <p:to>
+                                        <p:strVal val="visible"/>
+                                      </p:to>
+                                    </p:set>
+                                  </p:childTnLst>
+                                </p:cTn>
+                              </p:par>
+                            </p:childTnLst>
+                          </p:cTn>
+                        </p:par>
+                      </p:childTnLst>
+                    </p:cTn>
+                  </p:par>
+                  <p:par>
+                    <p:cTn id="11" fill="hold">
+                      <p:stCondLst>
+                        <p:cond delay="indefinite"/>
+                      </p:stCondLst>
+                      <p:childTnLst>
+                        <p:par>
+                          <p:cTn id="12" fill="hold">
+                            <p:stCondLst>
+                              <p:cond delay="0"/>
+                            </p:stCondLst>
+                            <p:childTnLst>
+                              <p:par>
+                                <p:cTn id="13" presetID="1" presetClass="exit" presetSubtype="0" fill="hold" grpId="1" nodeType="clickEffect">
+                                  <p:stCondLst>
+                                    <p:cond delay="0"/>
+                                  </p:stCondLst>
+                                  <p:childTnLst>
+                                    <p:set>
+                                      <p:cBhvr>
+                                        <p:cTn id="14" dur="1" fill="hold">
+                                          <p:stCondLst>
+                                            <p:cond delay="0"/>
+                                          </p:stCondLst>
+                                        </p:cTn>
+                                        <p:tgtEl>
+                                          <p:spTgt spid="7"/>
+                                        </p:tgtEl>
+                                        <p:attrNameLst>
+                                          <p:attrName>style.visibility</p:attrName>
+                                        </p:attrNameLst>
+                                      </p:cBhvr>
+                                      <p:to>
+                                        <p:strVal val="hidden"/>
+                                      </p:to>
+                                    </p:set>
+                                  </p:childTnLst>
+                                </p:cTn>
+                              </p:par>
+                              <p:par>
+                                <p:cTn id="15" presetID="1" presetClass="exit" presetSubtype="0" fill="hold" nodeType="withEffect">
+                                  <p:stCondLst>
+                                    <p:cond delay="0"/>
+                                  </p:stCondLst>
+                                  <p:childTnLst>
+                                    <p:set>
+                                      <p:cBhvr>
+                                        <p:cTn id="16" dur="1" fill="hold">
+                                          <p:stCondLst>
+                                            <p:cond delay="0"/>
+                                          </p:stCondLst>
+                                        </p:cTn>
+                                        <p:tgtEl>
+                                          <p:spTgt spid="11"/>
+                                        </p:tgtEl>
+                                        <p:attrNameLst>
+                                          <p:attrName>style.visibility</p:attrName>
+                                        </p:attrNameLst>
+                                      </p:cBhvr>
+                                      <p:to>
+                                        <p:strVal val="hidden"/>
+                                      </p:to>
+                                    </p:set>
+                                  </p:childTnLst>
+                                </p:cTn>
+                              </p:par>
+                              <p:par>
+                                <p:cTn id="17" presetID="1" presetClass="exit" presetSubtype="0" fill="hold" nodeType="withEffect">
+                                  <p:stCondLst>
+                                    <p:cond delay="0"/>
+                                  </p:stCondLst>
+                                  <p:childTnLst>
+                                    <p:set>
+                                      <p:cBhvr>
+                                        <p:cTn id="18" dur="1" fill="hold">
+                                          <p:stCondLst>
+                                            <p:cond delay="0"/>
+                                          </p:stCondLst>
+                                        </p:cTn>
+                                        <p:tgtEl>
+                                          <p:spTgt spid="9"/>
+                                        </p:tgtEl>
+                                        <p:attrNameLst>
+                                          <p:attrName>style.visibility</p:attrName>
+                                        </p:attrNameLst>
+                                      </p:cBhvr>
+                                      <p:to>
+                                        <p:strVal val="hidden"/>
+                                      </p:to>
+                                    </p:set>
+                                  </p:childTnLst>
+                                </p:cTn>
+                              </p:par>
+                              <p:par>
+                                <p:cTn id="19" presetID="1" presetClass="entr" presetSubtype="0" fill="hold" grpId="0" nodeType="withEffect">
+                                  <p:stCondLst>
+                                    <p:cond delay="0"/>
+                                  </p:stCondLst>
+                                  <p:childTnLst>
+                                    <p:set>
+                                      <p:cBhvr>
+                                        <p:cTn id="20" dur="1" fill="hold">
+                                          <p:stCondLst>
+                                            <p:cond delay="0"/>
+                                          </p:stCondLst>
+                                        </p:cTn>
+                                        <p:tgtEl>
+                                          <p:spTgt spid="5">
+                                            <p:txEl>
+                                              <p:pRg st="0" end="0"/>
+                                            </p:txEl>
+                                          </p:spTgt>
+                                        </p:tgtEl>
+                                        <p:attrNameLst>
+                                          <p:attrName>style.visibility</p:attrName>
+                                        </p:attrNameLst>
+                                      </p:cBhvr>
+                                      <p:to>
+                                        <p:strVal val="visible"/>
+                                      </p:to>
+                                    </p:set>
+                                  </p:childTnLst>
+                                </p:cTn>
+                              </p:par>
+                              <p:par>
+                                <p:cTn id="21" presetID="1" presetClass="entr" presetSubtype="0" fill="hold" grpId="0" nodeType="withEffect">
+                                  <p:stCondLst>
+                                    <p:cond delay="0"/>
+                                  </p:stCondLst>
+                                  <p:childTnLst>
+                                    <p:set>
+                                      <p:cBhvr>
+                                        <p:cTn id="22" dur="1" fill="hold">
+                                          <p:stCondLst>
+                                            <p:cond delay="0"/>
+                                          </p:stCondLst>
+                                        </p:cTn>
+                                        <p:tgtEl>
+                                          <p:spTgt spid="6">
+                                            <p:txEl>
+                                              <p:pRg st="0" end="0"/>
+                                            </p:txEl>
+                                          </p:spTgt>
+                                        </p:tgtEl>
+                                        <p:attrNameLst>
+                                          <p:attrName>style.visibility</p:attrName>
+                                        </p:attrNameLst>
+                                      </p:cBhvr>
+                                      <p:to>
+                                        <p:strVal val="visible"/>
+                                      </p:to>
+                                    </p:set>
+                                  </p:childTnLst>
+                                </p:cTn>
+                              </p:par>
+                              <p:par>
+                                <p:cTn id="23" presetID="1" presetClass="entr" presetSubtype="0" fill="hold" grpId="0" nodeType="withEffect">
+                                  <p:stCondLst>
+                                    <p:cond delay="0"/>
+                                  </p:stCondLst>
+                                  <p:childTnLst>
+                                    <p:set>
+                                      <p:cBhvr>
+                                        <p:cTn id="24" dur="1" fill="hold">
+                                          <p:stCondLst>
+                                            <p:cond delay="0"/>
+                                          </p:stCondLst>
+                                        </p:cTn>
+                                        <p:tgtEl>
+                                          <p:spTgt spid="6">
+                                            <p:txEl>
+                                              <p:pRg st="1" end="1"/>
+                                            </p:txEl>
+                                          </p:spTgt>
+                                        </p:tgtEl>
+                                        <p:attrNameLst>
+                                          <p:attrName>style.visibility</p:attrName>
+                                        </p:attrNameLst>
+                                      </p:cBhvr>
+                                      <p:to>
+                                        <p:strVal val="visible"/>
+                                      </p:to>
+                                    </p:set>
+                                  </p:childTnLst>
+                                </p:cTn>
+                              </p:par>
+                              <p:par>
+                                <p:cTn id="25" presetID="1" presetClass="entr" presetSubtype="0" fill="hold" grpId="0" nodeType="withEffect">
+                                  <p:stCondLst>
+                                    <p:cond delay="0"/>
+                                  </p:stCondLst>
+                                  <p:childTnLst>
+                                    <p:set>
+                                      <p:cBhvr>
+                                        <p:cTn id="26" dur="1" fill="hold">
+                                          <p:stCondLst>
+                                            <p:cond delay="0"/>
+                                          </p:stCondLst>
+                                        </p:cTn>
+                                        <p:tgtEl>
+                                          <p:spTgt spid="6">
+                                            <p:txEl>
+                                              <p:pRg st="3" end="3"/>
+                                            </p:txEl>
+                                          </p:spTgt>
+                                        </p:tgtEl>
+                                        <p:attrNameLst>
+                                          <p:attrName>style.visibility</p:attrName>
+                                        </p:attrNameLst>
+                                      </p:cBhvr>
+                                      <p:to>
+                                        <p:strVal val="visible"/>
+                                      </p:to>
+                                    </p:set>
+                                  </p:childTnLst>
+                                </p:cTn>
+                              </p:par>
+                              <p:par>
+                                <p:cTn id="27" presetID="1" presetClass="entr" presetSubtype="0" fill="hold" grpId="0" nodeType="withEffect">
+                                  <p:stCondLst>
+                                    <p:cond delay="0"/>
+                                  </p:stCondLst>
+                                  <p:childTnLst>
+                                    <p:set>
+                                      <p:cBhvr>
+                                        <p:cTn id="28" dur="1" fill="hold">
+                                          <p:stCondLst>
+                                            <p:cond delay="0"/>
+                                          </p:stCondLst>
+                                        </p:cTn>
+                                        <p:tgtEl>
+                                          <p:spTgt spid="6">
+                                            <p:txEl>
+                                              <p:pRg st="4" end="4"/>
+                                            </p:txEl>
+                                          </p:spTgt>
+                                        </p:tgtEl>
+                                        <p:attrNameLst>
+                                          <p:attrName>style.visibility</p:attrName>
+                                        </p:attrNameLst>
+                                      </p:cBhvr>
+                                      <p:to>
+                                        <p:strVal val="visible"/>
+                                      </p:to>
+                                    </p:set>
+                                  </p:childTnLst>
+                                </p:cTn>
+                              </p:par>
+                              <p:par>
+                                <p:cTn id="29" presetID="1" presetClass="entr" presetSubtype="0" fill="hold" grpId="0" nodeType="withEffect">
+                                  <p:stCondLst>
+                                    <p:cond delay="0"/>
+                                  </p:stCondLst>
+                                  <p:childTnLst>
+                                    <p:set>
+                                      <p:cBhvr>
+                                        <p:cTn id="30" dur="1" fill="hold">
+                                          <p:stCondLst>
+                                            <p:cond delay="0"/>
+                                          </p:stCondLst>
+                                        </p:cTn>
+                                        <p:tgtEl>
+                                          <p:spTgt spid="6">
+                                            <p:txEl>
+                                              <p:pRg st="5" end="5"/>
+                                            </p:txEl>
+                                          </p:spTgt>
+                                        </p:tgtEl>
+                                        <p:attrNameLst>
+                                          <p:attrName>style.visibility</p:attrName>
+                                        </p:attrNameLst>
+                                      </p:cBhvr>
+                                      <p:to>
+                                        <p:strVal val="visible"/>
+                                      </p:to>
+                                    </p:set>
+                                  </p:childTnLst>
+                                </p:cTn>
+                              </p:par>
+                              <p:par>
+                                <p:cTn id="31" presetID="1" presetClass="entr" presetSubtype="0" fill="hold" grpId="0" nodeType="withEffect">
+                                  <p:stCondLst>
+                                    <p:cond delay="0"/>
+                                  </p:stCondLst>
+                                  <p:childTnLst>
+                                    <p:set>
+                                      <p:cBhvr>
+                                        <p:cTn id="32" dur="1" fill="hold">
+                                          <p:stCondLst>
+                                            <p:cond delay="0"/>
+                                          </p:stCondLst>
+                                        </p:cTn>
+                                        <p:tgtEl>
+                                          <p:spTgt spid="6">
+                                            <p:txEl>
+                                              <p:pRg st="10" end="10"/>
+                                            </p:txEl>
+                                          </p:spTgt>
+                                        </p:tgtEl>
+                                        <p:attrNameLst>
+                                          <p:attrName>style.visibility</p:attrName>
+                                        </p:attrNameLst>
+                                      </p:cBhvr>
+                                      <p:to>
+                                        <p:strVal val="visible"/>
+                                      </p:to>
+                                    </p:set>
+                                  </p:childTnLst>
+                                </p:cTn>
+                              </p:par>
+                            </p:childTnLst>
+                          </p:cTn>
+                        </p:par>
+                      </p:childTnLst>
+                    </p:cTn>
+                  </p:par>
+                  <p:par>
+                    <p:cTn id="33" fill="hold">
+                      <p:stCondLst>
+                        <p:cond delay="indefinite"/>
+                      </p:stCondLst>
+                      <p:childTnLst>
+                        <p:par>
+                          <p:cTn id="34" fill="hold">
+                            <p:stCondLst>
+                              <p:cond delay="0"/>
+                            </p:stCondLst>
+                            <p:childTnLst>
+                              <p:par>
+                                <p:cTn id="35" presetID="1" presetClass="entr" presetSubtype="0" fill="hold" grpId="0" nodeType="clickEffect">
+                                  <p:stCondLst>
+                                    <p:cond delay="0"/>
+                                  </p:stCondLst>
+                                  <p:childTnLst>
+                                    <p:set>
+                                      <p:cBhvr>
+                                        <p:cTn id="36" dur="1" fill="hold">
+                                          <p:stCondLst>
+                                            <p:cond delay="0"/>
+                                          </p:stCondLst>
+                                        </p:cTn>
+                                        <p:tgtEl>
+                                          <p:spTgt spid="6">
+                                            <p:txEl>
+                                              <p:pRg st="11" end="11"/>
+                                            </p:txEl>
+                                          </p:spTgt>
+                                        </p:tgtEl>
+                                        <p:attrNameLst>
+                                          <p:attrName>style.visibility</p:attrName>
+                                        </p:attrNameLst>
+                                      </p:cBhvr>
+                                      <p:to>
+                                        <p:strVal val="visible"/>
+                                      </p:to>
+                                    </p:set>
+                                  </p:childTnLst>
+                                </p:cTn>
+                              </p:par>
+                            </p:childTnLst>
+                          </p:cTn>
+                        </p:par>
+                      </p:childTnLst>
+                    </p:cTn>
+                  </p:par>
+                </p:childTnLst>
+              </p:cTn>
+              <p:prevCondLst>
+                <p:cond evt="onPrev" delay="0">
+                  <p:tgtEl>
+                    <p:sldTgt/>
+                  </p:tgtEl>
+                </p:cond>
+              </p:prevCondLst>
+              <p:nextCondLst>
+                <p:cond evt="onNext" delay="0">
+                  <p:tgtEl>
+                    <p:sldTgt/>
+                  </p:tgtEl>
+                </p:cond>
+              </p:nextCondLst>
+            </p:seq>
+          </p:childTnLst>
+        </p:cTn>
+      </p:par>
+    </p:tnLst>
+    <p:bldLst>
+      <p:bldP spid="5" grpId="0" build="allAtOnce"/>
+      <p:bldP spid="6" grpId="0" build="p"/>
+      <p:bldP spid="7" grpId="0" animBg="1"/>
+      <p:bldP spid="7" grpId="1" animBg="1"/>
+    </p:bldLst>
+  </p:timing>
+</p:sld>
+</file>
+
+<file path=ppt/slides/slide26.xml><?xml version="1.0" encoding="utf-8"?>
+<p:sld xmlns:a="http://schemas.openxmlformats.org/drawingml/2006/main" xmlns:r="http://schemas.openxmlformats.org/officeDocument/2006/relationships" xmlns:p="http://schemas.openxmlformats.org/presentationml/2006/main">
+  <p:cSld>
+    <p:spTree>
+      <p:nvGrpSpPr>
+        <p:cNvPr id="1" name=""/>
+        <p:cNvGrpSpPr/>
+        <p:nvPr/>
+      </p:nvGrpSpPr>
+      <p:grpSpPr>
+        <a:xfrm>
+          <a:off x="0" y="0"/>
+          <a:ext cx="0" cy="0"/>
+          <a:chOff x="0" y="0"/>
+          <a:chExt cx="0" cy="0"/>
+        </a:xfrm>
+      </p:grpSpPr>
+      <p:sp>
+        <p:nvSpPr>
+          <p:cNvPr id="2" name="Title 1"/>
+          <p:cNvSpPr>
+            <a:spLocks noGrp="1"/>
+          </p:cNvSpPr>
+          <p:nvPr>
+            <p:ph type="title"/>
+          </p:nvPr>
+        </p:nvSpPr>
+        <p:spPr/>
+        <p:txBody>
           <a:bodyPr/>
           <a:lstStyle/>
           <a:p>
@@ -9098,7 +11209,7 @@
 </p:sld>
 </file>
 
-<file path=ppt/slides/slide23.xml><?xml version="1.0" encoding="utf-8"?>
+<file path=ppt/slides/slide27.xml><?xml version="1.0" encoding="utf-8"?>
 <p:sld xmlns:a="http://schemas.openxmlformats.org/drawingml/2006/main" xmlns:r="http://schemas.openxmlformats.org/officeDocument/2006/relationships" xmlns:p="http://schemas.openxmlformats.org/presentationml/2006/main">
   <p:cSld>
     <p:spTree>
@@ -10174,7 +12285,7 @@
 </p:sld>
 </file>
 
-<file path=ppt/slides/slide24.xml><?xml version="1.0" encoding="utf-8"?>
+<file path=ppt/slides/slide28.xml><?xml version="1.0" encoding="utf-8"?>
 <p:sld xmlns:a="http://schemas.openxmlformats.org/drawingml/2006/main" xmlns:r="http://schemas.openxmlformats.org/officeDocument/2006/relationships" xmlns:p="http://schemas.openxmlformats.org/presentationml/2006/main">
   <p:cSld>
     <p:spTree>
@@ -10342,7 +12453,7 @@
 </p:sld>
 </file>
 
-<file path=ppt/slides/slide25.xml><?xml version="1.0" encoding="utf-8"?>
+<file path=ppt/slides/slide29.xml><?xml version="1.0" encoding="utf-8"?>
 <p:sld xmlns:a="http://schemas.openxmlformats.org/drawingml/2006/main" xmlns:r="http://schemas.openxmlformats.org/officeDocument/2006/relationships" xmlns:p="http://schemas.openxmlformats.org/presentationml/2006/main">
   <p:cSld>
     <p:spTree>
@@ -10424,7 +12535,7 @@
                 <a:latin typeface="Courier New"/>
                 <a:cs typeface="Courier New"/>
               </a:rPr>
-              <a:t>IWOCL_2018/exercises/Bilateral</a:t>
+              <a:t>exercises/Bilateral</a:t>
             </a:r>
           </a:p>
           <a:p>
@@ -10556,221 +12667,6 @@
     <p:extLst>
       <p:ext uri="{BB962C8B-B14F-4D97-AF65-F5344CB8AC3E}">
         <p14:creationId xmlns:p14="http://schemas.microsoft.com/office/powerpoint/2010/main" val="359158878"/>
-      </p:ext>
-    </p:extLst>
-  </p:cSld>
-  <p:clrMapOvr>
-    <a:masterClrMapping/>
-  </p:clrMapOvr>
-</p:sld>
-</file>
-
-<file path=ppt/slides/slide26.xml><?xml version="1.0" encoding="utf-8"?>
-<p:sld xmlns:a="http://schemas.openxmlformats.org/drawingml/2006/main" xmlns:r="http://schemas.openxmlformats.org/officeDocument/2006/relationships" xmlns:p="http://schemas.openxmlformats.org/presentationml/2006/main">
-  <p:cSld>
-    <p:spTree>
-      <p:nvGrpSpPr>
-        <p:cNvPr id="1" name=""/>
-        <p:cNvGrpSpPr/>
-        <p:nvPr/>
-      </p:nvGrpSpPr>
-      <p:grpSpPr>
-        <a:xfrm>
-          <a:off x="0" y="0"/>
-          <a:ext cx="0" cy="0"/>
-          <a:chOff x="0" y="0"/>
-          <a:chExt cx="0" cy="0"/>
-        </a:xfrm>
-      </p:grpSpPr>
-      <p:sp>
-        <p:nvSpPr>
-          <p:cNvPr id="2" name="Title 1"/>
-          <p:cNvSpPr>
-            <a:spLocks noGrp="1"/>
-          </p:cNvSpPr>
-          <p:nvPr>
-            <p:ph type="title"/>
-          </p:nvPr>
-        </p:nvSpPr>
-        <p:spPr/>
-        <p:txBody>
-          <a:bodyPr/>
-          <a:lstStyle/>
-          <a:p>
-            <a:r>
-              <a:rPr lang="en-GB" dirty="0"/>
-              <a:t>Exercise: kernel compilation</a:t>
-            </a:r>
-          </a:p>
-        </p:txBody>
-      </p:sp>
-      <p:sp>
-        <p:nvSpPr>
-          <p:cNvPr id="3" name="Content Placeholder 2"/>
-          <p:cNvSpPr>
-            <a:spLocks noGrp="1"/>
-          </p:cNvSpPr>
-          <p:nvPr>
-            <p:ph idx="1"/>
-          </p:nvPr>
-        </p:nvSpPr>
-        <p:spPr>
-          <a:xfrm>
-            <a:off x="457200" y="1417638"/>
-            <a:ext cx="8229600" cy="5440362"/>
-          </a:xfrm>
-        </p:spPr>
-        <p:txBody>
-          <a:bodyPr>
-            <a:normAutofit/>
-          </a:bodyPr>
-          <a:lstStyle/>
-          <a:p>
-            <a:pPr marL="0" indent="0">
-              <a:buNone/>
-            </a:pPr>
-            <a:r>
-              <a:rPr lang="en-GB" sz="2800" dirty="0"/>
-              <a:t>Results from 2 different versions (original and meta programming) on an NVIDIA K40:</a:t>
-            </a:r>
-          </a:p>
-          <a:p>
-            <a:pPr marL="0" indent="0">
-              <a:buNone/>
-            </a:pPr>
-            <a:endParaRPr lang="en-GB" sz="2000" dirty="0">
-              <a:latin typeface="Courier New"/>
-              <a:cs typeface="Courier New"/>
-            </a:endParaRPr>
-          </a:p>
-          <a:p>
-            <a:pPr marL="0" indent="0">
-              <a:buNone/>
-            </a:pPr>
-            <a:r>
-              <a:rPr lang="en-GB" sz="2000" dirty="0">
-                <a:latin typeface="Courier New"/>
-                <a:cs typeface="Courier New"/>
-              </a:rPr>
-              <a:t>$ </a:t>
-            </a:r>
-            <a:r>
-              <a:rPr lang="en-GB" sz="2000" b="1" dirty="0">
-                <a:latin typeface="Courier New"/>
-                <a:cs typeface="Courier New"/>
-              </a:rPr>
-              <a:t>./bilateral </a:t>
-            </a:r>
-          </a:p>
-          <a:p>
-            <a:pPr marL="0" indent="0">
-              <a:buNone/>
-            </a:pPr>
-            <a:r>
-              <a:rPr lang="en-GB" sz="2000" dirty="0">
-                <a:latin typeface="Courier New"/>
-                <a:cs typeface="Courier New"/>
-              </a:rPr>
-              <a:t>OpenCL took 427.7ms (</a:t>
-            </a:r>
-            <a:r>
-              <a:rPr lang="en-GB" sz="2000" b="1" dirty="0">
-                <a:latin typeface="Courier New"/>
-                <a:cs typeface="Courier New"/>
-              </a:rPr>
-              <a:t>13.4ms</a:t>
-            </a:r>
-            <a:r>
-              <a:rPr lang="en-GB" sz="2000" dirty="0">
-                <a:latin typeface="Courier New"/>
-                <a:cs typeface="Courier New"/>
-              </a:rPr>
-              <a:t> / frame)</a:t>
-            </a:r>
-          </a:p>
-          <a:p>
-            <a:pPr marL="0" indent="0">
-              <a:buNone/>
-            </a:pPr>
-            <a:endParaRPr lang="en-GB" sz="2000" dirty="0">
-              <a:latin typeface="Courier New"/>
-              <a:cs typeface="Courier New"/>
-            </a:endParaRPr>
-          </a:p>
-          <a:p>
-            <a:pPr marL="0" indent="0">
-              <a:buNone/>
-            </a:pPr>
-            <a:r>
-              <a:rPr lang="en-GB" sz="2000" dirty="0">
-                <a:latin typeface="Courier New"/>
-                <a:cs typeface="Courier New"/>
-              </a:rPr>
-              <a:t>$ </a:t>
-            </a:r>
-            <a:r>
-              <a:rPr lang="en-GB" sz="2000" b="1" dirty="0">
-                <a:latin typeface="Courier New"/>
-                <a:cs typeface="Courier New"/>
-              </a:rPr>
-              <a:t>./</a:t>
-            </a:r>
-            <a:r>
-              <a:rPr lang="en-GB" sz="2000" b="1" dirty="0" err="1">
-                <a:latin typeface="Courier New"/>
-                <a:cs typeface="Courier New"/>
-              </a:rPr>
-              <a:t>bilateral_meta</a:t>
-            </a:r>
-            <a:r>
-              <a:rPr lang="en-GB" sz="2000" b="1" dirty="0">
-                <a:latin typeface="Courier New"/>
-                <a:cs typeface="Courier New"/>
-              </a:rPr>
-              <a:t> </a:t>
-            </a:r>
-          </a:p>
-          <a:p>
-            <a:pPr marL="0" indent="0">
-              <a:buNone/>
-            </a:pPr>
-            <a:r>
-              <a:rPr lang="en-GB" sz="2000" dirty="0">
-                <a:latin typeface="Courier New"/>
-                <a:cs typeface="Courier New"/>
-              </a:rPr>
-              <a:t>OpenCL took 341.2ms (</a:t>
-            </a:r>
-            <a:r>
-              <a:rPr lang="en-GB" sz="2000" b="1" dirty="0">
-                <a:latin typeface="Courier New"/>
-                <a:cs typeface="Courier New"/>
-              </a:rPr>
-              <a:t>10.7ms</a:t>
-            </a:r>
-            <a:r>
-              <a:rPr lang="en-GB" sz="2000" dirty="0">
-                <a:latin typeface="Courier New"/>
-                <a:cs typeface="Courier New"/>
-              </a:rPr>
-              <a:t> / frame)</a:t>
-            </a:r>
-          </a:p>
-          <a:p>
-            <a:pPr marL="0" indent="0">
-              <a:buNone/>
-            </a:pPr>
-            <a:endParaRPr lang="en-GB" sz="2000" dirty="0">
-              <a:latin typeface="Courier New"/>
-              <a:cs typeface="Courier New"/>
-            </a:endParaRPr>
-          </a:p>
-        </p:txBody>
-      </p:sp>
-    </p:spTree>
-    <p:extLst>
-      <p:ext uri="{BB962C8B-B14F-4D97-AF65-F5344CB8AC3E}">
-        <p14:creationId xmlns:p14="http://schemas.microsoft.com/office/powerpoint/2010/main" val="4218318277"/>
       </p:ext>
     </p:extLst>
   </p:cSld>
@@ -11772,6 +13668,436 @@
     <p:extLst>
       <p:ext uri="{BB962C8B-B14F-4D97-AF65-F5344CB8AC3E}">
         <p14:creationId xmlns:p14="http://schemas.microsoft.com/office/powerpoint/2010/main" val="1917558613"/>
+      </p:ext>
+    </p:extLst>
+  </p:cSld>
+  <p:clrMapOvr>
+    <a:masterClrMapping/>
+  </p:clrMapOvr>
+</p:sld>
+</file>
+
+<file path=ppt/slides/slide30.xml><?xml version="1.0" encoding="utf-8"?>
+<p:sld xmlns:a="http://schemas.openxmlformats.org/drawingml/2006/main" xmlns:r="http://schemas.openxmlformats.org/officeDocument/2006/relationships" xmlns:p="http://schemas.openxmlformats.org/presentationml/2006/main" show="0">
+  <p:cSld>
+    <p:spTree>
+      <p:nvGrpSpPr>
+        <p:cNvPr id="1" name=""/>
+        <p:cNvGrpSpPr/>
+        <p:nvPr/>
+      </p:nvGrpSpPr>
+      <p:grpSpPr>
+        <a:xfrm>
+          <a:off x="0" y="0"/>
+          <a:ext cx="0" cy="0"/>
+          <a:chOff x="0" y="0"/>
+          <a:chExt cx="0" cy="0"/>
+        </a:xfrm>
+      </p:grpSpPr>
+      <p:sp>
+        <p:nvSpPr>
+          <p:cNvPr id="2" name="Title 1"/>
+          <p:cNvSpPr>
+            <a:spLocks noGrp="1"/>
+          </p:cNvSpPr>
+          <p:nvPr>
+            <p:ph type="title"/>
+          </p:nvPr>
+        </p:nvSpPr>
+        <p:spPr/>
+        <p:txBody>
+          <a:bodyPr/>
+          <a:lstStyle/>
+          <a:p>
+            <a:r>
+              <a:rPr lang="en-GB" dirty="0"/>
+              <a:t>Exercise: kernel compilation</a:t>
+            </a:r>
+          </a:p>
+        </p:txBody>
+      </p:sp>
+      <p:sp>
+        <p:nvSpPr>
+          <p:cNvPr id="3" name="Content Placeholder 2"/>
+          <p:cNvSpPr>
+            <a:spLocks noGrp="1"/>
+          </p:cNvSpPr>
+          <p:nvPr>
+            <p:ph idx="1"/>
+          </p:nvPr>
+        </p:nvSpPr>
+        <p:spPr>
+          <a:xfrm>
+            <a:off x="457200" y="1417638"/>
+            <a:ext cx="8229600" cy="5440362"/>
+          </a:xfrm>
+        </p:spPr>
+        <p:txBody>
+          <a:bodyPr>
+            <a:normAutofit/>
+          </a:bodyPr>
+          <a:lstStyle/>
+          <a:p>
+            <a:pPr marL="0" indent="0">
+              <a:buNone/>
+            </a:pPr>
+            <a:r>
+              <a:rPr lang="en-GB" sz="2800" dirty="0"/>
+              <a:t>Results from 2 different versions (original and meta programming) on an NVIDIA K40:</a:t>
+            </a:r>
+          </a:p>
+          <a:p>
+            <a:pPr marL="0" indent="0">
+              <a:buNone/>
+            </a:pPr>
+            <a:endParaRPr lang="en-GB" sz="2000" dirty="0">
+              <a:latin typeface="Courier New"/>
+              <a:cs typeface="Courier New"/>
+            </a:endParaRPr>
+          </a:p>
+          <a:p>
+            <a:pPr marL="0" indent="0">
+              <a:buNone/>
+            </a:pPr>
+            <a:r>
+              <a:rPr lang="en-GB" sz="2000" dirty="0">
+                <a:latin typeface="Courier New"/>
+                <a:cs typeface="Courier New"/>
+              </a:rPr>
+              <a:t>$ </a:t>
+            </a:r>
+            <a:r>
+              <a:rPr lang="en-GB" sz="2000" b="1" dirty="0">
+                <a:latin typeface="Courier New"/>
+                <a:cs typeface="Courier New"/>
+              </a:rPr>
+              <a:t>./bilateral </a:t>
+            </a:r>
+          </a:p>
+          <a:p>
+            <a:pPr marL="0" indent="0">
+              <a:buNone/>
+            </a:pPr>
+            <a:r>
+              <a:rPr lang="en-GB" sz="2000" dirty="0">
+                <a:latin typeface="Courier New"/>
+                <a:cs typeface="Courier New"/>
+              </a:rPr>
+              <a:t>OpenCL took 427.7ms (</a:t>
+            </a:r>
+            <a:r>
+              <a:rPr lang="en-GB" sz="2000" b="1" dirty="0">
+                <a:latin typeface="Courier New"/>
+                <a:cs typeface="Courier New"/>
+              </a:rPr>
+              <a:t>13.4ms</a:t>
+            </a:r>
+            <a:r>
+              <a:rPr lang="en-GB" sz="2000" dirty="0">
+                <a:latin typeface="Courier New"/>
+                <a:cs typeface="Courier New"/>
+              </a:rPr>
+              <a:t> / frame)</a:t>
+            </a:r>
+          </a:p>
+          <a:p>
+            <a:pPr marL="0" indent="0">
+              <a:buNone/>
+            </a:pPr>
+            <a:endParaRPr lang="en-GB" sz="2000" dirty="0">
+              <a:latin typeface="Courier New"/>
+              <a:cs typeface="Courier New"/>
+            </a:endParaRPr>
+          </a:p>
+          <a:p>
+            <a:pPr marL="0" indent="0">
+              <a:buNone/>
+            </a:pPr>
+            <a:r>
+              <a:rPr lang="en-GB" sz="2000" dirty="0">
+                <a:latin typeface="Courier New"/>
+                <a:cs typeface="Courier New"/>
+              </a:rPr>
+              <a:t>$ </a:t>
+            </a:r>
+            <a:r>
+              <a:rPr lang="en-GB" sz="2000" b="1" dirty="0">
+                <a:latin typeface="Courier New"/>
+                <a:cs typeface="Courier New"/>
+              </a:rPr>
+              <a:t>./</a:t>
+            </a:r>
+            <a:r>
+              <a:rPr lang="en-GB" sz="2000" b="1" dirty="0" err="1">
+                <a:latin typeface="Courier New"/>
+                <a:cs typeface="Courier New"/>
+              </a:rPr>
+              <a:t>bilateral_meta</a:t>
+            </a:r>
+            <a:r>
+              <a:rPr lang="en-GB" sz="2000" b="1" dirty="0">
+                <a:latin typeface="Courier New"/>
+                <a:cs typeface="Courier New"/>
+              </a:rPr>
+              <a:t> </a:t>
+            </a:r>
+          </a:p>
+          <a:p>
+            <a:pPr marL="0" indent="0">
+              <a:buNone/>
+            </a:pPr>
+            <a:r>
+              <a:rPr lang="en-GB" sz="2000" dirty="0">
+                <a:latin typeface="Courier New"/>
+                <a:cs typeface="Courier New"/>
+              </a:rPr>
+              <a:t>OpenCL took 341.2ms (</a:t>
+            </a:r>
+            <a:r>
+              <a:rPr lang="en-GB" sz="2000" b="1" dirty="0">
+                <a:latin typeface="Courier New"/>
+                <a:cs typeface="Courier New"/>
+              </a:rPr>
+              <a:t>10.7ms</a:t>
+            </a:r>
+            <a:r>
+              <a:rPr lang="en-GB" sz="2000" dirty="0">
+                <a:latin typeface="Courier New"/>
+                <a:cs typeface="Courier New"/>
+              </a:rPr>
+              <a:t> / frame)</a:t>
+            </a:r>
+          </a:p>
+          <a:p>
+            <a:pPr marL="0" indent="0">
+              <a:buNone/>
+            </a:pPr>
+            <a:endParaRPr lang="en-GB" sz="2000" dirty="0">
+              <a:latin typeface="Courier New"/>
+              <a:cs typeface="Courier New"/>
+            </a:endParaRPr>
+          </a:p>
+        </p:txBody>
+      </p:sp>
+    </p:spTree>
+    <p:extLst>
+      <p:ext uri="{BB962C8B-B14F-4D97-AF65-F5344CB8AC3E}">
+        <p14:creationId xmlns:p14="http://schemas.microsoft.com/office/powerpoint/2010/main" val="4218318277"/>
+      </p:ext>
+    </p:extLst>
+  </p:cSld>
+  <p:clrMapOvr>
+    <a:masterClrMapping/>
+  </p:clrMapOvr>
+</p:sld>
+</file>
+
+<file path=ppt/slides/slide31.xml><?xml version="1.0" encoding="utf-8"?>
+<p:sld xmlns:a="http://schemas.openxmlformats.org/drawingml/2006/main" xmlns:r="http://schemas.openxmlformats.org/officeDocument/2006/relationships" xmlns:p="http://schemas.openxmlformats.org/presentationml/2006/main">
+  <p:cSld>
+    <p:spTree>
+      <p:nvGrpSpPr>
+        <p:cNvPr id="1" name=""/>
+        <p:cNvGrpSpPr/>
+        <p:nvPr/>
+      </p:nvGrpSpPr>
+      <p:grpSpPr>
+        <a:xfrm>
+          <a:off x="0" y="0"/>
+          <a:ext cx="0" cy="0"/>
+          <a:chOff x="0" y="0"/>
+          <a:chExt cx="0" cy="0"/>
+        </a:xfrm>
+      </p:grpSpPr>
+      <p:sp>
+        <p:nvSpPr>
+          <p:cNvPr id="2" name="Title 1"/>
+          <p:cNvSpPr>
+            <a:spLocks noGrp="1"/>
+          </p:cNvSpPr>
+          <p:nvPr>
+            <p:ph type="title"/>
+          </p:nvPr>
+        </p:nvSpPr>
+        <p:spPr/>
+        <p:txBody>
+          <a:bodyPr/>
+          <a:lstStyle/>
+          <a:p>
+            <a:r>
+              <a:rPr lang="en-GB" dirty="0"/>
+              <a:t>Exercise: kernel compilation</a:t>
+            </a:r>
+          </a:p>
+        </p:txBody>
+      </p:sp>
+      <p:sp>
+        <p:nvSpPr>
+          <p:cNvPr id="3" name="Content Placeholder 2"/>
+          <p:cNvSpPr>
+            <a:spLocks noGrp="1"/>
+          </p:cNvSpPr>
+          <p:nvPr>
+            <p:ph idx="1"/>
+          </p:nvPr>
+        </p:nvSpPr>
+        <p:spPr>
+          <a:xfrm>
+            <a:off x="457200" y="1417638"/>
+            <a:ext cx="8229600" cy="5440362"/>
+          </a:xfrm>
+        </p:spPr>
+        <p:txBody>
+          <a:bodyPr>
+            <a:normAutofit/>
+          </a:bodyPr>
+          <a:lstStyle/>
+          <a:p>
+            <a:pPr marL="0" indent="0">
+              <a:buNone/>
+            </a:pPr>
+            <a:r>
+              <a:rPr lang="en-GB" sz="2800" dirty="0"/>
+              <a:t>Results from 2 different versions (original and meta programming) on an NVIDIA P100:</a:t>
+            </a:r>
+          </a:p>
+          <a:p>
+            <a:pPr marL="0" indent="0">
+              <a:buNone/>
+            </a:pPr>
+            <a:endParaRPr lang="en-GB" sz="2000" dirty="0">
+              <a:latin typeface="Courier New"/>
+              <a:cs typeface="Courier New"/>
+            </a:endParaRPr>
+          </a:p>
+          <a:p>
+            <a:pPr marL="0" indent="0">
+              <a:buNone/>
+            </a:pPr>
+            <a:r>
+              <a:rPr lang="en-GB" sz="2000" dirty="0">
+                <a:latin typeface="Courier New"/>
+                <a:cs typeface="Courier New"/>
+              </a:rPr>
+              <a:t>$ </a:t>
+            </a:r>
+            <a:r>
+              <a:rPr lang="en-GB" sz="2000" b="1" dirty="0">
+                <a:latin typeface="Courier New"/>
+                <a:cs typeface="Courier New"/>
+              </a:rPr>
+              <a:t>./bilateral </a:t>
+            </a:r>
+          </a:p>
+          <a:p>
+            <a:pPr marL="0" indent="0">
+              <a:buNone/>
+            </a:pPr>
+            <a:r>
+              <a:rPr lang="en-GB" sz="2000" dirty="0">
+                <a:latin typeface="Courier New"/>
+                <a:cs typeface="Courier New"/>
+              </a:rPr>
+              <a:t>OpenCL took 59.2ms (</a:t>
+            </a:r>
+            <a:r>
+              <a:rPr lang="en-GB" sz="2000" b="1" dirty="0">
+                <a:latin typeface="Courier New"/>
+                <a:cs typeface="Courier New"/>
+              </a:rPr>
+              <a:t>1.9ms</a:t>
+            </a:r>
+            <a:r>
+              <a:rPr lang="en-GB" sz="2000" dirty="0">
+                <a:latin typeface="Courier New"/>
+                <a:cs typeface="Courier New"/>
+              </a:rPr>
+              <a:t> / frame)</a:t>
+            </a:r>
+          </a:p>
+          <a:p>
+            <a:pPr marL="0" indent="0">
+              <a:buNone/>
+            </a:pPr>
+            <a:endParaRPr lang="en-GB" sz="2000" dirty="0">
+              <a:latin typeface="Courier New"/>
+              <a:cs typeface="Courier New"/>
+            </a:endParaRPr>
+          </a:p>
+          <a:p>
+            <a:pPr marL="0" indent="0">
+              <a:buNone/>
+            </a:pPr>
+            <a:r>
+              <a:rPr lang="en-GB" sz="2000" dirty="0">
+                <a:latin typeface="Courier New"/>
+                <a:cs typeface="Courier New"/>
+              </a:rPr>
+              <a:t>$ </a:t>
+            </a:r>
+            <a:r>
+              <a:rPr lang="en-GB" sz="2000" b="1" dirty="0">
+                <a:latin typeface="Courier New"/>
+                <a:cs typeface="Courier New"/>
+              </a:rPr>
+              <a:t>./</a:t>
+            </a:r>
+            <a:r>
+              <a:rPr lang="en-GB" sz="2000" b="1" dirty="0" err="1">
+                <a:latin typeface="Courier New"/>
+                <a:cs typeface="Courier New"/>
+              </a:rPr>
+              <a:t>bilateral_meta</a:t>
+            </a:r>
+            <a:r>
+              <a:rPr lang="en-GB" sz="2000" b="1" dirty="0">
+                <a:latin typeface="Courier New"/>
+                <a:cs typeface="Courier New"/>
+              </a:rPr>
+              <a:t> </a:t>
+            </a:r>
+          </a:p>
+          <a:p>
+            <a:pPr marL="0" indent="0">
+              <a:buNone/>
+            </a:pPr>
+            <a:r>
+              <a:rPr lang="en-GB" sz="2000" dirty="0">
+                <a:latin typeface="Courier New"/>
+                <a:cs typeface="Courier New"/>
+              </a:rPr>
+              <a:t>OpenCL took 56.2ms (</a:t>
+            </a:r>
+            <a:r>
+              <a:rPr lang="en-GB" sz="2000" b="1" dirty="0">
+                <a:latin typeface="Courier New"/>
+                <a:cs typeface="Courier New"/>
+              </a:rPr>
+              <a:t>1.8ms</a:t>
+            </a:r>
+            <a:r>
+              <a:rPr lang="en-GB" sz="2000" dirty="0">
+                <a:latin typeface="Courier New"/>
+                <a:cs typeface="Courier New"/>
+              </a:rPr>
+              <a:t> / frame)</a:t>
+            </a:r>
+          </a:p>
+          <a:p>
+            <a:pPr marL="0" indent="0">
+              <a:buNone/>
+            </a:pPr>
+            <a:endParaRPr lang="en-GB" sz="2000" dirty="0">
+              <a:latin typeface="Courier New"/>
+              <a:cs typeface="Courier New"/>
+            </a:endParaRPr>
+          </a:p>
+        </p:txBody>
+      </p:sp>
+    </p:spTree>
+    <p:extLst>
+      <p:ext uri="{BB962C8B-B14F-4D97-AF65-F5344CB8AC3E}">
+        <p14:creationId xmlns:p14="http://schemas.microsoft.com/office/powerpoint/2010/main" val="3954268754"/>
       </p:ext>
     </p:extLst>
   </p:cSld>
@@ -12665,7 +14991,7 @@
 </file>
 
 <file path=ppt/slides/slide8.xml><?xml version="1.0" encoding="utf-8"?>
-<p:sld xmlns:a="http://schemas.openxmlformats.org/drawingml/2006/main" xmlns:r="http://schemas.openxmlformats.org/officeDocument/2006/relationships" xmlns:p="http://schemas.openxmlformats.org/presentationml/2006/main">
+<p:sld xmlns:a="http://schemas.openxmlformats.org/drawingml/2006/main" xmlns:r="http://schemas.openxmlformats.org/officeDocument/2006/relationships" xmlns:p="http://schemas.openxmlformats.org/presentationml/2006/main" show="0">
   <p:cSld>
     <p:spTree>
       <p:nvGrpSpPr>
@@ -13576,57 +15902,691 @@
             <p:ph idx="1"/>
           </p:nvPr>
         </p:nvSpPr>
-        <p:spPr/>
+        <p:spPr>
+          <a:xfrm>
+            <a:off x="175364" y="1417638"/>
+            <a:ext cx="8968636" cy="4211877"/>
+          </a:xfrm>
+        </p:spPr>
         <p:txBody>
           <a:bodyPr>
-            <a:normAutofit fontScale="92500" lnSpcReduction="20000"/>
+            <a:noAutofit/>
           </a:bodyPr>
           <a:lstStyle/>
           <a:p>
-            <a:pPr>
-              <a:lnSpc>
-                <a:spcPct val="110000"/>
-              </a:lnSpc>
-            </a:pPr>
-            <a:r>
-              <a:rPr lang="en-GB" dirty="0"/>
-              <a:t>These binaries are only valid on the devices for which they are compiled, so we potentially have to perform this compilation for every device we wish to target</a:t>
-            </a:r>
-          </a:p>
-          <a:p>
-            <a:pPr>
-              <a:lnSpc>
-                <a:spcPct val="110000"/>
-              </a:lnSpc>
-            </a:pPr>
-            <a:r>
-              <a:rPr lang="en-GB" dirty="0"/>
-              <a:t>A vendor might change the binary definition at any time, potentially breaking our shipped application</a:t>
-            </a:r>
-          </a:p>
-          <a:p>
-            <a:pPr>
-              <a:lnSpc>
-                <a:spcPct val="110000"/>
-              </a:lnSpc>
-            </a:pPr>
-            <a:r>
-              <a:rPr lang="en-GB" dirty="0"/>
-              <a:t>If a binary isn’t compatible with the target device, an error will be returned either when creating the program or building it</a:t>
-            </a:r>
+            <a:r>
+              <a:rPr lang="en-GB" sz="1300" dirty="0"/>
+              <a:t>Retrieving the binary:</a:t>
+            </a:r>
+          </a:p>
+          <a:p>
+            <a:pPr marL="400050" lvl="1" indent="0">
+              <a:buNone/>
+            </a:pPr>
+            <a:r>
+              <a:rPr lang="en-GB" sz="1300" b="1" dirty="0">
+                <a:solidFill>
+                  <a:srgbClr val="008000"/>
+                </a:solidFill>
+                <a:latin typeface="Courier New"/>
+                <a:cs typeface="Courier New"/>
+              </a:rPr>
+              <a:t>// Create and compile program</a:t>
+            </a:r>
+          </a:p>
+          <a:p>
+            <a:pPr marL="400050" lvl="1" indent="0">
+              <a:buNone/>
+            </a:pPr>
+            <a:r>
+              <a:rPr lang="en-GB" sz="1300" b="1" dirty="0">
+                <a:latin typeface="Courier New"/>
+                <a:cs typeface="Courier New"/>
+              </a:rPr>
+              <a:t>program = </a:t>
+            </a:r>
+            <a:r>
+              <a:rPr lang="en-GB" sz="1300" b="1" dirty="0" err="1">
+                <a:solidFill>
+                  <a:schemeClr val="tx2">
+                    <a:lumMod val="75000"/>
+                  </a:schemeClr>
+                </a:solidFill>
+                <a:latin typeface="Courier New"/>
+                <a:cs typeface="Courier New"/>
+              </a:rPr>
+              <a:t>clCreateProgramWithSource</a:t>
+            </a:r>
+            <a:r>
+              <a:rPr lang="en-GB" sz="1300" b="1" dirty="0">
+                <a:latin typeface="Courier New"/>
+                <a:cs typeface="Courier New"/>
+              </a:rPr>
+              <a:t>(context, 1, &amp;</a:t>
+            </a:r>
+            <a:r>
+              <a:rPr lang="en-GB" sz="1300" b="1" dirty="0" err="1">
+                <a:latin typeface="Courier New"/>
+                <a:cs typeface="Courier New"/>
+              </a:rPr>
+              <a:t>kernel_source</a:t>
+            </a:r>
+            <a:r>
+              <a:rPr lang="en-GB" sz="1300" b="1" dirty="0">
+                <a:latin typeface="Courier New"/>
+                <a:cs typeface="Courier New"/>
+              </a:rPr>
+              <a:t>, NULL, NULL);</a:t>
+            </a:r>
+          </a:p>
+          <a:p>
+            <a:pPr marL="400050" lvl="1" indent="0">
+              <a:buNone/>
+            </a:pPr>
+            <a:r>
+              <a:rPr lang="en-GB" sz="1300" b="1" dirty="0" err="1">
+                <a:solidFill>
+                  <a:schemeClr val="tx2">
+                    <a:lumMod val="75000"/>
+                  </a:schemeClr>
+                </a:solidFill>
+                <a:latin typeface="Courier New"/>
+                <a:cs typeface="Courier New"/>
+              </a:rPr>
+              <a:t>clBuildProgram</a:t>
+            </a:r>
+            <a:r>
+              <a:rPr lang="en-GB" sz="1300" b="1" dirty="0">
+                <a:latin typeface="Courier New"/>
+                <a:cs typeface="Courier New"/>
+              </a:rPr>
+              <a:t>(program, 0, NULL, NULL, NULL, NULL);</a:t>
+            </a:r>
+            <a:endParaRPr lang="en-GB" sz="1300" b="1" dirty="0">
+              <a:solidFill>
+                <a:schemeClr val="tx2">
+                  <a:lumMod val="75000"/>
+                </a:schemeClr>
+              </a:solidFill>
+              <a:latin typeface="Courier New"/>
+              <a:cs typeface="Courier New"/>
+            </a:endParaRPr>
+          </a:p>
+          <a:p>
+            <a:pPr marL="400050" lvl="1" indent="0">
+              <a:buNone/>
+            </a:pPr>
+            <a:endParaRPr lang="en-GB" sz="1300" b="1" dirty="0">
+              <a:latin typeface="Courier New"/>
+              <a:cs typeface="Courier New"/>
+            </a:endParaRPr>
+          </a:p>
+          <a:p>
+            <a:pPr marL="400050" lvl="1" indent="0">
+              <a:buNone/>
+            </a:pPr>
+            <a:r>
+              <a:rPr lang="en-GB" sz="1300" b="1" dirty="0">
+                <a:solidFill>
+                  <a:srgbClr val="008000"/>
+                </a:solidFill>
+                <a:latin typeface="Courier New"/>
+                <a:cs typeface="Courier New"/>
+              </a:rPr>
+              <a:t>// Get compiled binary from runtime</a:t>
+            </a:r>
+          </a:p>
+          <a:p>
+            <a:pPr marL="400050" lvl="1" indent="0">
+              <a:buNone/>
+            </a:pPr>
+            <a:r>
+              <a:rPr lang="en-GB" sz="1300" b="1" dirty="0" err="1">
+                <a:latin typeface="Courier New"/>
+                <a:cs typeface="Courier New"/>
+              </a:rPr>
+              <a:t>size_t</a:t>
+            </a:r>
+            <a:r>
+              <a:rPr lang="en-GB" sz="1300" b="1" dirty="0">
+                <a:latin typeface="Courier New"/>
+                <a:cs typeface="Courier New"/>
+              </a:rPr>
+              <a:t> size;</a:t>
+            </a:r>
+          </a:p>
+          <a:p>
+            <a:pPr marL="400050" lvl="1" indent="0">
+              <a:buNone/>
+            </a:pPr>
+            <a:r>
+              <a:rPr lang="en-GB" sz="1300" b="1" dirty="0" err="1">
+                <a:solidFill>
+                  <a:schemeClr val="tx2">
+                    <a:lumMod val="75000"/>
+                  </a:schemeClr>
+                </a:solidFill>
+                <a:latin typeface="Courier New"/>
+                <a:cs typeface="Courier New"/>
+              </a:rPr>
+              <a:t>clGetProgramInfo</a:t>
+            </a:r>
+            <a:r>
+              <a:rPr lang="en-GB" sz="1300" b="1" dirty="0">
+                <a:latin typeface="Courier New"/>
+                <a:cs typeface="Courier New"/>
+              </a:rPr>
+              <a:t>(program, CL_PROGRAM_BINARY_SIZES, </a:t>
+            </a:r>
+            <a:r>
+              <a:rPr lang="en-GB" sz="1300" b="1" dirty="0" err="1">
+                <a:latin typeface="Courier New"/>
+                <a:cs typeface="Courier New"/>
+              </a:rPr>
+              <a:t>sizeof</a:t>
+            </a:r>
+            <a:r>
+              <a:rPr lang="en-GB" sz="1300" b="1" dirty="0">
+                <a:latin typeface="Courier New"/>
+                <a:cs typeface="Courier New"/>
+              </a:rPr>
+              <a:t>(</a:t>
+            </a:r>
+            <a:r>
+              <a:rPr lang="en-GB" sz="1300" b="1" dirty="0" err="1">
+                <a:latin typeface="Courier New"/>
+                <a:cs typeface="Courier New"/>
+              </a:rPr>
+              <a:t>size_t</a:t>
+            </a:r>
+            <a:r>
+              <a:rPr lang="en-GB" sz="1300" b="1" dirty="0">
+                <a:latin typeface="Courier New"/>
+                <a:cs typeface="Courier New"/>
+              </a:rPr>
+              <a:t>), &amp;size, NULL);</a:t>
+            </a:r>
+            <a:endParaRPr lang="en-GB" sz="1300" b="1" dirty="0">
+              <a:solidFill>
+                <a:schemeClr val="tx2">
+                  <a:lumMod val="75000"/>
+                </a:schemeClr>
+              </a:solidFill>
+              <a:latin typeface="Courier New"/>
+              <a:cs typeface="Courier New"/>
+            </a:endParaRPr>
+          </a:p>
+          <a:p>
+            <a:pPr marL="400050" lvl="1" indent="0">
+              <a:buNone/>
+            </a:pPr>
+            <a:r>
+              <a:rPr lang="en-GB" sz="1300" b="1" dirty="0">
+                <a:latin typeface="Courier New"/>
+                <a:cs typeface="Courier New"/>
+              </a:rPr>
+              <a:t>unsigned char *binaries = malloc(</a:t>
+            </a:r>
+            <a:r>
+              <a:rPr lang="en-GB" sz="1300" b="1" dirty="0" err="1">
+                <a:latin typeface="Courier New"/>
+                <a:cs typeface="Courier New"/>
+              </a:rPr>
+              <a:t>sizeof</a:t>
+            </a:r>
+            <a:r>
+              <a:rPr lang="en-GB" sz="1300" b="1" dirty="0">
+                <a:latin typeface="Courier New"/>
+                <a:cs typeface="Courier New"/>
+              </a:rPr>
+              <a:t>(unsigned char) * size);</a:t>
+            </a:r>
+          </a:p>
+          <a:p>
+            <a:pPr marL="400050" lvl="1" indent="0">
+              <a:buNone/>
+            </a:pPr>
+            <a:r>
+              <a:rPr lang="en-GB" sz="1300" b="1" dirty="0" err="1">
+                <a:solidFill>
+                  <a:schemeClr val="tx2">
+                    <a:lumMod val="75000"/>
+                  </a:schemeClr>
+                </a:solidFill>
+                <a:latin typeface="Courier New"/>
+                <a:cs typeface="Courier New"/>
+              </a:rPr>
+              <a:t>clGetProgramInfo</a:t>
+            </a:r>
+            <a:r>
+              <a:rPr lang="en-GB" sz="1300" b="1" dirty="0">
+                <a:latin typeface="Courier New"/>
+                <a:cs typeface="Courier New"/>
+              </a:rPr>
+              <a:t>(program, CL_PROGRAM_BINARIES, size, &amp;binaries, NULL);</a:t>
+            </a:r>
+            <a:endParaRPr lang="en-GB" sz="1300" b="1" dirty="0">
+              <a:solidFill>
+                <a:schemeClr val="tx2">
+                  <a:lumMod val="75000"/>
+                </a:schemeClr>
+              </a:solidFill>
+              <a:latin typeface="Courier New"/>
+              <a:cs typeface="Courier New"/>
+            </a:endParaRPr>
+          </a:p>
+          <a:p>
+            <a:pPr marL="400050" lvl="1" indent="0">
+              <a:buNone/>
+            </a:pPr>
+            <a:endParaRPr lang="en-GB" sz="1300" b="1" dirty="0">
+              <a:latin typeface="Courier New"/>
+              <a:cs typeface="Courier New"/>
+            </a:endParaRPr>
+          </a:p>
+          <a:p>
+            <a:pPr marL="400050" lvl="1" indent="0">
+              <a:buNone/>
+            </a:pPr>
+            <a:r>
+              <a:rPr lang="en-GB" sz="1300" b="1" dirty="0">
+                <a:solidFill>
+                  <a:srgbClr val="008000"/>
+                </a:solidFill>
+                <a:latin typeface="Courier New"/>
+                <a:cs typeface="Courier New"/>
+              </a:rPr>
+              <a:t>// Then write binary to file</a:t>
+            </a:r>
+          </a:p>
+          <a:p>
+            <a:pPr marL="400050" lvl="1" indent="0">
+              <a:buNone/>
+            </a:pPr>
+            <a:r>
+              <a:rPr lang="en-GB" sz="1300" b="1" dirty="0">
+                <a:latin typeface="Courier New"/>
+                <a:cs typeface="Courier New"/>
+              </a:rPr>
+              <a:t>…</a:t>
+            </a:r>
+          </a:p>
+          <a:p>
+            <a:pPr marL="0" indent="0">
+              <a:buNone/>
+            </a:pPr>
+            <a:endParaRPr lang="en-GB" sz="1300" b="1" dirty="0">
+              <a:latin typeface="Courier New"/>
+              <a:cs typeface="Courier New"/>
+            </a:endParaRPr>
+          </a:p>
+          <a:p>
+            <a:r>
+              <a:rPr lang="en-GB" sz="1300" dirty="0"/>
+              <a:t>Loading the binary</a:t>
+            </a:r>
+          </a:p>
+          <a:p>
+            <a:pPr marL="400050" lvl="1" indent="0">
+              <a:buNone/>
+            </a:pPr>
+            <a:r>
+              <a:rPr lang="en-GB" sz="1300" b="1" dirty="0">
+                <a:solidFill>
+                  <a:srgbClr val="008000"/>
+                </a:solidFill>
+                <a:latin typeface="Courier New"/>
+                <a:cs typeface="Courier New"/>
+              </a:rPr>
+              <a:t>// Load compiled program binary from file</a:t>
+            </a:r>
+          </a:p>
+          <a:p>
+            <a:pPr marL="400050" lvl="1" indent="0">
+              <a:buNone/>
+            </a:pPr>
+            <a:r>
+              <a:rPr lang="en-GB" sz="1300" b="1" dirty="0">
+                <a:latin typeface="Courier New"/>
+                <a:cs typeface="Courier New"/>
+              </a:rPr>
+              <a:t>…</a:t>
+            </a:r>
+          </a:p>
+          <a:p>
+            <a:pPr marL="400050" lvl="1" indent="0">
+              <a:buNone/>
+            </a:pPr>
+            <a:endParaRPr lang="en-GB" sz="1300" b="1" dirty="0">
+              <a:latin typeface="Courier New"/>
+              <a:cs typeface="Courier New"/>
+            </a:endParaRPr>
+          </a:p>
+          <a:p>
+            <a:pPr marL="400050" lvl="1" indent="0">
+              <a:buNone/>
+            </a:pPr>
+            <a:r>
+              <a:rPr lang="en-GB" sz="1300" b="1" dirty="0">
+                <a:solidFill>
+                  <a:srgbClr val="008000"/>
+                </a:solidFill>
+                <a:latin typeface="Courier New"/>
+                <a:cs typeface="Courier New"/>
+              </a:rPr>
+              <a:t>// Create program using binary</a:t>
+            </a:r>
+          </a:p>
+          <a:p>
+            <a:pPr marL="400050" lvl="1" indent="0">
+              <a:buNone/>
+            </a:pPr>
+            <a:r>
+              <a:rPr lang="en-GB" sz="1300" b="1" dirty="0">
+                <a:latin typeface="Courier New"/>
+                <a:cs typeface="Courier New"/>
+              </a:rPr>
+              <a:t>program = </a:t>
+            </a:r>
+            <a:r>
+              <a:rPr lang="en-GB" sz="1300" b="1" dirty="0" err="1">
+                <a:solidFill>
+                  <a:schemeClr val="tx2">
+                    <a:lumMod val="75000"/>
+                  </a:schemeClr>
+                </a:solidFill>
+                <a:latin typeface="Courier New"/>
+                <a:cs typeface="Courier New"/>
+              </a:rPr>
+              <a:t>clCreateProgramWithBinary</a:t>
+            </a:r>
+            <a:r>
+              <a:rPr lang="en-GB" sz="1300" b="1" dirty="0">
+                <a:latin typeface="Courier New"/>
+                <a:cs typeface="Courier New"/>
+              </a:rPr>
+              <a:t>(context, 1, devices, &amp;size, &amp;binaries, NULL, NULL);</a:t>
+            </a:r>
+          </a:p>
+          <a:p>
+            <a:pPr marL="400050" lvl="1" indent="0">
+              <a:buNone/>
+            </a:pPr>
+            <a:r>
+              <a:rPr lang="en-GB" sz="1300" b="1" dirty="0" err="1">
+                <a:solidFill>
+                  <a:schemeClr val="tx2">
+                    <a:lumMod val="75000"/>
+                  </a:schemeClr>
+                </a:solidFill>
+                <a:latin typeface="Courier New"/>
+                <a:cs typeface="Courier New"/>
+              </a:rPr>
+              <a:t>clBuildProgram</a:t>
+            </a:r>
+            <a:r>
+              <a:rPr lang="en-GB" sz="1300" b="1" dirty="0">
+                <a:latin typeface="Courier New"/>
+                <a:cs typeface="Courier New"/>
+              </a:rPr>
+              <a:t>(program, 0, NULL, NULL, NULL, NULL);</a:t>
+            </a:r>
+            <a:endParaRPr lang="en-GB" sz="1300" b="1" dirty="0">
+              <a:solidFill>
+                <a:schemeClr val="tx2">
+                  <a:lumMod val="75000"/>
+                </a:schemeClr>
+              </a:solidFill>
+              <a:latin typeface="Courier New"/>
+              <a:cs typeface="Courier New"/>
+            </a:endParaRPr>
           </a:p>
         </p:txBody>
       </p:sp>
     </p:spTree>
     <p:extLst>
       <p:ext uri="{BB962C8B-B14F-4D97-AF65-F5344CB8AC3E}">
-        <p14:creationId xmlns:p14="http://schemas.microsoft.com/office/powerpoint/2010/main" val="2237855219"/>
+        <p14:creationId xmlns:p14="http://schemas.microsoft.com/office/powerpoint/2010/main" val="3829492853"/>
       </p:ext>
     </p:extLst>
   </p:cSld>
   <p:clrMapOvr>
     <a:masterClrMapping/>
   </p:clrMapOvr>
+  <p:timing>
+    <p:tnLst>
+      <p:par>
+        <p:cTn id="1" dur="indefinite" restart="never" nodeType="tmRoot">
+          <p:childTnLst>
+            <p:seq concurrent="1" nextAc="seek">
+              <p:cTn id="2" dur="indefinite" nodeType="mainSeq">
+                <p:childTnLst>
+                  <p:par>
+                    <p:cTn id="3" fill="hold">
+                      <p:stCondLst>
+                        <p:cond delay="indefinite"/>
+                      </p:stCondLst>
+                      <p:childTnLst>
+                        <p:par>
+                          <p:cTn id="4" fill="hold">
+                            <p:stCondLst>
+                              <p:cond delay="0"/>
+                            </p:stCondLst>
+                            <p:childTnLst>
+                              <p:par>
+                                <p:cTn id="5" presetID="1" presetClass="entr" presetSubtype="0" fill="hold" nodeType="clickEffect">
+                                  <p:stCondLst>
+                                    <p:cond delay="0"/>
+                                  </p:stCondLst>
+                                  <p:childTnLst>
+                                    <p:set>
+                                      <p:cBhvr>
+                                        <p:cTn id="6" dur="1" fill="hold">
+                                          <p:stCondLst>
+                                            <p:cond delay="0"/>
+                                          </p:stCondLst>
+                                        </p:cTn>
+                                        <p:tgtEl>
+                                          <p:spTgt spid="3">
+                                            <p:txEl>
+                                              <p:pRg st="14" end="14"/>
+                                            </p:txEl>
+                                          </p:spTgt>
+                                        </p:tgtEl>
+                                        <p:attrNameLst>
+                                          <p:attrName>style.visibility</p:attrName>
+                                        </p:attrNameLst>
+                                      </p:cBhvr>
+                                      <p:to>
+                                        <p:strVal val="visible"/>
+                                      </p:to>
+                                    </p:set>
+                                  </p:childTnLst>
+                                </p:cTn>
+                              </p:par>
+                              <p:par>
+                                <p:cTn id="7" presetID="1" presetClass="entr" presetSubtype="0" fill="hold" nodeType="withEffect">
+                                  <p:stCondLst>
+                                    <p:cond delay="0"/>
+                                  </p:stCondLst>
+                                  <p:childTnLst>
+                                    <p:set>
+                                      <p:cBhvr>
+                                        <p:cTn id="8" dur="1" fill="hold">
+                                          <p:stCondLst>
+                                            <p:cond delay="0"/>
+                                          </p:stCondLst>
+                                        </p:cTn>
+                                        <p:tgtEl>
+                                          <p:spTgt spid="3">
+                                            <p:txEl>
+                                              <p:pRg st="15" end="15"/>
+                                            </p:txEl>
+                                          </p:spTgt>
+                                        </p:tgtEl>
+                                        <p:attrNameLst>
+                                          <p:attrName>style.visibility</p:attrName>
+                                        </p:attrNameLst>
+                                      </p:cBhvr>
+                                      <p:to>
+                                        <p:strVal val="visible"/>
+                                      </p:to>
+                                    </p:set>
+                                  </p:childTnLst>
+                                </p:cTn>
+                              </p:par>
+                              <p:par>
+                                <p:cTn id="9" presetID="1" presetClass="entr" presetSubtype="0" fill="hold" nodeType="withEffect">
+                                  <p:stCondLst>
+                                    <p:cond delay="0"/>
+                                  </p:stCondLst>
+                                  <p:childTnLst>
+                                    <p:set>
+                                      <p:cBhvr>
+                                        <p:cTn id="10" dur="1" fill="hold">
+                                          <p:stCondLst>
+                                            <p:cond delay="0"/>
+                                          </p:stCondLst>
+                                        </p:cTn>
+                                        <p:tgtEl>
+                                          <p:spTgt spid="3">
+                                            <p:txEl>
+                                              <p:pRg st="16" end="16"/>
+                                            </p:txEl>
+                                          </p:spTgt>
+                                        </p:tgtEl>
+                                        <p:attrNameLst>
+                                          <p:attrName>style.visibility</p:attrName>
+                                        </p:attrNameLst>
+                                      </p:cBhvr>
+                                      <p:to>
+                                        <p:strVal val="visible"/>
+                                      </p:to>
+                                    </p:set>
+                                  </p:childTnLst>
+                                </p:cTn>
+                              </p:par>
+                              <p:par>
+                                <p:cTn id="11" presetID="1" presetClass="entr" presetSubtype="0" fill="hold" nodeType="withEffect">
+                                  <p:stCondLst>
+                                    <p:cond delay="0"/>
+                                  </p:stCondLst>
+                                  <p:childTnLst>
+                                    <p:set>
+                                      <p:cBhvr>
+                                        <p:cTn id="12" dur="1" fill="hold">
+                                          <p:stCondLst>
+                                            <p:cond delay="0"/>
+                                          </p:stCondLst>
+                                        </p:cTn>
+                                        <p:tgtEl>
+                                          <p:spTgt spid="3">
+                                            <p:txEl>
+                                              <p:pRg st="18" end="18"/>
+                                            </p:txEl>
+                                          </p:spTgt>
+                                        </p:tgtEl>
+                                        <p:attrNameLst>
+                                          <p:attrName>style.visibility</p:attrName>
+                                        </p:attrNameLst>
+                                      </p:cBhvr>
+                                      <p:to>
+                                        <p:strVal val="visible"/>
+                                      </p:to>
+                                    </p:set>
+                                  </p:childTnLst>
+                                </p:cTn>
+                              </p:par>
+                              <p:par>
+                                <p:cTn id="13" presetID="1" presetClass="entr" presetSubtype="0" fill="hold" nodeType="withEffect">
+                                  <p:stCondLst>
+                                    <p:cond delay="0"/>
+                                  </p:stCondLst>
+                                  <p:childTnLst>
+                                    <p:set>
+                                      <p:cBhvr>
+                                        <p:cTn id="14" dur="1" fill="hold">
+                                          <p:stCondLst>
+                                            <p:cond delay="0"/>
+                                          </p:stCondLst>
+                                        </p:cTn>
+                                        <p:tgtEl>
+                                          <p:spTgt spid="3">
+                                            <p:txEl>
+                                              <p:pRg st="19" end="19"/>
+                                            </p:txEl>
+                                          </p:spTgt>
+                                        </p:tgtEl>
+                                        <p:attrNameLst>
+                                          <p:attrName>style.visibility</p:attrName>
+                                        </p:attrNameLst>
+                                      </p:cBhvr>
+                                      <p:to>
+                                        <p:strVal val="visible"/>
+                                      </p:to>
+                                    </p:set>
+                                  </p:childTnLst>
+                                </p:cTn>
+                              </p:par>
+                              <p:par>
+                                <p:cTn id="15" presetID="1" presetClass="entr" presetSubtype="0" fill="hold" nodeType="withEffect">
+                                  <p:stCondLst>
+                                    <p:cond delay="0"/>
+                                  </p:stCondLst>
+                                  <p:childTnLst>
+                                    <p:set>
+                                      <p:cBhvr>
+                                        <p:cTn id="16" dur="1" fill="hold">
+                                          <p:stCondLst>
+                                            <p:cond delay="0"/>
+                                          </p:stCondLst>
+                                        </p:cTn>
+                                        <p:tgtEl>
+                                          <p:spTgt spid="3">
+                                            <p:txEl>
+                                              <p:pRg st="20" end="20"/>
+                                            </p:txEl>
+                                          </p:spTgt>
+                                        </p:tgtEl>
+                                        <p:attrNameLst>
+                                          <p:attrName>style.visibility</p:attrName>
+                                        </p:attrNameLst>
+                                      </p:cBhvr>
+                                      <p:to>
+                                        <p:strVal val="visible"/>
+                                      </p:to>
+                                    </p:set>
+                                  </p:childTnLst>
+                                </p:cTn>
+                              </p:par>
+                            </p:childTnLst>
+                          </p:cTn>
+                        </p:par>
+                      </p:childTnLst>
+                    </p:cTn>
+                  </p:par>
+                </p:childTnLst>
+              </p:cTn>
+              <p:prevCondLst>
+                <p:cond evt="onPrev" delay="0">
+                  <p:tgtEl>
+                    <p:sldTgt/>
+                  </p:tgtEl>
+                </p:cond>
+              </p:prevCondLst>
+              <p:nextCondLst>
+                <p:cond evt="onNext" delay="0">
+                  <p:tgtEl>
+                    <p:sldTgt/>
+                  </p:tgtEl>
+                </p:cond>
+              </p:nextCondLst>
+            </p:seq>
+          </p:childTnLst>
+        </p:cTn>
+      </p:par>
+    </p:tnLst>
+  </p:timing>
 </p:sld>
 </file>
 

</xml_diff>

<commit_message>
Lots of small fixes after Tom's addition of the C code
</commit_message>
<xml_diff>
--- a/advanced_part2.pptx
+++ b/advanced_part2.pptx
@@ -238,7 +238,7 @@
           <a:p>
             <a:fld id="{7FB74D45-CC88-7D46-9D48-9989C6A85D58}" type="datetimeFigureOut">
               <a:rPr lang="en-US" smtClean="0"/>
-              <a:t>11/21/18</a:t>
+              <a:t>11/22/18</a:t>
             </a:fld>
             <a:endParaRPr lang="en-US"/>
           </a:p>
@@ -1736,7 +1736,7 @@
           <a:p>
             <a:fld id="{D735EA19-98D7-5F47-83EC-D97C4239F8D5}" type="datetimeFigureOut">
               <a:rPr lang="en-US" smtClean="0"/>
-              <a:t>11/21/18</a:t>
+              <a:t>11/22/18</a:t>
             </a:fld>
             <a:endParaRPr lang="en-GB"/>
           </a:p>
@@ -1904,7 +1904,7 @@
           <a:p>
             <a:fld id="{D735EA19-98D7-5F47-83EC-D97C4239F8D5}" type="datetimeFigureOut">
               <a:rPr lang="en-US" smtClean="0"/>
-              <a:t>11/21/18</a:t>
+              <a:t>11/22/18</a:t>
             </a:fld>
             <a:endParaRPr lang="en-GB"/>
           </a:p>
@@ -2082,7 +2082,7 @@
           <a:p>
             <a:fld id="{D735EA19-98D7-5F47-83EC-D97C4239F8D5}" type="datetimeFigureOut">
               <a:rPr lang="en-US" smtClean="0"/>
-              <a:t>11/21/18</a:t>
+              <a:t>11/22/18</a:t>
             </a:fld>
             <a:endParaRPr lang="en-GB"/>
           </a:p>
@@ -2250,7 +2250,7 @@
           <a:p>
             <a:fld id="{D735EA19-98D7-5F47-83EC-D97C4239F8D5}" type="datetimeFigureOut">
               <a:rPr lang="en-US" smtClean="0"/>
-              <a:t>11/21/18</a:t>
+              <a:t>11/22/18</a:t>
             </a:fld>
             <a:endParaRPr lang="en-GB"/>
           </a:p>
@@ -2495,7 +2495,7 @@
           <a:p>
             <a:fld id="{D735EA19-98D7-5F47-83EC-D97C4239F8D5}" type="datetimeFigureOut">
               <a:rPr lang="en-US" smtClean="0"/>
-              <a:t>11/21/18</a:t>
+              <a:t>11/22/18</a:t>
             </a:fld>
             <a:endParaRPr lang="en-GB"/>
           </a:p>
@@ -2780,7 +2780,7 @@
           <a:p>
             <a:fld id="{D735EA19-98D7-5F47-83EC-D97C4239F8D5}" type="datetimeFigureOut">
               <a:rPr lang="en-US" smtClean="0"/>
-              <a:t>11/21/18</a:t>
+              <a:t>11/22/18</a:t>
             </a:fld>
             <a:endParaRPr lang="en-GB"/>
           </a:p>
@@ -3199,7 +3199,7 @@
           <a:p>
             <a:fld id="{D735EA19-98D7-5F47-83EC-D97C4239F8D5}" type="datetimeFigureOut">
               <a:rPr lang="en-US" smtClean="0"/>
-              <a:t>11/21/18</a:t>
+              <a:t>11/22/18</a:t>
             </a:fld>
             <a:endParaRPr lang="en-GB"/>
           </a:p>
@@ -3316,7 +3316,7 @@
           <a:p>
             <a:fld id="{D735EA19-98D7-5F47-83EC-D97C4239F8D5}" type="datetimeFigureOut">
               <a:rPr lang="en-US" smtClean="0"/>
-              <a:t>11/21/18</a:t>
+              <a:t>11/22/18</a:t>
             </a:fld>
             <a:endParaRPr lang="en-GB"/>
           </a:p>
@@ -3411,7 +3411,7 @@
           <a:p>
             <a:fld id="{D735EA19-98D7-5F47-83EC-D97C4239F8D5}" type="datetimeFigureOut">
               <a:rPr lang="en-US" smtClean="0"/>
-              <a:t>11/21/18</a:t>
+              <a:t>11/22/18</a:t>
             </a:fld>
             <a:endParaRPr lang="en-GB"/>
           </a:p>
@@ -3686,7 +3686,7 @@
           <a:p>
             <a:fld id="{D735EA19-98D7-5F47-83EC-D97C4239F8D5}" type="datetimeFigureOut">
               <a:rPr lang="en-US" smtClean="0"/>
-              <a:t>11/21/18</a:t>
+              <a:t>11/22/18</a:t>
             </a:fld>
             <a:endParaRPr lang="en-GB"/>
           </a:p>
@@ -3938,7 +3938,7 @@
           <a:p>
             <a:fld id="{D735EA19-98D7-5F47-83EC-D97C4239F8D5}" type="datetimeFigureOut">
               <a:rPr lang="en-US" smtClean="0"/>
-              <a:t>11/21/18</a:t>
+              <a:t>11/22/18</a:t>
             </a:fld>
             <a:endParaRPr lang="en-GB"/>
           </a:p>
@@ -4149,7 +4149,7 @@
           <a:p>
             <a:fld id="{D735EA19-98D7-5F47-83EC-D97C4239F8D5}" type="datetimeFigureOut">
               <a:rPr lang="en-US" smtClean="0"/>
-              <a:t>11/21/18</a:t>
+              <a:t>11/22/18</a:t>
             </a:fld>
             <a:endParaRPr lang="en-GB"/>
           </a:p>
@@ -4655,7 +4655,31 @@
             </a:pPr>
             <a:r>
               <a:rPr lang="en-GB" dirty="0"/>
-              <a:t>These binaries are only valid on the devices for which they are compiled, so we potentially have to perform this compilation for every device we wish to target</a:t>
+              <a:t>These binaries are </a:t>
+            </a:r>
+            <a:r>
+              <a:rPr lang="en-GB" b="1" i="1" u="sng" dirty="0">
+                <a:solidFill>
+                  <a:srgbClr val="FF0000"/>
+                </a:solidFill>
+              </a:rPr>
+              <a:t>only</a:t>
+            </a:r>
+            <a:r>
+              <a:rPr lang="en-GB" dirty="0"/>
+              <a:t> valid on the devices for which they are compiled, so we potentially have to perform this compilation for </a:t>
+            </a:r>
+            <a:r>
+              <a:rPr lang="en-GB" b="1" i="1" u="sng" dirty="0">
+                <a:solidFill>
+                  <a:srgbClr val="FF0000"/>
+                </a:solidFill>
+              </a:rPr>
+              <a:t>every</a:t>
+            </a:r>
+            <a:r>
+              <a:rPr lang="en-GB" dirty="0"/>
+              <a:t> device we wish to target</a:t>
             </a:r>
           </a:p>
           <a:p>
@@ -4666,7 +4690,19 @@
             </a:pPr>
             <a:r>
               <a:rPr lang="en-GB" dirty="0"/>
-              <a:t>A vendor might change the binary definition at any time, potentially breaking our shipped application</a:t>
+              <a:t>A vendor might change the binary definition at any time, potentially </a:t>
+            </a:r>
+            <a:r>
+              <a:rPr lang="en-GB" b="1" u="sng" dirty="0">
+                <a:solidFill>
+                  <a:srgbClr val="FFC000"/>
+                </a:solidFill>
+              </a:rPr>
+              <a:t>breaking</a:t>
+            </a:r>
+            <a:r>
+              <a:rPr lang="en-GB" dirty="0"/>
+              <a:t> our shipped application</a:t>
             </a:r>
           </a:p>
           <a:p>
@@ -4676,8 +4712,28 @@
               </a:lnSpc>
             </a:pPr>
             <a:r>
+              <a:rPr lang="en-GB" b="1" dirty="0">
+                <a:solidFill>
+                  <a:srgbClr val="FF0000"/>
+                </a:solidFill>
+              </a:rPr>
+              <a:t>If a binary isn’t compatible </a:t>
+            </a:r>
+            <a:r>
               <a:rPr lang="en-GB" dirty="0"/>
-              <a:t>If a binary isn’t compatible with the target device, an error will be returned either when creating the program or building it</a:t>
+              <a:t>with the target device, </a:t>
+            </a:r>
+            <a:r>
+              <a:rPr lang="en-GB" b="1" dirty="0">
+                <a:solidFill>
+                  <a:srgbClr val="FF0000"/>
+                </a:solidFill>
+              </a:rPr>
+              <a:t>an error will be returned </a:t>
+            </a:r>
+            <a:r>
+              <a:rPr lang="en-GB" dirty="0"/>
+              <a:t>either when creating the program or building it</a:t>
             </a:r>
           </a:p>
         </p:txBody>
@@ -5900,18 +5956,30 @@
         <p:spPr>
           <a:xfrm>
             <a:off x="457200" y="1600200"/>
-            <a:ext cx="8686800" cy="4525963"/>
+            <a:ext cx="8686800" cy="5097780"/>
           </a:xfrm>
         </p:spPr>
         <p:txBody>
           <a:bodyPr>
-            <a:normAutofit fontScale="77500" lnSpcReduction="20000"/>
+            <a:normAutofit fontScale="92500"/>
           </a:bodyPr>
           <a:lstStyle/>
           <a:p>
             <a:r>
               <a:rPr lang="en-GB" dirty="0"/>
-              <a:t>We can query a program object for the names of all the kernels that it contains:</a:t>
+              <a:t>We can </a:t>
+            </a:r>
+            <a:r>
+              <a:rPr lang="en-GB" b="1" dirty="0">
+                <a:solidFill>
+                  <a:srgbClr val="0070C0"/>
+                </a:solidFill>
+              </a:rPr>
+              <a:t>query a program object </a:t>
+            </a:r>
+            <a:r>
+              <a:rPr lang="en-GB" dirty="0"/>
+              <a:t>for the names of all the kernels that it contains:</a:t>
             </a:r>
           </a:p>
           <a:p>
@@ -5919,7 +5987,7 @@
               <a:buNone/>
             </a:pPr>
             <a:r>
-              <a:rPr lang="en-GB" b="1" dirty="0" err="1">
+              <a:rPr lang="en-GB" sz="2200" b="1" dirty="0" err="1">
                 <a:solidFill>
                   <a:schemeClr val="tx2">
                     <a:lumMod val="75000"/>
@@ -5931,11 +5999,25 @@
               <a:t>clGetProgramInfo</a:t>
             </a:r>
             <a:r>
-              <a:rPr lang="en-GB" b="1" dirty="0">
-                <a:latin typeface="Courier New"/>
-                <a:cs typeface="Courier New"/>
-              </a:rPr>
-              <a:t>(program, CL_PROGRAM_NUM_KERNELS, …);</a:t>
+              <a:rPr lang="en-GB" sz="2200" b="1" dirty="0">
+                <a:latin typeface="Courier New"/>
+                <a:cs typeface="Courier New"/>
+              </a:rPr>
+              <a:t>(</a:t>
+            </a:r>
+            <a:r>
+              <a:rPr lang="en-GB" sz="2200" b="1" dirty="0" err="1">
+                <a:latin typeface="Courier New"/>
+                <a:cs typeface="Courier New"/>
+              </a:rPr>
+              <a:t>program,CL_PROGRAM_NUM_KERNELS</a:t>
+            </a:r>
+            <a:r>
+              <a:rPr lang="en-GB" sz="2200" b="1" dirty="0">
+                <a:latin typeface="Courier New"/>
+                <a:cs typeface="Courier New"/>
+              </a:rPr>
+              <a:t>, …);</a:t>
             </a:r>
           </a:p>
           <a:p>
@@ -5943,7 +6025,7 @@
               <a:buNone/>
             </a:pPr>
             <a:r>
-              <a:rPr lang="en-GB" b="1" dirty="0" err="1">
+              <a:rPr lang="en-GB" sz="2200" b="1" dirty="0" err="1">
                 <a:solidFill>
                   <a:schemeClr val="tx2">
                     <a:lumMod val="75000"/>
@@ -5955,17 +6037,52 @@
               <a:t>clGetProgramInfo</a:t>
             </a:r>
             <a:r>
-              <a:rPr lang="en-GB" b="1" dirty="0">
-                <a:latin typeface="Courier New"/>
-                <a:cs typeface="Courier New"/>
-              </a:rPr>
-              <a:t>(program, CL_PROGRAM_KERNEL_NAMES, …);</a:t>
-            </a:r>
+              <a:rPr lang="en-GB" sz="2200" b="1" dirty="0">
+                <a:latin typeface="Courier New"/>
+                <a:cs typeface="Courier New"/>
+              </a:rPr>
+              <a:t>(</a:t>
+            </a:r>
+            <a:r>
+              <a:rPr lang="en-GB" sz="2200" b="1" dirty="0" err="1">
+                <a:latin typeface="Courier New"/>
+                <a:cs typeface="Courier New"/>
+              </a:rPr>
+              <a:t>program,CL_PROGRAM_KERNEL_NAMES</a:t>
+            </a:r>
+            <a:r>
+              <a:rPr lang="en-GB" sz="2200" b="1" dirty="0">
+                <a:latin typeface="Courier New"/>
+                <a:cs typeface="Courier New"/>
+              </a:rPr>
+              <a:t>, …);</a:t>
+            </a:r>
+          </a:p>
+          <a:p>
+            <a:pPr marL="400050" lvl="1" indent="0">
+              <a:buNone/>
+            </a:pPr>
+            <a:endParaRPr lang="en-GB" b="1" dirty="0">
+              <a:latin typeface="Courier New"/>
+              <a:cs typeface="Courier New"/>
+            </a:endParaRPr>
           </a:p>
           <a:p>
             <a:r>
               <a:rPr lang="en-GB" dirty="0"/>
-              <a:t>We can also query information about kernel arguments (from OpenCL 1.2 onwards):</a:t>
+              <a:t>We can also </a:t>
+            </a:r>
+            <a:r>
+              <a:rPr lang="en-GB" b="1" dirty="0">
+                <a:solidFill>
+                  <a:srgbClr val="0070C0"/>
+                </a:solidFill>
+              </a:rPr>
+              <a:t>query information about kernel arguments </a:t>
+            </a:r>
+            <a:r>
+              <a:rPr lang="en-GB" dirty="0"/>
+              <a:t>(from OpenCL 1.2 onwards):</a:t>
             </a:r>
           </a:p>
           <a:p>
@@ -5973,7 +6090,7 @@
               <a:buNone/>
             </a:pPr>
             <a:r>
-              <a:rPr lang="en-GB" b="1" dirty="0" err="1">
+              <a:rPr lang="en-GB" sz="2200" b="1" dirty="0" err="1">
                 <a:solidFill>
                   <a:schemeClr val="tx2">
                     <a:lumMod val="75000"/>
@@ -5985,7 +6102,7 @@
               <a:t>clGetKernelInfo</a:t>
             </a:r>
             <a:r>
-              <a:rPr lang="en-GB" b="1" dirty="0">
+              <a:rPr lang="en-GB" sz="2200" b="1" dirty="0">
                 <a:latin typeface="Courier New"/>
                 <a:cs typeface="Courier New"/>
               </a:rPr>
@@ -5997,7 +6114,7 @@
               <a:buNone/>
             </a:pPr>
             <a:r>
-              <a:rPr lang="en-GB" b="1" dirty="0" err="1">
+              <a:rPr lang="en-GB" sz="2200" b="1" dirty="0" err="1">
                 <a:solidFill>
                   <a:schemeClr val="tx2">
                     <a:lumMod val="75000"/>
@@ -6009,7 +6126,7 @@
               <a:t>clGetKernelInfo</a:t>
             </a:r>
             <a:r>
-              <a:rPr lang="en-GB" b="1" dirty="0">
+              <a:rPr lang="en-GB" sz="2200" b="1" dirty="0">
                 <a:latin typeface="Courier New"/>
                 <a:cs typeface="Courier New"/>
               </a:rPr>
@@ -6025,7 +6142,11 @@
                 <a:latin typeface="Trebuchet MS"/>
                 <a:cs typeface="Trebuchet MS"/>
               </a:rPr>
-              <a:t>	(the program should be compiled using the</a:t>
+              <a:t>	</a:t>
+            </a:r>
+            <a:r>
+              <a:rPr lang="en-GB" dirty="0"/>
+              <a:t>(the program should be compiled using the</a:t>
             </a:r>
           </a:p>
           <a:p>
@@ -6063,30 +6184,9 @@
               <a:t>-info </a:t>
             </a:r>
             <a:r>
-              <a:rPr lang="en-GB" dirty="0">
-                <a:solidFill>
-                  <a:srgbClr val="000000"/>
-                </a:solidFill>
-                <a:latin typeface="Trebuchet MS"/>
-                <a:cs typeface="Trebuchet MS"/>
-              </a:rPr>
-              <a:t>option</a:t>
-            </a:r>
-            <a:r>
-              <a:rPr lang="en-GB" dirty="0">
-                <a:solidFill>
-                  <a:srgbClr val="000000"/>
-                </a:solidFill>
-                <a:cs typeface="Courier New"/>
-              </a:rPr>
-              <a:t>)</a:t>
-            </a:r>
-            <a:endParaRPr lang="en-GB" dirty="0">
-              <a:solidFill>
-                <a:srgbClr val="3366FF"/>
-              </a:solidFill>
-              <a:cs typeface="Courier New"/>
-            </a:endParaRPr>
+              <a:rPr lang="en-GB" dirty="0"/>
+              <a:t>option)</a:t>
+            </a:r>
           </a:p>
         </p:txBody>
       </p:sp>
@@ -6302,10 +6402,15 @@
             <p:ph idx="1"/>
           </p:nvPr>
         </p:nvSpPr>
-        <p:spPr/>
+        <p:spPr>
+          <a:xfrm>
+            <a:off x="457200" y="1600200"/>
+            <a:ext cx="8229600" cy="4857750"/>
+          </a:xfrm>
+        </p:spPr>
         <p:txBody>
           <a:bodyPr>
-            <a:normAutofit fontScale="92500" lnSpcReduction="10000"/>
+            <a:normAutofit fontScale="85000" lnSpcReduction="20000"/>
           </a:bodyPr>
           <a:lstStyle/>
           <a:p>
@@ -6313,6 +6418,10 @@
               <a:rPr lang="en-GB" dirty="0"/>
               <a:t>OpenCL 1.2 gives more control over the build process by adding two new functions:</a:t>
             </a:r>
+            <a:br>
+              <a:rPr lang="en-GB" dirty="0"/>
+            </a:br>
+            <a:endParaRPr lang="en-GB" dirty="0"/>
           </a:p>
           <a:p>
             <a:pPr marL="400050" lvl="1" indent="0">
@@ -6368,6 +6477,12 @@
               </a:rPr>
               <a:t>(context, …, programs);</a:t>
             </a:r>
+            <a:br>
+              <a:rPr lang="en-GB" b="1" dirty="0">
+                <a:latin typeface="Courier New"/>
+                <a:cs typeface="Courier New"/>
+              </a:rPr>
+            </a:br>
             <a:endParaRPr lang="en-GB" b="1" dirty="0">
               <a:solidFill>
                 <a:srgbClr val="3366FF"/>
@@ -6377,9 +6492,7 @@
             </a:endParaRPr>
           </a:p>
           <a:p>
-            <a:pPr marL="400050" lvl="1" indent="0">
-              <a:buNone/>
-            </a:pPr>
+            <a:pPr marL="361950" indent="-361950"/>
             <a:r>
               <a:rPr lang="en-GB" dirty="0"/>
               <a:t>This enables the creation of libraries of compiled OpenCL functions, that can be linked to multiple program objects</a:t>
@@ -15905,7 +16018,7 @@
         <p:spPr>
           <a:xfrm>
             <a:off x="175364" y="1417638"/>
-            <a:ext cx="8968636" cy="4211877"/>
+            <a:ext cx="8968636" cy="5440362"/>
           </a:xfrm>
         </p:spPr>
         <p:txBody>
@@ -15915,7 +16028,7 @@
           <a:lstStyle/>
           <a:p>
             <a:r>
-              <a:rPr lang="en-GB" sz="1300" dirty="0"/>
+              <a:rPr lang="en-GB" sz="1600" b="1" dirty="0"/>
               <a:t>Retrieving the binary:</a:t>
             </a:r>
           </a:p>
@@ -16222,7 +16335,7 @@
           </a:p>
           <a:p>
             <a:r>
-              <a:rPr lang="en-GB" sz="1300" dirty="0"/>
+              <a:rPr lang="en-GB" sz="1600" b="1" dirty="0"/>
               <a:t>Loading the binary</a:t>
             </a:r>
           </a:p>
@@ -16305,7 +16418,21 @@
                 <a:latin typeface="Courier New"/>
                 <a:cs typeface="Courier New"/>
               </a:rPr>
-              <a:t>(context, 1, devices, &amp;size, &amp;binaries, NULL, NULL);</a:t>
+              <a:t>(context, 1, devices, &amp;size, &amp;</a:t>
+            </a:r>
+            <a:r>
+              <a:rPr lang="en-GB" sz="1300" b="1" dirty="0" err="1">
+                <a:latin typeface="Courier New"/>
+                <a:cs typeface="Courier New"/>
+              </a:rPr>
+              <a:t>binaries,NULL,NULL</a:t>
+            </a:r>
+            <a:r>
+              <a:rPr lang="en-GB" sz="1300" b="1" dirty="0">
+                <a:latin typeface="Courier New"/>
+                <a:cs typeface="Courier New"/>
+              </a:rPr>
+              <a:t>);</a:t>
             </a:r>
           </a:p>
           <a:p>

</xml_diff>

<commit_message>
Added page numbers and some more run details
</commit_message>
<xml_diff>
--- a/advanced_part2.pptx
+++ b/advanced_part2.pptx
@@ -238,7 +238,7 @@
           <a:p>
             <a:fld id="{7FB74D45-CC88-7D46-9D48-9989C6A85D58}" type="datetimeFigureOut">
               <a:rPr lang="en-US" smtClean="0"/>
-              <a:t>11/22/18</a:t>
+              <a:t>11/25/18</a:t>
             </a:fld>
             <a:endParaRPr lang="en-US"/>
           </a:p>
@@ -1734,9 +1734,9 @@
           <a:bodyPr/>
           <a:lstStyle/>
           <a:p>
-            <a:fld id="{D735EA19-98D7-5F47-83EC-D97C4239F8D5}" type="datetimeFigureOut">
-              <a:rPr lang="en-US" smtClean="0"/>
-              <a:t>11/22/18</a:t>
+            <a:fld id="{98B7218E-8A9E-214E-AD19-AE634911F270}" type="datetime1">
+              <a:rPr lang="en-GB" smtClean="0"/>
+              <a:t>25/11/2018</a:t>
             </a:fld>
             <a:endParaRPr lang="en-GB"/>
           </a:p>
@@ -1902,9 +1902,9 @@
           <a:bodyPr/>
           <a:lstStyle/>
           <a:p>
-            <a:fld id="{D735EA19-98D7-5F47-83EC-D97C4239F8D5}" type="datetimeFigureOut">
-              <a:rPr lang="en-US" smtClean="0"/>
-              <a:t>11/22/18</a:t>
+            <a:fld id="{AA991B60-00D2-2343-80A7-DF08911EB882}" type="datetime1">
+              <a:rPr lang="en-GB" smtClean="0"/>
+              <a:t>25/11/2018</a:t>
             </a:fld>
             <a:endParaRPr lang="en-GB"/>
           </a:p>
@@ -2080,9 +2080,9 @@
           <a:bodyPr/>
           <a:lstStyle/>
           <a:p>
-            <a:fld id="{D735EA19-98D7-5F47-83EC-D97C4239F8D5}" type="datetimeFigureOut">
-              <a:rPr lang="en-US" smtClean="0"/>
-              <a:t>11/22/18</a:t>
+            <a:fld id="{79F2F4DC-ECDA-1B4B-A55A-19C765AB0936}" type="datetime1">
+              <a:rPr lang="en-GB" smtClean="0"/>
+              <a:t>25/11/2018</a:t>
             </a:fld>
             <a:endParaRPr lang="en-GB"/>
           </a:p>
@@ -2248,9 +2248,9 @@
           <a:bodyPr/>
           <a:lstStyle/>
           <a:p>
-            <a:fld id="{D735EA19-98D7-5F47-83EC-D97C4239F8D5}" type="datetimeFigureOut">
-              <a:rPr lang="en-US" smtClean="0"/>
-              <a:t>11/22/18</a:t>
+            <a:fld id="{E10EB459-D562-FA41-9CCB-2AF59A37850A}" type="datetime1">
+              <a:rPr lang="en-GB" smtClean="0"/>
+              <a:t>25/11/2018</a:t>
             </a:fld>
             <a:endParaRPr lang="en-GB"/>
           </a:p>
@@ -2493,9 +2493,9 @@
           <a:bodyPr/>
           <a:lstStyle/>
           <a:p>
-            <a:fld id="{D735EA19-98D7-5F47-83EC-D97C4239F8D5}" type="datetimeFigureOut">
-              <a:rPr lang="en-US" smtClean="0"/>
-              <a:t>11/22/18</a:t>
+            <a:fld id="{FF74A8AB-ACA2-0A4A-9324-7ABD14604470}" type="datetime1">
+              <a:rPr lang="en-GB" smtClean="0"/>
+              <a:t>25/11/2018</a:t>
             </a:fld>
             <a:endParaRPr lang="en-GB"/>
           </a:p>
@@ -2778,9 +2778,9 @@
           <a:bodyPr/>
           <a:lstStyle/>
           <a:p>
-            <a:fld id="{D735EA19-98D7-5F47-83EC-D97C4239F8D5}" type="datetimeFigureOut">
-              <a:rPr lang="en-US" smtClean="0"/>
-              <a:t>11/22/18</a:t>
+            <a:fld id="{BD56FB53-7A18-374A-9D53-928831CF7E8F}" type="datetime1">
+              <a:rPr lang="en-GB" smtClean="0"/>
+              <a:t>25/11/2018</a:t>
             </a:fld>
             <a:endParaRPr lang="en-GB"/>
           </a:p>
@@ -3197,9 +3197,9 @@
           <a:bodyPr/>
           <a:lstStyle/>
           <a:p>
-            <a:fld id="{D735EA19-98D7-5F47-83EC-D97C4239F8D5}" type="datetimeFigureOut">
-              <a:rPr lang="en-US" smtClean="0"/>
-              <a:t>11/22/18</a:t>
+            <a:fld id="{413DD57C-1454-CB46-ACCC-5F4CB268C6FE}" type="datetime1">
+              <a:rPr lang="en-GB" smtClean="0"/>
+              <a:t>25/11/2018</a:t>
             </a:fld>
             <a:endParaRPr lang="en-GB"/>
           </a:p>
@@ -3314,9 +3314,9 @@
           <a:bodyPr/>
           <a:lstStyle/>
           <a:p>
-            <a:fld id="{D735EA19-98D7-5F47-83EC-D97C4239F8D5}" type="datetimeFigureOut">
-              <a:rPr lang="en-US" smtClean="0"/>
-              <a:t>11/22/18</a:t>
+            <a:fld id="{59D2FC35-1ADA-B44B-BA66-EAFF9F83A6FA}" type="datetime1">
+              <a:rPr lang="en-GB" smtClean="0"/>
+              <a:t>25/11/2018</a:t>
             </a:fld>
             <a:endParaRPr lang="en-GB"/>
           </a:p>
@@ -3409,9 +3409,9 @@
           <a:bodyPr/>
           <a:lstStyle/>
           <a:p>
-            <a:fld id="{D735EA19-98D7-5F47-83EC-D97C4239F8D5}" type="datetimeFigureOut">
-              <a:rPr lang="en-US" smtClean="0"/>
-              <a:t>11/22/18</a:t>
+            <a:fld id="{61A51BD4-1821-E541-8C0D-147BB6BF4448}" type="datetime1">
+              <a:rPr lang="en-GB" smtClean="0"/>
+              <a:t>25/11/2018</a:t>
             </a:fld>
             <a:endParaRPr lang="en-GB"/>
           </a:p>
@@ -3684,9 +3684,9 @@
           <a:bodyPr/>
           <a:lstStyle/>
           <a:p>
-            <a:fld id="{D735EA19-98D7-5F47-83EC-D97C4239F8D5}" type="datetimeFigureOut">
-              <a:rPr lang="en-US" smtClean="0"/>
-              <a:t>11/22/18</a:t>
+            <a:fld id="{BEF9BA88-43D2-2E48-A2BB-52A4AEC31D51}" type="datetime1">
+              <a:rPr lang="en-GB" smtClean="0"/>
+              <a:t>25/11/2018</a:t>
             </a:fld>
             <a:endParaRPr lang="en-GB"/>
           </a:p>
@@ -3936,9 +3936,9 @@
           <a:bodyPr/>
           <a:lstStyle/>
           <a:p>
-            <a:fld id="{D735EA19-98D7-5F47-83EC-D97C4239F8D5}" type="datetimeFigureOut">
-              <a:rPr lang="en-US" smtClean="0"/>
-              <a:t>11/22/18</a:t>
+            <a:fld id="{DA316296-312D-764B-BF60-CABC8F3C2E8E}" type="datetime1">
+              <a:rPr lang="en-GB" smtClean="0"/>
+              <a:t>25/11/2018</a:t>
             </a:fld>
             <a:endParaRPr lang="en-GB"/>
           </a:p>
@@ -4147,9 +4147,9 @@
             </a:lvl1pPr>
           </a:lstStyle>
           <a:p>
-            <a:fld id="{D735EA19-98D7-5F47-83EC-D97C4239F8D5}" type="datetimeFigureOut">
-              <a:rPr lang="en-US" smtClean="0"/>
-              <a:t>11/22/18</a:t>
+            <a:fld id="{593728D0-71E1-F948-8215-937DF37E15C5}" type="datetime1">
+              <a:rPr lang="en-GB" smtClean="0"/>
+              <a:t>25/11/2018</a:t>
             </a:fld>
             <a:endParaRPr lang="en-GB"/>
           </a:p>
@@ -4254,6 +4254,7 @@
     <p:sldLayoutId id="2147483658" r:id="rId10"/>
     <p:sldLayoutId id="2147483659" r:id="rId11"/>
   </p:sldLayoutIdLst>
+  <p:hf hdr="0" ftr="0" dt="0"/>
   <p:txStyles>
     <p:titleStyle>
       <a:lvl1pPr algn="ctr" defTabSz="457200" rtl="0" eaLnBrk="1" latinLnBrk="0" hangingPunct="1">
@@ -4579,6 +4580,35 @@
           </a:p>
         </p:txBody>
       </p:sp>
+      <p:sp>
+        <p:nvSpPr>
+          <p:cNvPr id="2" name="Slide Number Placeholder 1">
+            <a:extLst>
+              <a:ext uri="{FF2B5EF4-FFF2-40B4-BE49-F238E27FC236}">
+                <a16:creationId xmlns:a16="http://schemas.microsoft.com/office/drawing/2014/main" id="{903A57DF-C312-B848-8716-9F2C75BD0B7C}"/>
+              </a:ext>
+            </a:extLst>
+          </p:cNvPr>
+          <p:cNvSpPr>
+            <a:spLocks noGrp="1"/>
+          </p:cNvSpPr>
+          <p:nvPr>
+            <p:ph type="sldNum" sz="quarter" idx="12"/>
+          </p:nvPr>
+        </p:nvSpPr>
+        <p:spPr/>
+        <p:txBody>
+          <a:bodyPr/>
+          <a:lstStyle/>
+          <a:p>
+            <a:fld id="{412843D3-244E-7B40-8F83-4C5ACBCBD5F2}" type="slidenum">
+              <a:rPr lang="en-GB" smtClean="0"/>
+              <a:t>1</a:t>
+            </a:fld>
+            <a:endParaRPr lang="en-GB"/>
+          </a:p>
+        </p:txBody>
+      </p:sp>
     </p:spTree>
     <p:extLst>
       <p:ext uri="{BB962C8B-B14F-4D97-AF65-F5344CB8AC3E}">
@@ -4735,6 +4765,35 @@
               <a:rPr lang="en-GB" dirty="0"/>
               <a:t>either when creating the program or building it</a:t>
             </a:r>
+          </a:p>
+        </p:txBody>
+      </p:sp>
+      <p:sp>
+        <p:nvSpPr>
+          <p:cNvPr id="4" name="Slide Number Placeholder 3">
+            <a:extLst>
+              <a:ext uri="{FF2B5EF4-FFF2-40B4-BE49-F238E27FC236}">
+                <a16:creationId xmlns:a16="http://schemas.microsoft.com/office/drawing/2014/main" id="{37EDC23E-53A4-8E4C-8C13-3C396266FB7B}"/>
+              </a:ext>
+            </a:extLst>
+          </p:cNvPr>
+          <p:cNvSpPr>
+            <a:spLocks noGrp="1"/>
+          </p:cNvSpPr>
+          <p:nvPr>
+            <p:ph type="sldNum" sz="quarter" idx="12"/>
+          </p:nvPr>
+        </p:nvSpPr>
+        <p:spPr/>
+        <p:txBody>
+          <a:bodyPr/>
+          <a:lstStyle/>
+          <a:p>
+            <a:fld id="{412843D3-244E-7B40-8F83-4C5ACBCBD5F2}" type="slidenum">
+              <a:rPr lang="en-GB" smtClean="0"/>
+              <a:t>10</a:t>
+            </a:fld>
+            <a:endParaRPr lang="en-GB"/>
           </a:p>
         </p:txBody>
       </p:sp>
@@ -4941,6 +5000,35 @@
           <a:extLst/>
         </p:spPr>
       </p:pic>
+      <p:sp>
+        <p:nvSpPr>
+          <p:cNvPr id="4" name="Slide Number Placeholder 3">
+            <a:extLst>
+              <a:ext uri="{FF2B5EF4-FFF2-40B4-BE49-F238E27FC236}">
+                <a16:creationId xmlns:a16="http://schemas.microsoft.com/office/drawing/2014/main" id="{591B9DB3-D82A-5240-841F-B3913881081E}"/>
+              </a:ext>
+            </a:extLst>
+          </p:cNvPr>
+          <p:cNvSpPr>
+            <a:spLocks noGrp="1"/>
+          </p:cNvSpPr>
+          <p:nvPr>
+            <p:ph type="sldNum" sz="quarter" idx="12"/>
+          </p:nvPr>
+        </p:nvSpPr>
+        <p:spPr/>
+        <p:txBody>
+          <a:bodyPr/>
+          <a:lstStyle/>
+          <a:p>
+            <a:fld id="{412843D3-244E-7B40-8F83-4C5ACBCBD5F2}" type="slidenum">
+              <a:rPr lang="en-GB" smtClean="0"/>
+              <a:t>11</a:t>
+            </a:fld>
+            <a:endParaRPr lang="en-GB"/>
+          </a:p>
+        </p:txBody>
+      </p:sp>
     </p:spTree>
     <p:extLst>
       <p:ext uri="{BB962C8B-B14F-4D97-AF65-F5344CB8AC3E}">
@@ -5209,6 +5297,35 @@
               <a:t>http://github.khronos.org</a:t>
             </a:r>
             <a:endParaRPr lang="en-GB" b="1" dirty="0"/>
+          </a:p>
+        </p:txBody>
+      </p:sp>
+      <p:sp>
+        <p:nvSpPr>
+          <p:cNvPr id="4" name="Slide Number Placeholder 3">
+            <a:extLst>
+              <a:ext uri="{FF2B5EF4-FFF2-40B4-BE49-F238E27FC236}">
+                <a16:creationId xmlns:a16="http://schemas.microsoft.com/office/drawing/2014/main" id="{3B8FC37D-9EE5-9145-98F0-141DCECA15C9}"/>
+              </a:ext>
+            </a:extLst>
+          </p:cNvPr>
+          <p:cNvSpPr>
+            <a:spLocks noGrp="1"/>
+          </p:cNvSpPr>
+          <p:nvPr>
+            <p:ph type="sldNum" sz="quarter" idx="12"/>
+          </p:nvPr>
+        </p:nvSpPr>
+        <p:spPr/>
+        <p:txBody>
+          <a:bodyPr/>
+          <a:lstStyle/>
+          <a:p>
+            <a:fld id="{412843D3-244E-7B40-8F83-4C5ACBCBD5F2}" type="slidenum">
+              <a:rPr lang="en-GB" smtClean="0"/>
+              <a:t>12</a:t>
+            </a:fld>
+            <a:endParaRPr lang="en-GB"/>
           </a:p>
         </p:txBody>
       </p:sp>
@@ -5364,6 +5481,35 @@
           </a:p>
         </p:txBody>
       </p:sp>
+      <p:sp>
+        <p:nvSpPr>
+          <p:cNvPr id="3" name="Slide Number Placeholder 2">
+            <a:extLst>
+              <a:ext uri="{FF2B5EF4-FFF2-40B4-BE49-F238E27FC236}">
+                <a16:creationId xmlns:a16="http://schemas.microsoft.com/office/drawing/2014/main" id="{7A99F899-1634-EB48-B22D-4849661F157B}"/>
+              </a:ext>
+            </a:extLst>
+          </p:cNvPr>
+          <p:cNvSpPr>
+            <a:spLocks noGrp="1"/>
+          </p:cNvSpPr>
+          <p:nvPr>
+            <p:ph type="sldNum" sz="quarter" idx="12"/>
+          </p:nvPr>
+        </p:nvSpPr>
+        <p:spPr/>
+        <p:txBody>
+          <a:bodyPr/>
+          <a:lstStyle/>
+          <a:p>
+            <a:fld id="{412843D3-244E-7B40-8F83-4C5ACBCBD5F2}" type="slidenum">
+              <a:rPr lang="en-GB" smtClean="0"/>
+              <a:t>13</a:t>
+            </a:fld>
+            <a:endParaRPr lang="en-GB"/>
+          </a:p>
+        </p:txBody>
+      </p:sp>
     </p:spTree>
     <p:extLst>
       <p:ext uri="{BB962C8B-B14F-4D97-AF65-F5344CB8AC3E}">
@@ -5528,6 +5674,35 @@
           </a:p>
         </p:txBody>
       </p:sp>
+      <p:sp>
+        <p:nvSpPr>
+          <p:cNvPr id="4" name="Slide Number Placeholder 3">
+            <a:extLst>
+              <a:ext uri="{FF2B5EF4-FFF2-40B4-BE49-F238E27FC236}">
+                <a16:creationId xmlns:a16="http://schemas.microsoft.com/office/drawing/2014/main" id="{5CD89741-4315-EB40-95D4-97D2571E108C}"/>
+              </a:ext>
+            </a:extLst>
+          </p:cNvPr>
+          <p:cNvSpPr>
+            <a:spLocks noGrp="1"/>
+          </p:cNvSpPr>
+          <p:nvPr>
+            <p:ph type="sldNum" sz="quarter" idx="12"/>
+          </p:nvPr>
+        </p:nvSpPr>
+        <p:spPr/>
+        <p:txBody>
+          <a:bodyPr/>
+          <a:lstStyle/>
+          <a:p>
+            <a:fld id="{412843D3-244E-7B40-8F83-4C5ACBCBD5F2}" type="slidenum">
+              <a:rPr lang="en-GB" smtClean="0"/>
+              <a:t>14</a:t>
+            </a:fld>
+            <a:endParaRPr lang="en-GB"/>
+          </a:p>
+        </p:txBody>
+      </p:sp>
     </p:spTree>
     <p:extLst>
       <p:ext uri="{BB962C8B-B14F-4D97-AF65-F5344CB8AC3E}">
@@ -5616,6 +5791,35 @@
           </a:p>
         </p:txBody>
       </p:sp>
+      <p:sp>
+        <p:nvSpPr>
+          <p:cNvPr id="4" name="Slide Number Placeholder 3">
+            <a:extLst>
+              <a:ext uri="{FF2B5EF4-FFF2-40B4-BE49-F238E27FC236}">
+                <a16:creationId xmlns:a16="http://schemas.microsoft.com/office/drawing/2014/main" id="{9D6E4E37-57DD-494C-A892-8146AA5A61E6}"/>
+              </a:ext>
+            </a:extLst>
+          </p:cNvPr>
+          <p:cNvSpPr>
+            <a:spLocks noGrp="1"/>
+          </p:cNvSpPr>
+          <p:nvPr>
+            <p:ph type="sldNum" sz="quarter" idx="12"/>
+          </p:nvPr>
+        </p:nvSpPr>
+        <p:spPr/>
+        <p:txBody>
+          <a:bodyPr/>
+          <a:lstStyle/>
+          <a:p>
+            <a:fld id="{412843D3-244E-7B40-8F83-4C5ACBCBD5F2}" type="slidenum">
+              <a:rPr lang="en-GB" smtClean="0"/>
+              <a:t>15</a:t>
+            </a:fld>
+            <a:endParaRPr lang="en-GB"/>
+          </a:p>
+        </p:txBody>
+      </p:sp>
     </p:spTree>
     <p:extLst>
       <p:ext uri="{BB962C8B-B14F-4D97-AF65-F5344CB8AC3E}">
@@ -5891,6 +6095,35 @@
           </a:p>
         </p:txBody>
       </p:sp>
+      <p:sp>
+        <p:nvSpPr>
+          <p:cNvPr id="4" name="Slide Number Placeholder 3">
+            <a:extLst>
+              <a:ext uri="{FF2B5EF4-FFF2-40B4-BE49-F238E27FC236}">
+                <a16:creationId xmlns:a16="http://schemas.microsoft.com/office/drawing/2014/main" id="{B7B4EE57-B314-004B-8DA3-87844E2F52F6}"/>
+              </a:ext>
+            </a:extLst>
+          </p:cNvPr>
+          <p:cNvSpPr>
+            <a:spLocks noGrp="1"/>
+          </p:cNvSpPr>
+          <p:nvPr>
+            <p:ph type="sldNum" sz="quarter" idx="12"/>
+          </p:nvPr>
+        </p:nvSpPr>
+        <p:spPr/>
+        <p:txBody>
+          <a:bodyPr/>
+          <a:lstStyle/>
+          <a:p>
+            <a:fld id="{412843D3-244E-7B40-8F83-4C5ACBCBD5F2}" type="slidenum">
+              <a:rPr lang="en-GB" smtClean="0"/>
+              <a:t>16</a:t>
+            </a:fld>
+            <a:endParaRPr lang="en-GB"/>
+          </a:p>
+        </p:txBody>
+      </p:sp>
     </p:spTree>
     <p:extLst>
       <p:ext uri="{BB962C8B-B14F-4D97-AF65-F5344CB8AC3E}">
@@ -6190,6 +6423,35 @@
           </a:p>
         </p:txBody>
       </p:sp>
+      <p:sp>
+        <p:nvSpPr>
+          <p:cNvPr id="4" name="Slide Number Placeholder 3">
+            <a:extLst>
+              <a:ext uri="{FF2B5EF4-FFF2-40B4-BE49-F238E27FC236}">
+                <a16:creationId xmlns:a16="http://schemas.microsoft.com/office/drawing/2014/main" id="{C1351C7F-55F5-1B48-9AB3-BF4B55B95393}"/>
+              </a:ext>
+            </a:extLst>
+          </p:cNvPr>
+          <p:cNvSpPr>
+            <a:spLocks noGrp="1"/>
+          </p:cNvSpPr>
+          <p:nvPr>
+            <p:ph type="sldNum" sz="quarter" idx="12"/>
+          </p:nvPr>
+        </p:nvSpPr>
+        <p:spPr/>
+        <p:txBody>
+          <a:bodyPr/>
+          <a:lstStyle/>
+          <a:p>
+            <a:fld id="{412843D3-244E-7B40-8F83-4C5ACBCBD5F2}" type="slidenum">
+              <a:rPr lang="en-GB" smtClean="0"/>
+              <a:t>17</a:t>
+            </a:fld>
+            <a:endParaRPr lang="en-GB"/>
+          </a:p>
+        </p:txBody>
+      </p:sp>
     </p:spTree>
     <p:extLst>
       <p:ext uri="{BB962C8B-B14F-4D97-AF65-F5344CB8AC3E}">
@@ -6338,6 +6600,35 @@
           </a:p>
         </p:txBody>
       </p:sp>
+      <p:sp>
+        <p:nvSpPr>
+          <p:cNvPr id="4" name="Slide Number Placeholder 3">
+            <a:extLst>
+              <a:ext uri="{FF2B5EF4-FFF2-40B4-BE49-F238E27FC236}">
+                <a16:creationId xmlns:a16="http://schemas.microsoft.com/office/drawing/2014/main" id="{B0959576-D9F1-894B-B4AD-654D6221FCD9}"/>
+              </a:ext>
+            </a:extLst>
+          </p:cNvPr>
+          <p:cNvSpPr>
+            <a:spLocks noGrp="1"/>
+          </p:cNvSpPr>
+          <p:nvPr>
+            <p:ph type="sldNum" sz="quarter" idx="12"/>
+          </p:nvPr>
+        </p:nvSpPr>
+        <p:spPr/>
+        <p:txBody>
+          <a:bodyPr/>
+          <a:lstStyle/>
+          <a:p>
+            <a:fld id="{412843D3-244E-7B40-8F83-4C5ACBCBD5F2}" type="slidenum">
+              <a:rPr lang="en-GB" smtClean="0"/>
+              <a:t>18</a:t>
+            </a:fld>
+            <a:endParaRPr lang="en-GB"/>
+          </a:p>
+        </p:txBody>
+      </p:sp>
     </p:spTree>
     <p:extLst>
       <p:ext uri="{BB962C8B-B14F-4D97-AF65-F5344CB8AC3E}">
@@ -6405,12 +6696,12 @@
         <p:spPr>
           <a:xfrm>
             <a:off x="457200" y="1600200"/>
-            <a:ext cx="8229600" cy="4857750"/>
+            <a:ext cx="8686800" cy="4857750"/>
           </a:xfrm>
         </p:spPr>
         <p:txBody>
           <a:bodyPr>
-            <a:normAutofit fontScale="85000" lnSpcReduction="20000"/>
+            <a:normAutofit fontScale="85000" lnSpcReduction="10000"/>
           </a:bodyPr>
           <a:lstStyle/>
           <a:p>
@@ -6475,7 +6766,7 @@
                 <a:latin typeface="Courier New"/>
                 <a:cs typeface="Courier New"/>
               </a:rPr>
-              <a:t>(context, …, programs);</a:t>
+              <a:t>(context,…,programs);</a:t>
             </a:r>
             <a:br>
               <a:rPr lang="en-GB" b="1" dirty="0">
@@ -6503,6 +6794,35 @@
               <a:rPr lang="en-GB" dirty="0"/>
               <a:t>Can improve program build times, by allowing code shared across multiple programs to be extracted into a common library</a:t>
             </a:r>
+          </a:p>
+        </p:txBody>
+      </p:sp>
+      <p:sp>
+        <p:nvSpPr>
+          <p:cNvPr id="4" name="Slide Number Placeholder 3">
+            <a:extLst>
+              <a:ext uri="{FF2B5EF4-FFF2-40B4-BE49-F238E27FC236}">
+                <a16:creationId xmlns:a16="http://schemas.microsoft.com/office/drawing/2014/main" id="{9ED840FC-7158-7844-8857-BCB7E34A5433}"/>
+              </a:ext>
+            </a:extLst>
+          </p:cNvPr>
+          <p:cNvSpPr>
+            <a:spLocks noGrp="1"/>
+          </p:cNvSpPr>
+          <p:nvPr>
+            <p:ph type="sldNum" sz="quarter" idx="12"/>
+          </p:nvPr>
+        </p:nvSpPr>
+        <p:spPr/>
+        <p:txBody>
+          <a:bodyPr/>
+          <a:lstStyle/>
+          <a:p>
+            <a:fld id="{412843D3-244E-7B40-8F83-4C5ACBCBD5F2}" type="slidenum">
+              <a:rPr lang="en-GB" smtClean="0"/>
+              <a:t>19</a:t>
+            </a:fld>
+            <a:endParaRPr lang="en-GB"/>
           </a:p>
         </p:txBody>
       </p:sp>
@@ -6683,6 +7003,35 @@
               <a:latin typeface="Courier New"/>
               <a:cs typeface="Courier New"/>
             </a:endParaRPr>
+          </a:p>
+        </p:txBody>
+      </p:sp>
+      <p:sp>
+        <p:nvSpPr>
+          <p:cNvPr id="4" name="Slide Number Placeholder 3">
+            <a:extLst>
+              <a:ext uri="{FF2B5EF4-FFF2-40B4-BE49-F238E27FC236}">
+                <a16:creationId xmlns:a16="http://schemas.microsoft.com/office/drawing/2014/main" id="{63BB8E37-FEC1-2241-8A7C-EB83C32E5739}"/>
+              </a:ext>
+            </a:extLst>
+          </p:cNvPr>
+          <p:cNvSpPr>
+            <a:spLocks noGrp="1"/>
+          </p:cNvSpPr>
+          <p:nvPr>
+            <p:ph type="sldNum" sz="quarter" idx="12"/>
+          </p:nvPr>
+        </p:nvSpPr>
+        <p:spPr/>
+        <p:txBody>
+          <a:bodyPr/>
+          <a:lstStyle/>
+          <a:p>
+            <a:fld id="{412843D3-244E-7B40-8F83-4C5ACBCBD5F2}" type="slidenum">
+              <a:rPr lang="en-GB" smtClean="0"/>
+              <a:t>2</a:t>
+            </a:fld>
+            <a:endParaRPr lang="en-GB"/>
           </a:p>
         </p:txBody>
       </p:sp>
@@ -7031,6 +7380,35 @@
               </a:rPr>
               <a:t>implies</a:t>
             </a:r>
+          </a:p>
+        </p:txBody>
+      </p:sp>
+      <p:sp>
+        <p:nvSpPr>
+          <p:cNvPr id="4" name="Slide Number Placeholder 3">
+            <a:extLst>
+              <a:ext uri="{FF2B5EF4-FFF2-40B4-BE49-F238E27FC236}">
+                <a16:creationId xmlns:a16="http://schemas.microsoft.com/office/drawing/2014/main" id="{481DC221-3482-9A4E-993D-546071F5433E}"/>
+              </a:ext>
+            </a:extLst>
+          </p:cNvPr>
+          <p:cNvSpPr>
+            <a:spLocks noGrp="1"/>
+          </p:cNvSpPr>
+          <p:nvPr>
+            <p:ph type="sldNum" sz="quarter" idx="12"/>
+          </p:nvPr>
+        </p:nvSpPr>
+        <p:spPr/>
+        <p:txBody>
+          <a:bodyPr/>
+          <a:lstStyle/>
+          <a:p>
+            <a:fld id="{412843D3-244E-7B40-8F83-4C5ACBCBD5F2}" type="slidenum">
+              <a:rPr lang="en-GB" smtClean="0"/>
+              <a:t>20</a:t>
+            </a:fld>
+            <a:endParaRPr lang="en-GB"/>
           </a:p>
         </p:txBody>
       </p:sp>
@@ -7405,6 +7783,35 @@
           </a:p>
         </p:txBody>
       </p:sp>
+      <p:sp>
+        <p:nvSpPr>
+          <p:cNvPr id="4" name="Slide Number Placeholder 3">
+            <a:extLst>
+              <a:ext uri="{FF2B5EF4-FFF2-40B4-BE49-F238E27FC236}">
+                <a16:creationId xmlns:a16="http://schemas.microsoft.com/office/drawing/2014/main" id="{ED3C3B0B-25C8-424B-9464-5DFD5B22BD30}"/>
+              </a:ext>
+            </a:extLst>
+          </p:cNvPr>
+          <p:cNvSpPr>
+            <a:spLocks noGrp="1"/>
+          </p:cNvSpPr>
+          <p:nvPr>
+            <p:ph type="sldNum" sz="quarter" idx="12"/>
+          </p:nvPr>
+        </p:nvSpPr>
+        <p:spPr/>
+        <p:txBody>
+          <a:bodyPr/>
+          <a:lstStyle/>
+          <a:p>
+            <a:fld id="{412843D3-244E-7B40-8F83-4C5ACBCBD5F2}" type="slidenum">
+              <a:rPr lang="en-GB" smtClean="0"/>
+              <a:t>21</a:t>
+            </a:fld>
+            <a:endParaRPr lang="en-GB"/>
+          </a:p>
+        </p:txBody>
+      </p:sp>
     </p:spTree>
     <p:extLst>
       <p:ext uri="{BB962C8B-B14F-4D97-AF65-F5344CB8AC3E}">
@@ -7588,6 +7995,35 @@
           </a:p>
         </p:txBody>
       </p:sp>
+      <p:sp>
+        <p:nvSpPr>
+          <p:cNvPr id="2" name="Slide Number Placeholder 1">
+            <a:extLst>
+              <a:ext uri="{FF2B5EF4-FFF2-40B4-BE49-F238E27FC236}">
+                <a16:creationId xmlns:a16="http://schemas.microsoft.com/office/drawing/2014/main" id="{6B730AFA-0867-364E-AC8F-B9D302B2DA14}"/>
+              </a:ext>
+            </a:extLst>
+          </p:cNvPr>
+          <p:cNvSpPr>
+            <a:spLocks noGrp="1"/>
+          </p:cNvSpPr>
+          <p:nvPr>
+            <p:ph type="sldNum" sz="quarter" idx="12"/>
+          </p:nvPr>
+        </p:nvSpPr>
+        <p:spPr/>
+        <p:txBody>
+          <a:bodyPr/>
+          <a:lstStyle/>
+          <a:p>
+            <a:fld id="{412843D3-244E-7B40-8F83-4C5ACBCBD5F2}" type="slidenum">
+              <a:rPr lang="en-GB" smtClean="0"/>
+              <a:t>22</a:t>
+            </a:fld>
+            <a:endParaRPr lang="en-GB"/>
+          </a:p>
+        </p:txBody>
+      </p:sp>
     </p:spTree>
     <p:extLst>
       <p:ext uri="{BB962C8B-B14F-4D97-AF65-F5344CB8AC3E}">
@@ -7761,6 +8197,35 @@
               <a:latin typeface="Courier New"/>
               <a:cs typeface="Courier New"/>
             </a:endParaRPr>
+          </a:p>
+        </p:txBody>
+      </p:sp>
+      <p:sp>
+        <p:nvSpPr>
+          <p:cNvPr id="4" name="Slide Number Placeholder 3">
+            <a:extLst>
+              <a:ext uri="{FF2B5EF4-FFF2-40B4-BE49-F238E27FC236}">
+                <a16:creationId xmlns:a16="http://schemas.microsoft.com/office/drawing/2014/main" id="{4DB0A219-DF6E-8949-A1BE-100D6A3F0990}"/>
+              </a:ext>
+            </a:extLst>
+          </p:cNvPr>
+          <p:cNvSpPr>
+            <a:spLocks noGrp="1"/>
+          </p:cNvSpPr>
+          <p:nvPr>
+            <p:ph type="sldNum" sz="quarter" idx="12"/>
+          </p:nvPr>
+        </p:nvSpPr>
+        <p:spPr/>
+        <p:txBody>
+          <a:bodyPr/>
+          <a:lstStyle/>
+          <a:p>
+            <a:fld id="{412843D3-244E-7B40-8F83-4C5ACBCBD5F2}" type="slidenum">
+              <a:rPr lang="en-GB" smtClean="0"/>
+              <a:t>23</a:t>
+            </a:fld>
+            <a:endParaRPr lang="en-GB"/>
           </a:p>
         </p:txBody>
       </p:sp>
@@ -9011,6 +9476,35 @@
           </a:fontRef>
         </p:style>
       </p:cxnSp>
+      <p:sp>
+        <p:nvSpPr>
+          <p:cNvPr id="8" name="Slide Number Placeholder 7">
+            <a:extLst>
+              <a:ext uri="{FF2B5EF4-FFF2-40B4-BE49-F238E27FC236}">
+                <a16:creationId xmlns:a16="http://schemas.microsoft.com/office/drawing/2014/main" id="{81A4D5B1-86F1-B34B-AFDC-C40EF857601B}"/>
+              </a:ext>
+            </a:extLst>
+          </p:cNvPr>
+          <p:cNvSpPr>
+            <a:spLocks noGrp="1"/>
+          </p:cNvSpPr>
+          <p:nvPr>
+            <p:ph type="sldNum" sz="quarter" idx="12"/>
+          </p:nvPr>
+        </p:nvSpPr>
+        <p:spPr/>
+        <p:txBody>
+          <a:bodyPr/>
+          <a:lstStyle/>
+          <a:p>
+            <a:fld id="{412843D3-244E-7B40-8F83-4C5ACBCBD5F2}" type="slidenum">
+              <a:rPr lang="en-GB" smtClean="0"/>
+              <a:t>24</a:t>
+            </a:fld>
+            <a:endParaRPr lang="en-GB"/>
+          </a:p>
+        </p:txBody>
+      </p:sp>
     </p:spTree>
     <p:extLst>
       <p:ext uri="{BB962C8B-B14F-4D97-AF65-F5344CB8AC3E}">
@@ -10587,6 +11081,35 @@
           </a:fontRef>
         </p:style>
       </p:cxnSp>
+      <p:sp>
+        <p:nvSpPr>
+          <p:cNvPr id="8" name="Slide Number Placeholder 7">
+            <a:extLst>
+              <a:ext uri="{FF2B5EF4-FFF2-40B4-BE49-F238E27FC236}">
+                <a16:creationId xmlns:a16="http://schemas.microsoft.com/office/drawing/2014/main" id="{522E97C2-105C-FA45-A1A4-02049B3C0A9F}"/>
+              </a:ext>
+            </a:extLst>
+          </p:cNvPr>
+          <p:cNvSpPr>
+            <a:spLocks noGrp="1"/>
+          </p:cNvSpPr>
+          <p:nvPr>
+            <p:ph type="sldNum" sz="quarter" idx="12"/>
+          </p:nvPr>
+        </p:nvSpPr>
+        <p:spPr/>
+        <p:txBody>
+          <a:bodyPr/>
+          <a:lstStyle/>
+          <a:p>
+            <a:fld id="{412843D3-244E-7B40-8F83-4C5ACBCBD5F2}" type="slidenum">
+              <a:rPr lang="en-GB" smtClean="0"/>
+              <a:t>25</a:t>
+            </a:fld>
+            <a:endParaRPr lang="en-GB"/>
+          </a:p>
+        </p:txBody>
+      </p:sp>
     </p:spTree>
     <p:extLst>
       <p:ext uri="{BB962C8B-B14F-4D97-AF65-F5344CB8AC3E}">
@@ -11309,6 +11832,35 @@
           </a:p>
         </p:txBody>
       </p:sp>
+      <p:sp>
+        <p:nvSpPr>
+          <p:cNvPr id="4" name="Slide Number Placeholder 3">
+            <a:extLst>
+              <a:ext uri="{FF2B5EF4-FFF2-40B4-BE49-F238E27FC236}">
+                <a16:creationId xmlns:a16="http://schemas.microsoft.com/office/drawing/2014/main" id="{38EF515B-FCD1-144C-98E6-C84A0E82AA81}"/>
+              </a:ext>
+            </a:extLst>
+          </p:cNvPr>
+          <p:cNvSpPr>
+            <a:spLocks noGrp="1"/>
+          </p:cNvSpPr>
+          <p:nvPr>
+            <p:ph type="sldNum" sz="quarter" idx="12"/>
+          </p:nvPr>
+        </p:nvSpPr>
+        <p:spPr/>
+        <p:txBody>
+          <a:bodyPr/>
+          <a:lstStyle/>
+          <a:p>
+            <a:fld id="{412843D3-244E-7B40-8F83-4C5ACBCBD5F2}" type="slidenum">
+              <a:rPr lang="en-GB" smtClean="0"/>
+              <a:t>26</a:t>
+            </a:fld>
+            <a:endParaRPr lang="en-GB"/>
+          </a:p>
+        </p:txBody>
+      </p:sp>
     </p:spTree>
     <p:extLst>
       <p:ext uri="{BB962C8B-B14F-4D97-AF65-F5344CB8AC3E}">
@@ -12000,6 +12552,35 @@
               <a:buNone/>
             </a:pPr>
             <a:endParaRPr lang="en-GB" dirty="0"/>
+          </a:p>
+        </p:txBody>
+      </p:sp>
+      <p:sp>
+        <p:nvSpPr>
+          <p:cNvPr id="5" name="Slide Number Placeholder 4">
+            <a:extLst>
+              <a:ext uri="{FF2B5EF4-FFF2-40B4-BE49-F238E27FC236}">
+                <a16:creationId xmlns:a16="http://schemas.microsoft.com/office/drawing/2014/main" id="{63E0D4C6-49E1-8844-B5AD-0681D876BC7D}"/>
+              </a:ext>
+            </a:extLst>
+          </p:cNvPr>
+          <p:cNvSpPr>
+            <a:spLocks noGrp="1"/>
+          </p:cNvSpPr>
+          <p:nvPr>
+            <p:ph type="sldNum" sz="quarter" idx="12"/>
+          </p:nvPr>
+        </p:nvSpPr>
+        <p:spPr/>
+        <p:txBody>
+          <a:bodyPr/>
+          <a:lstStyle/>
+          <a:p>
+            <a:fld id="{412843D3-244E-7B40-8F83-4C5ACBCBD5F2}" type="slidenum">
+              <a:rPr lang="en-GB" smtClean="0"/>
+              <a:t>27</a:t>
+            </a:fld>
+            <a:endParaRPr lang="en-GB"/>
           </a:p>
         </p:txBody>
       </p:sp>
@@ -12553,6 +13134,35 @@
           </a:p>
         </p:txBody>
       </p:sp>
+      <p:sp>
+        <p:nvSpPr>
+          <p:cNvPr id="4" name="Slide Number Placeholder 3">
+            <a:extLst>
+              <a:ext uri="{FF2B5EF4-FFF2-40B4-BE49-F238E27FC236}">
+                <a16:creationId xmlns:a16="http://schemas.microsoft.com/office/drawing/2014/main" id="{53C61C04-83DE-6B4E-A1F6-7E4E6B64BA56}"/>
+              </a:ext>
+            </a:extLst>
+          </p:cNvPr>
+          <p:cNvSpPr>
+            <a:spLocks noGrp="1"/>
+          </p:cNvSpPr>
+          <p:nvPr>
+            <p:ph type="sldNum" sz="quarter" idx="12"/>
+          </p:nvPr>
+        </p:nvSpPr>
+        <p:spPr/>
+        <p:txBody>
+          <a:bodyPr/>
+          <a:lstStyle/>
+          <a:p>
+            <a:fld id="{412843D3-244E-7B40-8F83-4C5ACBCBD5F2}" type="slidenum">
+              <a:rPr lang="en-GB" smtClean="0"/>
+              <a:t>28</a:t>
+            </a:fld>
+            <a:endParaRPr lang="en-GB"/>
+          </a:p>
+        </p:txBody>
+      </p:sp>
     </p:spTree>
     <p:extLst>
       <p:ext uri="{BB962C8B-B14F-4D97-AF65-F5344CB8AC3E}">
@@ -12630,7 +13240,7 @@
         </p:spPr>
         <p:txBody>
           <a:bodyPr>
-            <a:normAutofit fontScale="70000" lnSpcReduction="20000"/>
+            <a:normAutofit fontScale="62500" lnSpcReduction="20000"/>
           </a:bodyPr>
           <a:lstStyle/>
           <a:p>
@@ -12641,15 +13251,88 @@
             </a:pPr>
             <a:r>
               <a:rPr lang="en-GB" dirty="0"/>
-              <a:t>Find the starting code in </a:t>
-            </a:r>
-            <a:r>
-              <a:rPr lang="en-GB" b="1" dirty="0">
-                <a:latin typeface="Courier New"/>
-                <a:cs typeface="Courier New"/>
-              </a:rPr>
-              <a:t>exercises/Bilateral</a:t>
-            </a:r>
+              <a:t>Find the starting code:</a:t>
+            </a:r>
+          </a:p>
+          <a:p>
+            <a:pPr marL="971550" lvl="1" indent="-514350">
+              <a:lnSpc>
+                <a:spcPct val="120000"/>
+              </a:lnSpc>
+              <a:buFont typeface="+mj-lt"/>
+              <a:buAutoNum type="arabicPeriod"/>
+            </a:pPr>
+            <a:r>
+              <a:rPr lang="en-GB" b="1" dirty="0">
+                <a:latin typeface="Courier New" panose="02070309020205020404" pitchFamily="49" charset="0"/>
+                <a:cs typeface="Courier New" panose="02070309020205020404" pitchFamily="49" charset="0"/>
+              </a:rPr>
+              <a:t>cd ~/</a:t>
+            </a:r>
+            <a:r>
+              <a:rPr lang="en-GB" b="1" dirty="0" err="1">
+                <a:latin typeface="Courier New" panose="02070309020205020404" pitchFamily="49" charset="0"/>
+                <a:cs typeface="Courier New" panose="02070309020205020404" pitchFamily="49" charset="0"/>
+              </a:rPr>
+              <a:t>opencl</a:t>
+            </a:r>
+            <a:r>
+              <a:rPr lang="en-GB" b="1" dirty="0">
+                <a:latin typeface="Courier New" panose="02070309020205020404" pitchFamily="49" charset="0"/>
+                <a:cs typeface="Courier New" panose="02070309020205020404" pitchFamily="49" charset="0"/>
+              </a:rPr>
+              <a:t>-training/exercises/Bilateral</a:t>
+            </a:r>
+          </a:p>
+          <a:p>
+            <a:pPr marL="971550" lvl="1" indent="-514350">
+              <a:lnSpc>
+                <a:spcPct val="120000"/>
+              </a:lnSpc>
+              <a:buFont typeface="+mj-lt"/>
+              <a:buAutoNum type="arabicPeriod"/>
+            </a:pPr>
+            <a:r>
+              <a:rPr lang="en-GB" b="1" dirty="0">
+                <a:latin typeface="Courier New" panose="02070309020205020404" pitchFamily="49" charset="0"/>
+                <a:cs typeface="Courier New" panose="02070309020205020404" pitchFamily="49" charset="0"/>
+              </a:rPr>
+              <a:t>make</a:t>
+            </a:r>
+          </a:p>
+          <a:p>
+            <a:pPr marL="971550" lvl="1" indent="-514350">
+              <a:lnSpc>
+                <a:spcPct val="120000"/>
+              </a:lnSpc>
+              <a:buFont typeface="+mj-lt"/>
+              <a:buAutoNum type="arabicPeriod"/>
+            </a:pPr>
+            <a:r>
+              <a:rPr lang="en-GB" b="1" dirty="0" err="1">
+                <a:latin typeface="Courier New" panose="02070309020205020404" pitchFamily="49" charset="0"/>
+                <a:cs typeface="Courier New" panose="02070309020205020404" pitchFamily="49" charset="0"/>
+              </a:rPr>
+              <a:t>qsub</a:t>
+            </a:r>
+            <a:r>
+              <a:rPr lang="en-GB" b="1" dirty="0">
+                <a:latin typeface="Courier New" panose="02070309020205020404" pitchFamily="49" charset="0"/>
+                <a:cs typeface="Courier New" panose="02070309020205020404" pitchFamily="49" charset="0"/>
+              </a:rPr>
+              <a:t> </a:t>
+            </a:r>
+            <a:r>
+              <a:rPr lang="en-GB" b="1" dirty="0" err="1">
+                <a:latin typeface="Courier New" panose="02070309020205020404" pitchFamily="49" charset="0"/>
+                <a:cs typeface="Courier New" panose="02070309020205020404" pitchFamily="49" charset="0"/>
+              </a:rPr>
+              <a:t>submit_bilateral</a:t>
+            </a:r>
+            <a:endParaRPr lang="en-GB" b="1" dirty="0">
+              <a:latin typeface="Courier New" panose="02070309020205020404" pitchFamily="49" charset="0"/>
+              <a:cs typeface="Courier New" panose="02070309020205020404" pitchFamily="49" charset="0"/>
+            </a:endParaRPr>
           </a:p>
           <a:p>
             <a:pPr>
@@ -12748,15 +13431,6 @@
               </a:lnSpc>
               <a:buNone/>
             </a:pPr>
-            <a:endParaRPr lang="en-GB" dirty="0"/>
-          </a:p>
-          <a:p>
-            <a:pPr marL="0" indent="0">
-              <a:lnSpc>
-                <a:spcPct val="120000"/>
-              </a:lnSpc>
-              <a:buNone/>
-            </a:pPr>
             <a:r>
               <a:rPr lang="en-GB" b="1" dirty="0"/>
               <a:t>Extra:</a:t>
@@ -12773,6 +13447,35 @@
               <a:rPr lang="en-GB" dirty="0"/>
               <a:t>Get the compiler to generate the assembly code and look through this, correlating it to your source code</a:t>
             </a:r>
+          </a:p>
+        </p:txBody>
+      </p:sp>
+      <p:sp>
+        <p:nvSpPr>
+          <p:cNvPr id="4" name="Slide Number Placeholder 3">
+            <a:extLst>
+              <a:ext uri="{FF2B5EF4-FFF2-40B4-BE49-F238E27FC236}">
+                <a16:creationId xmlns:a16="http://schemas.microsoft.com/office/drawing/2014/main" id="{A8471308-23D8-3D4C-83C9-858E1F9DF60B}"/>
+              </a:ext>
+            </a:extLst>
+          </p:cNvPr>
+          <p:cNvSpPr>
+            <a:spLocks noGrp="1"/>
+          </p:cNvSpPr>
+          <p:nvPr>
+            <p:ph type="sldNum" sz="quarter" idx="12"/>
+          </p:nvPr>
+        </p:nvSpPr>
+        <p:spPr/>
+        <p:txBody>
+          <a:bodyPr/>
+          <a:lstStyle/>
+          <a:p>
+            <a:fld id="{412843D3-244E-7B40-8F83-4C5ACBCBD5F2}" type="slidenum">
+              <a:rPr lang="en-GB" smtClean="0"/>
+              <a:t>29</a:t>
+            </a:fld>
+            <a:endParaRPr lang="en-GB"/>
           </a:p>
         </p:txBody>
       </p:sp>
@@ -13777,6 +14480,35 @@
           </a:p>
         </p:txBody>
       </p:sp>
+      <p:sp>
+        <p:nvSpPr>
+          <p:cNvPr id="7" name="Slide Number Placeholder 6">
+            <a:extLst>
+              <a:ext uri="{FF2B5EF4-FFF2-40B4-BE49-F238E27FC236}">
+                <a16:creationId xmlns:a16="http://schemas.microsoft.com/office/drawing/2014/main" id="{43BF7DFB-B3BE-1940-B976-B95233EAC18F}"/>
+              </a:ext>
+            </a:extLst>
+          </p:cNvPr>
+          <p:cNvSpPr>
+            <a:spLocks noGrp="1"/>
+          </p:cNvSpPr>
+          <p:nvPr>
+            <p:ph type="sldNum" sz="quarter" idx="12"/>
+          </p:nvPr>
+        </p:nvSpPr>
+        <p:spPr/>
+        <p:txBody>
+          <a:bodyPr/>
+          <a:lstStyle/>
+          <a:p>
+            <a:fld id="{412843D3-244E-7B40-8F83-4C5ACBCBD5F2}" type="slidenum">
+              <a:rPr lang="en-GB" smtClean="0"/>
+              <a:t>3</a:t>
+            </a:fld>
+            <a:endParaRPr lang="en-GB"/>
+          </a:p>
+        </p:txBody>
+      </p:sp>
     </p:spTree>
     <p:extLst>
       <p:ext uri="{BB962C8B-B14F-4D97-AF65-F5344CB8AC3E}">
@@ -13992,6 +14724,35 @@
           </a:p>
         </p:txBody>
       </p:sp>
+      <p:sp>
+        <p:nvSpPr>
+          <p:cNvPr id="4" name="Slide Number Placeholder 3">
+            <a:extLst>
+              <a:ext uri="{FF2B5EF4-FFF2-40B4-BE49-F238E27FC236}">
+                <a16:creationId xmlns:a16="http://schemas.microsoft.com/office/drawing/2014/main" id="{05BB06C9-0B67-7F40-A55D-6E20063AB5D7}"/>
+              </a:ext>
+            </a:extLst>
+          </p:cNvPr>
+          <p:cNvSpPr>
+            <a:spLocks noGrp="1"/>
+          </p:cNvSpPr>
+          <p:nvPr>
+            <p:ph type="sldNum" sz="quarter" idx="12"/>
+          </p:nvPr>
+        </p:nvSpPr>
+        <p:spPr/>
+        <p:txBody>
+          <a:bodyPr/>
+          <a:lstStyle/>
+          <a:p>
+            <a:fld id="{412843D3-244E-7B40-8F83-4C5ACBCBD5F2}" type="slidenum">
+              <a:rPr lang="en-GB" smtClean="0"/>
+              <a:t>30</a:t>
+            </a:fld>
+            <a:endParaRPr lang="en-GB"/>
+          </a:p>
+        </p:txBody>
+      </p:sp>
     </p:spTree>
     <p:extLst>
       <p:ext uri="{BB962C8B-B14F-4D97-AF65-F5344CB8AC3E}">
@@ -14207,6 +14968,35 @@
           </a:p>
         </p:txBody>
       </p:sp>
+      <p:sp>
+        <p:nvSpPr>
+          <p:cNvPr id="4" name="Slide Number Placeholder 3">
+            <a:extLst>
+              <a:ext uri="{FF2B5EF4-FFF2-40B4-BE49-F238E27FC236}">
+                <a16:creationId xmlns:a16="http://schemas.microsoft.com/office/drawing/2014/main" id="{2D1A48D8-CC6F-E84E-8015-F71D24B11E92}"/>
+              </a:ext>
+            </a:extLst>
+          </p:cNvPr>
+          <p:cNvSpPr>
+            <a:spLocks noGrp="1"/>
+          </p:cNvSpPr>
+          <p:nvPr>
+            <p:ph type="sldNum" sz="quarter" idx="12"/>
+          </p:nvPr>
+        </p:nvSpPr>
+        <p:spPr/>
+        <p:txBody>
+          <a:bodyPr/>
+          <a:lstStyle/>
+          <a:p>
+            <a:fld id="{412843D3-244E-7B40-8F83-4C5ACBCBD5F2}" type="slidenum">
+              <a:rPr lang="en-GB" smtClean="0"/>
+              <a:t>31</a:t>
+            </a:fld>
+            <a:endParaRPr lang="en-GB"/>
+          </a:p>
+        </p:txBody>
+      </p:sp>
     </p:spTree>
     <p:extLst>
       <p:ext uri="{BB962C8B-B14F-4D97-AF65-F5344CB8AC3E}">
@@ -14699,6 +15489,35 @@
           </a:p>
         </p:txBody>
       </p:sp>
+      <p:sp>
+        <p:nvSpPr>
+          <p:cNvPr id="4" name="Slide Number Placeholder 3">
+            <a:extLst>
+              <a:ext uri="{FF2B5EF4-FFF2-40B4-BE49-F238E27FC236}">
+                <a16:creationId xmlns:a16="http://schemas.microsoft.com/office/drawing/2014/main" id="{6759A065-B289-D048-8497-0B652D3DA2CF}"/>
+              </a:ext>
+            </a:extLst>
+          </p:cNvPr>
+          <p:cNvSpPr>
+            <a:spLocks noGrp="1"/>
+          </p:cNvSpPr>
+          <p:nvPr>
+            <p:ph type="sldNum" sz="quarter" idx="12"/>
+          </p:nvPr>
+        </p:nvSpPr>
+        <p:spPr/>
+        <p:txBody>
+          <a:bodyPr/>
+          <a:lstStyle/>
+          <a:p>
+            <a:fld id="{412843D3-244E-7B40-8F83-4C5ACBCBD5F2}" type="slidenum">
+              <a:rPr lang="en-GB" smtClean="0"/>
+              <a:t>4</a:t>
+            </a:fld>
+            <a:endParaRPr lang="en-GB"/>
+          </a:p>
+        </p:txBody>
+      </p:sp>
     </p:spTree>
     <p:extLst>
       <p:ext uri="{BB962C8B-B14F-4D97-AF65-F5344CB8AC3E}">
@@ -14841,6 +15660,35 @@
           </a:p>
         </p:txBody>
       </p:sp>
+      <p:sp>
+        <p:nvSpPr>
+          <p:cNvPr id="5" name="Slide Number Placeholder 4">
+            <a:extLst>
+              <a:ext uri="{FF2B5EF4-FFF2-40B4-BE49-F238E27FC236}">
+                <a16:creationId xmlns:a16="http://schemas.microsoft.com/office/drawing/2014/main" id="{D99DCA81-A8C2-7242-B253-781E72A4CF1A}"/>
+              </a:ext>
+            </a:extLst>
+          </p:cNvPr>
+          <p:cNvSpPr>
+            <a:spLocks noGrp="1"/>
+          </p:cNvSpPr>
+          <p:nvPr>
+            <p:ph type="sldNum" sz="quarter" idx="12"/>
+          </p:nvPr>
+        </p:nvSpPr>
+        <p:spPr/>
+        <p:txBody>
+          <a:bodyPr/>
+          <a:lstStyle/>
+          <a:p>
+            <a:fld id="{412843D3-244E-7B40-8F83-4C5ACBCBD5F2}" type="slidenum">
+              <a:rPr lang="en-GB" smtClean="0"/>
+              <a:t>5</a:t>
+            </a:fld>
+            <a:endParaRPr lang="en-GB"/>
+          </a:p>
+        </p:txBody>
+      </p:sp>
     </p:spTree>
     <p:extLst>
       <p:ext uri="{BB962C8B-B14F-4D97-AF65-F5344CB8AC3E}">
@@ -15008,6 +15856,35 @@
           </a:prstGeom>
         </p:spPr>
       </p:pic>
+      <p:sp>
+        <p:nvSpPr>
+          <p:cNvPr id="5" name="Slide Number Placeholder 4">
+            <a:extLst>
+              <a:ext uri="{FF2B5EF4-FFF2-40B4-BE49-F238E27FC236}">
+                <a16:creationId xmlns:a16="http://schemas.microsoft.com/office/drawing/2014/main" id="{A68A167D-2D25-054E-BA22-26183E0D87D3}"/>
+              </a:ext>
+            </a:extLst>
+          </p:cNvPr>
+          <p:cNvSpPr>
+            <a:spLocks noGrp="1"/>
+          </p:cNvSpPr>
+          <p:nvPr>
+            <p:ph type="sldNum" sz="quarter" idx="12"/>
+          </p:nvPr>
+        </p:nvSpPr>
+        <p:spPr/>
+        <p:txBody>
+          <a:bodyPr/>
+          <a:lstStyle/>
+          <a:p>
+            <a:fld id="{412843D3-244E-7B40-8F83-4C5ACBCBD5F2}" type="slidenum">
+              <a:rPr lang="en-GB" smtClean="0"/>
+              <a:t>6</a:t>
+            </a:fld>
+            <a:endParaRPr lang="en-GB"/>
+          </a:p>
+        </p:txBody>
+      </p:sp>
     </p:spTree>
     <p:extLst>
       <p:ext uri="{BB962C8B-B14F-4D97-AF65-F5344CB8AC3E}">
@@ -15090,6 +15967,35 @@
           </a:p>
         </p:txBody>
       </p:sp>
+      <p:sp>
+        <p:nvSpPr>
+          <p:cNvPr id="4" name="Slide Number Placeholder 3">
+            <a:extLst>
+              <a:ext uri="{FF2B5EF4-FFF2-40B4-BE49-F238E27FC236}">
+                <a16:creationId xmlns:a16="http://schemas.microsoft.com/office/drawing/2014/main" id="{2C520480-AD0F-8841-9769-579C3BC05207}"/>
+              </a:ext>
+            </a:extLst>
+          </p:cNvPr>
+          <p:cNvSpPr>
+            <a:spLocks noGrp="1"/>
+          </p:cNvSpPr>
+          <p:nvPr>
+            <p:ph type="sldNum" sz="quarter" idx="12"/>
+          </p:nvPr>
+        </p:nvSpPr>
+        <p:spPr/>
+        <p:txBody>
+          <a:bodyPr/>
+          <a:lstStyle/>
+          <a:p>
+            <a:fld id="{412843D3-244E-7B40-8F83-4C5ACBCBD5F2}" type="slidenum">
+              <a:rPr lang="en-GB" smtClean="0"/>
+              <a:t>7</a:t>
+            </a:fld>
+            <a:endParaRPr lang="en-GB"/>
+          </a:p>
+        </p:txBody>
+      </p:sp>
     </p:spTree>
     <p:extLst>
       <p:ext uri="{BB962C8B-B14F-4D97-AF65-F5344CB8AC3E}">
@@ -15685,6 +16591,35 @@
               <a:latin typeface="Courier New"/>
               <a:cs typeface="Courier New"/>
             </a:endParaRPr>
+          </a:p>
+        </p:txBody>
+      </p:sp>
+      <p:sp>
+        <p:nvSpPr>
+          <p:cNvPr id="4" name="Slide Number Placeholder 3">
+            <a:extLst>
+              <a:ext uri="{FF2B5EF4-FFF2-40B4-BE49-F238E27FC236}">
+                <a16:creationId xmlns:a16="http://schemas.microsoft.com/office/drawing/2014/main" id="{61D3B2A0-DA81-0C45-8D7D-BF1E0415C3CC}"/>
+              </a:ext>
+            </a:extLst>
+          </p:cNvPr>
+          <p:cNvSpPr>
+            <a:spLocks noGrp="1"/>
+          </p:cNvSpPr>
+          <p:nvPr>
+            <p:ph type="sldNum" sz="quarter" idx="12"/>
+          </p:nvPr>
+        </p:nvSpPr>
+        <p:spPr/>
+        <p:txBody>
+          <a:bodyPr/>
+          <a:lstStyle/>
+          <a:p>
+            <a:fld id="{412843D3-244E-7B40-8F83-4C5ACBCBD5F2}" type="slidenum">
+              <a:rPr lang="en-GB" smtClean="0"/>
+              <a:t>8</a:t>
+            </a:fld>
+            <a:endParaRPr lang="en-GB"/>
           </a:p>
         </p:txBody>
       </p:sp>
@@ -16467,6 +17402,35 @@
               <a:latin typeface="Courier New"/>
               <a:cs typeface="Courier New"/>
             </a:endParaRPr>
+          </a:p>
+        </p:txBody>
+      </p:sp>
+      <p:sp>
+        <p:nvSpPr>
+          <p:cNvPr id="4" name="Slide Number Placeholder 3">
+            <a:extLst>
+              <a:ext uri="{FF2B5EF4-FFF2-40B4-BE49-F238E27FC236}">
+                <a16:creationId xmlns:a16="http://schemas.microsoft.com/office/drawing/2014/main" id="{B75056A2-859F-7048-A1E5-8DA201CEC47B}"/>
+              </a:ext>
+            </a:extLst>
+          </p:cNvPr>
+          <p:cNvSpPr>
+            <a:spLocks noGrp="1"/>
+          </p:cNvSpPr>
+          <p:nvPr>
+            <p:ph type="sldNum" sz="quarter" idx="12"/>
+          </p:nvPr>
+        </p:nvSpPr>
+        <p:spPr/>
+        <p:txBody>
+          <a:bodyPr/>
+          <a:lstStyle/>
+          <a:p>
+            <a:fld id="{412843D3-244E-7B40-8F83-4C5ACBCBD5F2}" type="slidenum">
+              <a:rPr lang="en-GB" smtClean="0"/>
+              <a:t>9</a:t>
+            </a:fld>
+            <a:endParaRPr lang="en-GB"/>
           </a:p>
         </p:txBody>
       </p:sp>

</xml_diff>

<commit_message>
Clarification of kernel compiler flags and expanded metaprogramming example to multiple slides for PDF
</commit_message>
<xml_diff>
--- a/advanced_part2.pptx
+++ b/advanced_part2.pptx
@@ -5,7 +5,7 @@
     <p:sldMasterId id="2147483648" r:id="rId1"/>
   </p:sldMasterIdLst>
   <p:notesMasterIdLst>
-    <p:notesMasterId r:id="rId33"/>
+    <p:notesMasterId r:id="rId34"/>
   </p:notesMasterIdLst>
   <p:sldIdLst>
     <p:sldId id="257" r:id="rId2"/>
@@ -33,12 +33,13 @@
     <p:sldId id="273" r:id="rId24"/>
     <p:sldId id="274" r:id="rId25"/>
     <p:sldId id="288" r:id="rId26"/>
-    <p:sldId id="275" r:id="rId27"/>
-    <p:sldId id="281" r:id="rId28"/>
-    <p:sldId id="279" r:id="rId29"/>
-    <p:sldId id="277" r:id="rId30"/>
-    <p:sldId id="282" r:id="rId31"/>
-    <p:sldId id="289" r:id="rId32"/>
+    <p:sldId id="290" r:id="rId27"/>
+    <p:sldId id="275" r:id="rId28"/>
+    <p:sldId id="281" r:id="rId29"/>
+    <p:sldId id="279" r:id="rId30"/>
+    <p:sldId id="277" r:id="rId31"/>
+    <p:sldId id="282" r:id="rId32"/>
+    <p:sldId id="289" r:id="rId33"/>
   </p:sldIdLst>
   <p:sldSz cx="9144000" cy="6858000" type="screen4x3"/>
   <p:notesSz cx="6858000" cy="9144000"/>
@@ -238,7 +239,7 @@
           <a:p>
             <a:fld id="{7FB74D45-CC88-7D46-9D48-9989C6A85D58}" type="datetimeFigureOut">
               <a:rPr lang="en-US" smtClean="0"/>
-              <a:t>11/25/18</a:t>
+              <a:t>11/27/18</a:t>
             </a:fld>
             <a:endParaRPr lang="en-US"/>
           </a:p>
@@ -675,7 +676,7 @@
           <a:p>
             <a:fld id="{E0B00886-CC17-8E42-AE02-995FCC132C1C}" type="slidenum">
               <a:rPr lang="en-US" smtClean="0"/>
-              <a:t>26</a:t>
+              <a:t>27</a:t>
             </a:fld>
             <a:endParaRPr lang="en-US"/>
           </a:p>
@@ -775,7 +776,7 @@
           <a:p>
             <a:fld id="{E0B00886-CC17-8E42-AE02-995FCC132C1C}" type="slidenum">
               <a:rPr lang="en-US" smtClean="0"/>
-              <a:t>27</a:t>
+              <a:t>28</a:t>
             </a:fld>
             <a:endParaRPr lang="en-US"/>
           </a:p>
@@ -1736,7 +1737,7 @@
           <a:p>
             <a:fld id="{98B7218E-8A9E-214E-AD19-AE634911F270}" type="datetime1">
               <a:rPr lang="en-GB" smtClean="0"/>
-              <a:t>25/11/2018</a:t>
+              <a:t>27/11/2018</a:t>
             </a:fld>
             <a:endParaRPr lang="en-GB"/>
           </a:p>
@@ -1904,7 +1905,7 @@
           <a:p>
             <a:fld id="{AA991B60-00D2-2343-80A7-DF08911EB882}" type="datetime1">
               <a:rPr lang="en-GB" smtClean="0"/>
-              <a:t>25/11/2018</a:t>
+              <a:t>27/11/2018</a:t>
             </a:fld>
             <a:endParaRPr lang="en-GB"/>
           </a:p>
@@ -2082,7 +2083,7 @@
           <a:p>
             <a:fld id="{79F2F4DC-ECDA-1B4B-A55A-19C765AB0936}" type="datetime1">
               <a:rPr lang="en-GB" smtClean="0"/>
-              <a:t>25/11/2018</a:t>
+              <a:t>27/11/2018</a:t>
             </a:fld>
             <a:endParaRPr lang="en-GB"/>
           </a:p>
@@ -2250,7 +2251,7 @@
           <a:p>
             <a:fld id="{E10EB459-D562-FA41-9CCB-2AF59A37850A}" type="datetime1">
               <a:rPr lang="en-GB" smtClean="0"/>
-              <a:t>25/11/2018</a:t>
+              <a:t>27/11/2018</a:t>
             </a:fld>
             <a:endParaRPr lang="en-GB"/>
           </a:p>
@@ -2495,7 +2496,7 @@
           <a:p>
             <a:fld id="{FF74A8AB-ACA2-0A4A-9324-7ABD14604470}" type="datetime1">
               <a:rPr lang="en-GB" smtClean="0"/>
-              <a:t>25/11/2018</a:t>
+              <a:t>27/11/2018</a:t>
             </a:fld>
             <a:endParaRPr lang="en-GB"/>
           </a:p>
@@ -2780,7 +2781,7 @@
           <a:p>
             <a:fld id="{BD56FB53-7A18-374A-9D53-928831CF7E8F}" type="datetime1">
               <a:rPr lang="en-GB" smtClean="0"/>
-              <a:t>25/11/2018</a:t>
+              <a:t>27/11/2018</a:t>
             </a:fld>
             <a:endParaRPr lang="en-GB"/>
           </a:p>
@@ -3199,7 +3200,7 @@
           <a:p>
             <a:fld id="{413DD57C-1454-CB46-ACCC-5F4CB268C6FE}" type="datetime1">
               <a:rPr lang="en-GB" smtClean="0"/>
-              <a:t>25/11/2018</a:t>
+              <a:t>27/11/2018</a:t>
             </a:fld>
             <a:endParaRPr lang="en-GB"/>
           </a:p>
@@ -3316,7 +3317,7 @@
           <a:p>
             <a:fld id="{59D2FC35-1ADA-B44B-BA66-EAFF9F83A6FA}" type="datetime1">
               <a:rPr lang="en-GB" smtClean="0"/>
-              <a:t>25/11/2018</a:t>
+              <a:t>27/11/2018</a:t>
             </a:fld>
             <a:endParaRPr lang="en-GB"/>
           </a:p>
@@ -3411,7 +3412,7 @@
           <a:p>
             <a:fld id="{61A51BD4-1821-E541-8C0D-147BB6BF4448}" type="datetime1">
               <a:rPr lang="en-GB" smtClean="0"/>
-              <a:t>25/11/2018</a:t>
+              <a:t>27/11/2018</a:t>
             </a:fld>
             <a:endParaRPr lang="en-GB"/>
           </a:p>
@@ -3686,7 +3687,7 @@
           <a:p>
             <a:fld id="{BEF9BA88-43D2-2E48-A2BB-52A4AEC31D51}" type="datetime1">
               <a:rPr lang="en-GB" smtClean="0"/>
-              <a:t>25/11/2018</a:t>
+              <a:t>27/11/2018</a:t>
             </a:fld>
             <a:endParaRPr lang="en-GB"/>
           </a:p>
@@ -3938,7 +3939,7 @@
           <a:p>
             <a:fld id="{DA316296-312D-764B-BF60-CABC8F3C2E8E}" type="datetime1">
               <a:rPr lang="en-GB" smtClean="0"/>
-              <a:t>25/11/2018</a:t>
+              <a:t>27/11/2018</a:t>
             </a:fld>
             <a:endParaRPr lang="en-GB"/>
           </a:p>
@@ -4149,7 +4150,7 @@
           <a:p>
             <a:fld id="{593728D0-71E1-F948-8215-937DF37E15C5}" type="datetime1">
               <a:rPr lang="en-GB" smtClean="0"/>
-              <a:t>25/11/2018</a:t>
+              <a:t>27/11/2018</a:t>
             </a:fld>
             <a:endParaRPr lang="en-GB"/>
           </a:p>
@@ -7084,7 +7085,7 @@
           <a:p>
             <a:r>
               <a:rPr lang="en-GB" dirty="0"/>
-              <a:t>OpenCL compilers accept a number of flags that affect how kernels are compiled:</a:t>
+              <a:t>OpenCL kernel compilers accept a number of flags that affect how kernels are compiled:</a:t>
             </a:r>
           </a:p>
           <a:p>
@@ -10576,410 +10577,14 @@
       </p:sp>
       <p:sp>
         <p:nvSpPr>
-          <p:cNvPr id="5" name="Text Placeholder 4"/>
-          <p:cNvSpPr>
-            <a:spLocks noGrp="1"/>
-          </p:cNvSpPr>
-          <p:nvPr>
-            <p:ph type="body" sz="quarter" idx="3"/>
-          </p:nvPr>
-        </p:nvSpPr>
-        <p:spPr/>
-        <p:txBody>
-          <a:bodyPr>
-            <a:normAutofit fontScale="92500" lnSpcReduction="20000"/>
-          </a:bodyPr>
-          <a:lstStyle/>
-          <a:p>
-            <a:r>
-              <a:rPr lang="en-GB" dirty="0"/>
-              <a:t>Defining the value as a </a:t>
-            </a:r>
-            <a:r>
-              <a:rPr lang="en-GB" dirty="0" err="1"/>
-              <a:t>preprocessor</a:t>
-            </a:r>
-            <a:r>
-              <a:rPr lang="en-GB" dirty="0"/>
-              <a:t> macro</a:t>
-            </a:r>
-          </a:p>
-        </p:txBody>
-      </p:sp>
-      <p:sp>
-        <p:nvSpPr>
-          <p:cNvPr id="6" name="Content Placeholder 5"/>
-          <p:cNvSpPr>
-            <a:spLocks noGrp="1"/>
-          </p:cNvSpPr>
-          <p:nvPr>
-            <p:ph sz="quarter" idx="4"/>
-          </p:nvPr>
-        </p:nvSpPr>
-        <p:spPr>
-          <a:xfrm>
-            <a:off x="4645025" y="2174875"/>
-            <a:ext cx="4699391" cy="3951288"/>
-          </a:xfrm>
-        </p:spPr>
-        <p:txBody>
-          <a:bodyPr>
-            <a:normAutofit fontScale="55000" lnSpcReduction="20000"/>
-          </a:bodyPr>
-          <a:lstStyle/>
-          <a:p>
-            <a:pPr marL="0" indent="0">
-              <a:buNone/>
-            </a:pPr>
-            <a:r>
-              <a:rPr lang="en-GB" b="1" dirty="0">
-                <a:solidFill>
-                  <a:srgbClr val="C0504D"/>
-                </a:solidFill>
-                <a:latin typeface="Courier New"/>
-                <a:cs typeface="Courier New"/>
-              </a:rPr>
-              <a:t>kernel</a:t>
-            </a:r>
-            <a:r>
-              <a:rPr lang="en-GB" b="1" dirty="0">
-                <a:latin typeface="Courier New"/>
-                <a:cs typeface="Courier New"/>
-              </a:rPr>
-              <a:t> </a:t>
-            </a:r>
-            <a:r>
-              <a:rPr lang="en-GB" b="1" i="1" dirty="0">
-                <a:solidFill>
-                  <a:srgbClr val="3366FF"/>
-                </a:solidFill>
-                <a:latin typeface="Courier New"/>
-                <a:cs typeface="Courier New"/>
-              </a:rPr>
-              <a:t>void</a:t>
-            </a:r>
-            <a:r>
-              <a:rPr lang="en-GB" b="1" dirty="0">
-                <a:latin typeface="Courier New"/>
-                <a:cs typeface="Courier New"/>
-              </a:rPr>
-              <a:t> </a:t>
-            </a:r>
-            <a:r>
-              <a:rPr lang="en-GB" b="1" dirty="0" err="1">
-                <a:solidFill>
-                  <a:schemeClr val="accent3"/>
-                </a:solidFill>
-                <a:latin typeface="Courier New"/>
-                <a:cs typeface="Courier New"/>
-              </a:rPr>
-              <a:t>vecmul</a:t>
-            </a:r>
-            <a:r>
-              <a:rPr lang="en-GB" b="1" dirty="0">
-                <a:latin typeface="Courier New"/>
-                <a:cs typeface="Courier New"/>
-              </a:rPr>
-              <a:t>(</a:t>
-            </a:r>
-          </a:p>
-          <a:p>
-            <a:pPr marL="0" indent="0">
-              <a:buNone/>
-            </a:pPr>
-            <a:r>
-              <a:rPr lang="en-GB" b="1" dirty="0">
-                <a:latin typeface="Courier New"/>
-                <a:cs typeface="Courier New"/>
-              </a:rPr>
-              <a:t>  </a:t>
-            </a:r>
-            <a:r>
-              <a:rPr lang="en-GB" b="1" dirty="0">
-                <a:solidFill>
-                  <a:srgbClr val="C0504D"/>
-                </a:solidFill>
-                <a:latin typeface="Courier New"/>
-                <a:cs typeface="Courier New"/>
-              </a:rPr>
-              <a:t>global</a:t>
-            </a:r>
-            <a:r>
-              <a:rPr lang="en-GB" b="1" dirty="0">
-                <a:latin typeface="Courier New"/>
-                <a:cs typeface="Courier New"/>
-              </a:rPr>
-              <a:t> </a:t>
-            </a:r>
-            <a:r>
-              <a:rPr lang="en-GB" b="1" i="1" dirty="0">
-                <a:solidFill>
-                  <a:srgbClr val="3366FF"/>
-                </a:solidFill>
-                <a:latin typeface="Courier New"/>
-                <a:cs typeface="Courier New"/>
-              </a:rPr>
-              <a:t>float</a:t>
-            </a:r>
-            <a:r>
-              <a:rPr lang="en-GB" b="1" dirty="0">
-                <a:latin typeface="Courier New"/>
-                <a:cs typeface="Courier New"/>
-              </a:rPr>
-              <a:t> *data)</a:t>
-            </a:r>
-          </a:p>
-          <a:p>
-            <a:pPr marL="0" indent="0">
-              <a:buNone/>
-            </a:pPr>
-            <a:endParaRPr lang="en-GB" b="1" dirty="0">
-              <a:latin typeface="Courier New"/>
-              <a:cs typeface="Courier New"/>
-            </a:endParaRPr>
-          </a:p>
-          <a:p>
-            <a:pPr marL="0" indent="0">
-              <a:buNone/>
-            </a:pPr>
-            <a:r>
-              <a:rPr lang="en-GB" b="1" dirty="0">
-                <a:latin typeface="Courier New"/>
-                <a:cs typeface="Courier New"/>
-              </a:rPr>
-              <a:t>{</a:t>
-            </a:r>
-          </a:p>
-          <a:p>
-            <a:pPr marL="0" indent="0">
-              <a:buNone/>
-            </a:pPr>
-            <a:r>
-              <a:rPr lang="en-GB" b="1" dirty="0">
-                <a:latin typeface="Courier New"/>
-                <a:cs typeface="Courier New"/>
-              </a:rPr>
-              <a:t>  </a:t>
-            </a:r>
-            <a:r>
-              <a:rPr lang="en-GB" b="1" i="1" dirty="0" err="1">
-                <a:solidFill>
-                  <a:srgbClr val="3366FF"/>
-                </a:solidFill>
-                <a:latin typeface="Courier New"/>
-                <a:cs typeface="Courier New"/>
-              </a:rPr>
-              <a:t>int</a:t>
-            </a:r>
-            <a:r>
-              <a:rPr lang="en-GB" b="1" dirty="0">
-                <a:latin typeface="Courier New"/>
-                <a:cs typeface="Courier New"/>
-              </a:rPr>
-              <a:t> </a:t>
-            </a:r>
-            <a:r>
-              <a:rPr lang="en-GB" b="1" dirty="0" err="1">
-                <a:latin typeface="Courier New"/>
-                <a:cs typeface="Courier New"/>
-              </a:rPr>
-              <a:t>i</a:t>
-            </a:r>
-            <a:r>
-              <a:rPr lang="en-GB" b="1" dirty="0">
-                <a:latin typeface="Courier New"/>
-                <a:cs typeface="Courier New"/>
-              </a:rPr>
-              <a:t> = </a:t>
-            </a:r>
-            <a:r>
-              <a:rPr lang="en-GB" b="1" dirty="0" err="1">
-                <a:solidFill>
-                  <a:srgbClr val="3366FF"/>
-                </a:solidFill>
-                <a:latin typeface="Courier New"/>
-                <a:cs typeface="Courier New"/>
-              </a:rPr>
-              <a:t>get_global_id</a:t>
-            </a:r>
-            <a:r>
-              <a:rPr lang="en-GB" b="1" dirty="0">
-                <a:latin typeface="Courier New"/>
-                <a:cs typeface="Courier New"/>
-              </a:rPr>
-              <a:t>(</a:t>
-            </a:r>
-            <a:r>
-              <a:rPr lang="en-GB" b="1" dirty="0">
-                <a:solidFill>
-                  <a:srgbClr val="FF00FF"/>
-                </a:solidFill>
-                <a:latin typeface="Courier New"/>
-                <a:cs typeface="Courier New"/>
-              </a:rPr>
-              <a:t>0</a:t>
-            </a:r>
-            <a:r>
-              <a:rPr lang="en-GB" b="1" dirty="0">
-                <a:latin typeface="Courier New"/>
-                <a:cs typeface="Courier New"/>
-              </a:rPr>
-              <a:t>);</a:t>
-            </a:r>
-          </a:p>
-          <a:p>
-            <a:pPr marL="0" indent="0">
-              <a:buNone/>
-            </a:pPr>
-            <a:r>
-              <a:rPr lang="en-GB" b="1" dirty="0">
-                <a:latin typeface="Courier New"/>
-                <a:cs typeface="Courier New"/>
-              </a:rPr>
-              <a:t>  data[</a:t>
-            </a:r>
-            <a:r>
-              <a:rPr lang="en-GB" b="1" dirty="0" err="1">
-                <a:latin typeface="Courier New"/>
-                <a:cs typeface="Courier New"/>
-              </a:rPr>
-              <a:t>i</a:t>
-            </a:r>
-            <a:r>
-              <a:rPr lang="en-GB" b="1" dirty="0">
-                <a:latin typeface="Courier New"/>
-                <a:cs typeface="Courier New"/>
-              </a:rPr>
-              <a:t>] *= factor;</a:t>
-            </a:r>
-            <a:br>
-              <a:rPr lang="en-GB" b="1" dirty="0">
-                <a:latin typeface="Courier New"/>
-                <a:cs typeface="Courier New"/>
-              </a:rPr>
-            </a:br>
-            <a:r>
-              <a:rPr lang="en-GB" b="1" dirty="0">
-                <a:latin typeface="Courier New"/>
-                <a:cs typeface="Courier New"/>
-              </a:rPr>
-              <a:t>}</a:t>
-            </a:r>
-          </a:p>
-          <a:p>
-            <a:pPr marL="0" indent="0">
-              <a:buNone/>
-            </a:pPr>
-            <a:endParaRPr lang="en-GB" b="1" dirty="0">
-              <a:latin typeface="Courier New"/>
-              <a:cs typeface="Courier New"/>
-            </a:endParaRPr>
-          </a:p>
-          <a:p>
-            <a:pPr marL="0" indent="0">
-              <a:buNone/>
-            </a:pPr>
-            <a:endParaRPr lang="en-GB" b="1" dirty="0">
-              <a:latin typeface="Courier New"/>
-              <a:cs typeface="Courier New"/>
-            </a:endParaRPr>
-          </a:p>
-          <a:p>
-            <a:pPr marL="0" indent="0">
-              <a:buNone/>
-            </a:pPr>
-            <a:endParaRPr lang="en-GB" b="1" dirty="0">
-              <a:latin typeface="Courier New"/>
-              <a:cs typeface="Courier New"/>
-            </a:endParaRPr>
-          </a:p>
-          <a:p>
-            <a:pPr marL="0" indent="0">
-              <a:buNone/>
-            </a:pPr>
-            <a:endParaRPr lang="en-GB" b="1" dirty="0">
-              <a:latin typeface="Courier New"/>
-              <a:cs typeface="Courier New"/>
-            </a:endParaRPr>
-          </a:p>
-          <a:p>
-            <a:pPr marL="0" indent="0">
-              <a:buNone/>
-            </a:pPr>
-            <a:r>
-              <a:rPr lang="en-GB" b="1" dirty="0" err="1">
-                <a:latin typeface="Courier New"/>
-                <a:cs typeface="Courier New"/>
-              </a:rPr>
-              <a:t>sprintf</a:t>
-            </a:r>
-            <a:r>
-              <a:rPr lang="en-GB" b="1" dirty="0">
-                <a:latin typeface="Courier New"/>
-                <a:cs typeface="Courier New"/>
-              </a:rPr>
-              <a:t>(options, “-</a:t>
-            </a:r>
-            <a:r>
-              <a:rPr lang="en-GB" b="1" dirty="0" err="1">
-                <a:latin typeface="Courier New"/>
-                <a:cs typeface="Courier New"/>
-              </a:rPr>
-              <a:t>Dfactor</a:t>
-            </a:r>
-            <a:r>
-              <a:rPr lang="en-GB" b="1" dirty="0">
-                <a:latin typeface="Courier New"/>
-                <a:cs typeface="Courier New"/>
-              </a:rPr>
-              <a:t>=%f”, </a:t>
-            </a:r>
-            <a:r>
-              <a:rPr lang="en-GB" b="1" dirty="0" err="1">
-                <a:latin typeface="Courier New"/>
-                <a:cs typeface="Courier New"/>
-              </a:rPr>
-              <a:t>userFactor</a:t>
-            </a:r>
-            <a:r>
-              <a:rPr lang="en-GB" b="1" dirty="0">
-                <a:latin typeface="Courier New"/>
-                <a:cs typeface="Courier New"/>
-              </a:rPr>
-              <a:t>);</a:t>
-            </a:r>
-          </a:p>
-          <a:p>
-            <a:pPr marL="0" indent="0">
-              <a:buNone/>
-            </a:pPr>
-            <a:r>
-              <a:rPr lang="en-GB" b="1" dirty="0" err="1">
-                <a:latin typeface="Courier New"/>
-                <a:cs typeface="Courier New"/>
-              </a:rPr>
-              <a:t>clBuildProgram</a:t>
-            </a:r>
-            <a:r>
-              <a:rPr lang="en-GB" b="1" dirty="0">
-                <a:latin typeface="Courier New"/>
-                <a:cs typeface="Courier New"/>
-              </a:rPr>
-              <a:t>(program, 0, NULL, options, NULL, NULL);</a:t>
-            </a:r>
-          </a:p>
-        </p:txBody>
-      </p:sp>
-      <p:sp>
-        <p:nvSpPr>
           <p:cNvPr id="7" name="TextBox 6"/>
           <p:cNvSpPr txBox="1"/>
           <p:nvPr/>
         </p:nvSpPr>
         <p:spPr>
           <a:xfrm>
-            <a:off x="3496695" y="2112337"/>
-            <a:ext cx="3096344" cy="923330"/>
+            <a:off x="4765424" y="2166620"/>
+            <a:ext cx="3578475" cy="923330"/>
           </a:xfrm>
           <a:prstGeom prst="rect">
             <a:avLst/>
@@ -11003,7 +10608,23 @@
                   <a:srgbClr val="FF0000"/>
                 </a:solidFill>
               </a:rPr>
-              <a:t>Not known at application build time (e.g. passed as command-line argument)</a:t>
+              <a:t>Value of ‘factor’ not known at application build time (e.g. passed </a:t>
+            </a:r>
+            <a:r>
+              <a:rPr lang="en-GB">
+                <a:solidFill>
+                  <a:srgbClr val="FF0000"/>
+                </a:solidFill>
+              </a:rPr>
+              <a:t>as a command-line </a:t>
+            </a:r>
+            <a:r>
+              <a:rPr lang="en-GB" dirty="0">
+                <a:solidFill>
+                  <a:srgbClr val="FF0000"/>
+                </a:solidFill>
+              </a:rPr>
+              <a:t>argument)</a:t>
             </a:r>
           </a:p>
         </p:txBody>
@@ -11016,7 +10637,7 @@
         </p:nvCxnSpPr>
         <p:spPr>
           <a:xfrm>
-            <a:off x="2128543" y="2819841"/>
+            <a:off x="2139973" y="2808411"/>
             <a:ext cx="792088" cy="0"/>
           </a:xfrm>
           <a:prstGeom prst="line">
@@ -11027,6 +10648,7 @@
               <a:srgbClr val="FF0000"/>
             </a:solidFill>
           </a:ln>
+          <a:effectLst/>
         </p:spPr>
         <p:style>
           <a:lnRef idx="2">
@@ -11054,8 +10676,8 @@
         </p:nvCxnSpPr>
         <p:spPr>
           <a:xfrm flipV="1">
-            <a:off x="2920631" y="2574002"/>
-            <a:ext cx="576064" cy="245839"/>
+            <a:off x="2920631" y="2628285"/>
+            <a:ext cx="1844793" cy="186352"/>
           </a:xfrm>
           <a:prstGeom prst="line">
             <a:avLst/>
@@ -11065,6 +10687,7 @@
               <a:srgbClr val="FF0000"/>
             </a:solidFill>
           </a:ln>
+          <a:effectLst/>
         </p:spPr>
         <p:style>
           <a:lnRef idx="2">
@@ -11227,343 +10850,979 @@
                       </p:childTnLst>
                     </p:cTn>
                   </p:par>
+                </p:childTnLst>
+              </p:cTn>
+              <p:prevCondLst>
+                <p:cond evt="onPrev" delay="0">
+                  <p:tgtEl>
+                    <p:sldTgt/>
+                  </p:tgtEl>
+                </p:cond>
+              </p:prevCondLst>
+              <p:nextCondLst>
+                <p:cond evt="onNext" delay="0">
+                  <p:tgtEl>
+                    <p:sldTgt/>
+                  </p:tgtEl>
+                </p:cond>
+              </p:nextCondLst>
+            </p:seq>
+          </p:childTnLst>
+        </p:cTn>
+      </p:par>
+    </p:tnLst>
+    <p:bldLst>
+      <p:bldP spid="7" grpId="0" animBg="1"/>
+    </p:bldLst>
+  </p:timing>
+</p:sld>
+</file>
+
+<file path=ppt/slides/slide26.xml><?xml version="1.0" encoding="utf-8"?>
+<p:sld xmlns:a="http://schemas.openxmlformats.org/drawingml/2006/main" xmlns:r="http://schemas.openxmlformats.org/officeDocument/2006/relationships" xmlns:p="http://schemas.openxmlformats.org/presentationml/2006/main">
+  <p:cSld>
+    <p:spTree>
+      <p:nvGrpSpPr>
+        <p:cNvPr id="1" name=""/>
+        <p:cNvGrpSpPr/>
+        <p:nvPr/>
+      </p:nvGrpSpPr>
+      <p:grpSpPr>
+        <a:xfrm>
+          <a:off x="0" y="0"/>
+          <a:ext cx="0" cy="0"/>
+          <a:chOff x="0" y="0"/>
+          <a:chExt cx="0" cy="0"/>
+        </a:xfrm>
+      </p:grpSpPr>
+      <p:sp>
+        <p:nvSpPr>
+          <p:cNvPr id="2" name="Title 1"/>
+          <p:cNvSpPr>
+            <a:spLocks noGrp="1"/>
+          </p:cNvSpPr>
+          <p:nvPr>
+            <p:ph type="title"/>
+          </p:nvPr>
+        </p:nvSpPr>
+        <p:spPr/>
+        <p:txBody>
+          <a:bodyPr>
+            <a:normAutofit fontScale="90000"/>
+          </a:bodyPr>
+          <a:lstStyle/>
+          <a:p>
+            <a:r>
+              <a:rPr lang="en-GB" dirty="0"/>
+              <a:t>Example: Multiply a vector by a constant value</a:t>
+            </a:r>
+          </a:p>
+        </p:txBody>
+      </p:sp>
+      <p:sp>
+        <p:nvSpPr>
+          <p:cNvPr id="3" name="Text Placeholder 2"/>
+          <p:cNvSpPr>
+            <a:spLocks noGrp="1"/>
+          </p:cNvSpPr>
+          <p:nvPr>
+            <p:ph type="body" idx="1"/>
+          </p:nvPr>
+        </p:nvSpPr>
+        <p:spPr/>
+        <p:txBody>
+          <a:bodyPr>
+            <a:normAutofit fontScale="92500"/>
+          </a:bodyPr>
+          <a:lstStyle/>
+          <a:p>
+            <a:r>
+              <a:rPr lang="en-GB" dirty="0"/>
+              <a:t>Passing the value as an argument</a:t>
+            </a:r>
+          </a:p>
+        </p:txBody>
+      </p:sp>
+      <p:sp>
+        <p:nvSpPr>
+          <p:cNvPr id="4" name="Content Placeholder 3"/>
+          <p:cNvSpPr>
+            <a:spLocks noGrp="1"/>
+          </p:cNvSpPr>
+          <p:nvPr>
+            <p:ph sz="half" idx="2"/>
+          </p:nvPr>
+        </p:nvSpPr>
+        <p:spPr/>
+        <p:txBody>
+          <a:bodyPr>
+            <a:normAutofit fontScale="55000" lnSpcReduction="20000"/>
+          </a:bodyPr>
+          <a:lstStyle/>
+          <a:p>
+            <a:pPr marL="0" indent="0">
+              <a:buNone/>
+            </a:pPr>
+            <a:r>
+              <a:rPr lang="en-GB" b="1" dirty="0">
+                <a:solidFill>
+                  <a:schemeClr val="accent2"/>
+                </a:solidFill>
+                <a:latin typeface="Courier New"/>
+                <a:cs typeface="Courier New"/>
+              </a:rPr>
+              <a:t>kernel</a:t>
+            </a:r>
+            <a:r>
+              <a:rPr lang="en-GB" b="1" dirty="0">
+                <a:latin typeface="Courier New"/>
+                <a:cs typeface="Courier New"/>
+              </a:rPr>
+              <a:t> </a:t>
+            </a:r>
+            <a:r>
+              <a:rPr lang="en-GB" b="1" i="1" dirty="0">
+                <a:solidFill>
+                  <a:srgbClr val="3366FF"/>
+                </a:solidFill>
+                <a:latin typeface="Courier New"/>
+                <a:cs typeface="Courier New"/>
+              </a:rPr>
+              <a:t>void</a:t>
+            </a:r>
+            <a:r>
+              <a:rPr lang="en-GB" b="1" dirty="0">
+                <a:latin typeface="Courier New"/>
+                <a:cs typeface="Courier New"/>
+              </a:rPr>
+              <a:t> </a:t>
+            </a:r>
+            <a:r>
+              <a:rPr lang="en-GB" b="1" dirty="0" err="1">
+                <a:solidFill>
+                  <a:schemeClr val="accent3"/>
+                </a:solidFill>
+                <a:latin typeface="Courier New"/>
+                <a:cs typeface="Courier New"/>
+              </a:rPr>
+              <a:t>vecmul</a:t>
+            </a:r>
+            <a:r>
+              <a:rPr lang="en-GB" b="1" dirty="0">
+                <a:latin typeface="Courier New"/>
+                <a:cs typeface="Courier New"/>
+              </a:rPr>
+              <a:t>(</a:t>
+            </a:r>
+          </a:p>
+          <a:p>
+            <a:pPr marL="0" indent="0">
+              <a:buNone/>
+            </a:pPr>
+            <a:r>
+              <a:rPr lang="en-GB" b="1" dirty="0">
+                <a:latin typeface="Courier New"/>
+                <a:cs typeface="Courier New"/>
+              </a:rPr>
+              <a:t>  </a:t>
+            </a:r>
+            <a:r>
+              <a:rPr lang="en-GB" b="1" dirty="0">
+                <a:solidFill>
+                  <a:srgbClr val="C0504D"/>
+                </a:solidFill>
+                <a:latin typeface="Courier New"/>
+                <a:cs typeface="Courier New"/>
+              </a:rPr>
+              <a:t>global</a:t>
+            </a:r>
+            <a:r>
+              <a:rPr lang="en-GB" b="1" dirty="0">
+                <a:latin typeface="Courier New"/>
+                <a:cs typeface="Courier New"/>
+              </a:rPr>
+              <a:t> </a:t>
+            </a:r>
+            <a:r>
+              <a:rPr lang="en-GB" b="1" i="1" dirty="0">
+                <a:solidFill>
+                  <a:srgbClr val="3366FF"/>
+                </a:solidFill>
+                <a:latin typeface="Courier New"/>
+                <a:cs typeface="Courier New"/>
+              </a:rPr>
+              <a:t>float</a:t>
+            </a:r>
+            <a:r>
+              <a:rPr lang="en-GB" b="1" dirty="0">
+                <a:latin typeface="Courier New"/>
+                <a:cs typeface="Courier New"/>
+              </a:rPr>
+              <a:t> *data,</a:t>
+            </a:r>
+          </a:p>
+          <a:p>
+            <a:pPr marL="0" indent="0">
+              <a:buNone/>
+            </a:pPr>
+            <a:r>
+              <a:rPr lang="en-GB" b="1" dirty="0">
+                <a:latin typeface="Courier New"/>
+                <a:cs typeface="Courier New"/>
+              </a:rPr>
+              <a:t>  </a:t>
+            </a:r>
+            <a:r>
+              <a:rPr lang="en-GB" b="1" dirty="0" err="1">
+                <a:solidFill>
+                  <a:srgbClr val="C0504D"/>
+                </a:solidFill>
+                <a:latin typeface="Courier New"/>
+                <a:cs typeface="Courier New"/>
+              </a:rPr>
+              <a:t>const</a:t>
+            </a:r>
+            <a:r>
+              <a:rPr lang="en-GB" b="1" dirty="0">
+                <a:latin typeface="Courier New"/>
+                <a:cs typeface="Courier New"/>
+              </a:rPr>
+              <a:t>  </a:t>
+            </a:r>
+            <a:r>
+              <a:rPr lang="en-GB" b="1" i="1" dirty="0">
+                <a:solidFill>
+                  <a:srgbClr val="3366FF"/>
+                </a:solidFill>
+                <a:latin typeface="Courier New"/>
+                <a:cs typeface="Courier New"/>
+              </a:rPr>
+              <a:t>float</a:t>
+            </a:r>
+            <a:r>
+              <a:rPr lang="en-GB" b="1" i="1" dirty="0">
+                <a:latin typeface="Courier New"/>
+                <a:cs typeface="Courier New"/>
+              </a:rPr>
+              <a:t>  </a:t>
+            </a:r>
+            <a:r>
+              <a:rPr lang="en-GB" b="1" dirty="0">
+                <a:latin typeface="Courier New"/>
+                <a:cs typeface="Courier New"/>
+              </a:rPr>
+              <a:t>factor)</a:t>
+            </a:r>
+          </a:p>
+          <a:p>
+            <a:pPr marL="0" indent="0">
+              <a:buNone/>
+            </a:pPr>
+            <a:r>
+              <a:rPr lang="en-GB" b="1" dirty="0">
+                <a:latin typeface="Courier New"/>
+                <a:cs typeface="Courier New"/>
+              </a:rPr>
+              <a:t>{</a:t>
+            </a:r>
+          </a:p>
+          <a:p>
+            <a:pPr marL="0" indent="0">
+              <a:buNone/>
+            </a:pPr>
+            <a:r>
+              <a:rPr lang="en-GB" b="1" dirty="0">
+                <a:latin typeface="Courier New"/>
+                <a:cs typeface="Courier New"/>
+              </a:rPr>
+              <a:t>  </a:t>
+            </a:r>
+            <a:r>
+              <a:rPr lang="en-GB" b="1" i="1" dirty="0" err="1">
+                <a:solidFill>
+                  <a:srgbClr val="3366FF"/>
+                </a:solidFill>
+                <a:latin typeface="Courier New"/>
+                <a:cs typeface="Courier New"/>
+              </a:rPr>
+              <a:t>int</a:t>
+            </a:r>
+            <a:r>
+              <a:rPr lang="en-GB" b="1" dirty="0">
+                <a:latin typeface="Courier New"/>
+                <a:cs typeface="Courier New"/>
+              </a:rPr>
+              <a:t> </a:t>
+            </a:r>
+            <a:r>
+              <a:rPr lang="en-GB" b="1" dirty="0" err="1">
+                <a:latin typeface="Courier New"/>
+                <a:cs typeface="Courier New"/>
+              </a:rPr>
+              <a:t>i</a:t>
+            </a:r>
+            <a:r>
+              <a:rPr lang="en-GB" b="1" dirty="0">
+                <a:latin typeface="Courier New"/>
+                <a:cs typeface="Courier New"/>
+              </a:rPr>
+              <a:t> = </a:t>
+            </a:r>
+            <a:r>
+              <a:rPr lang="en-GB" b="1" dirty="0" err="1">
+                <a:solidFill>
+                  <a:srgbClr val="3366FF"/>
+                </a:solidFill>
+                <a:latin typeface="Courier New"/>
+                <a:cs typeface="Courier New"/>
+              </a:rPr>
+              <a:t>get_global_id</a:t>
+            </a:r>
+            <a:r>
+              <a:rPr lang="en-GB" b="1" dirty="0">
+                <a:latin typeface="Courier New"/>
+                <a:cs typeface="Courier New"/>
+              </a:rPr>
+              <a:t>(</a:t>
+            </a:r>
+            <a:r>
+              <a:rPr lang="en-GB" b="1" dirty="0">
+                <a:solidFill>
+                  <a:srgbClr val="FF00FF"/>
+                </a:solidFill>
+                <a:latin typeface="Courier New"/>
+                <a:cs typeface="Courier New"/>
+              </a:rPr>
+              <a:t>0</a:t>
+            </a:r>
+            <a:r>
+              <a:rPr lang="en-GB" b="1" dirty="0">
+                <a:latin typeface="Courier New"/>
+                <a:cs typeface="Courier New"/>
+              </a:rPr>
+              <a:t>);</a:t>
+            </a:r>
+          </a:p>
+          <a:p>
+            <a:pPr marL="0" indent="0">
+              <a:buNone/>
+            </a:pPr>
+            <a:r>
+              <a:rPr lang="en-GB" b="1" dirty="0">
+                <a:latin typeface="Courier New"/>
+                <a:cs typeface="Courier New"/>
+              </a:rPr>
+              <a:t>  data[</a:t>
+            </a:r>
+            <a:r>
+              <a:rPr lang="en-GB" b="1" dirty="0" err="1">
+                <a:latin typeface="Courier New"/>
+                <a:cs typeface="Courier New"/>
+              </a:rPr>
+              <a:t>i</a:t>
+            </a:r>
+            <a:r>
+              <a:rPr lang="en-GB" b="1" dirty="0">
+                <a:latin typeface="Courier New"/>
+                <a:cs typeface="Courier New"/>
+              </a:rPr>
+              <a:t>] *= factor;</a:t>
+            </a:r>
+            <a:br>
+              <a:rPr lang="en-GB" b="1" dirty="0">
+                <a:latin typeface="Courier New"/>
+                <a:cs typeface="Courier New"/>
+              </a:rPr>
+            </a:br>
+            <a:r>
+              <a:rPr lang="en-GB" b="1" dirty="0">
+                <a:latin typeface="Courier New"/>
+                <a:cs typeface="Courier New"/>
+              </a:rPr>
+              <a:t>}</a:t>
+            </a:r>
+          </a:p>
+          <a:p>
+            <a:pPr marL="0" indent="0">
+              <a:buNone/>
+            </a:pPr>
+            <a:endParaRPr lang="en-GB" dirty="0">
+              <a:cs typeface="Trebuchet MS"/>
+            </a:endParaRPr>
+          </a:p>
+          <a:p>
+            <a:pPr marL="0" indent="0">
+              <a:buNone/>
+            </a:pPr>
+            <a:endParaRPr lang="en-GB" dirty="0">
+              <a:cs typeface="Trebuchet MS"/>
+            </a:endParaRPr>
+          </a:p>
+          <a:p>
+            <a:pPr marL="0" indent="0">
+              <a:buNone/>
+            </a:pPr>
+            <a:endParaRPr lang="en-GB" dirty="0">
+              <a:cs typeface="Trebuchet MS"/>
+            </a:endParaRPr>
+          </a:p>
+          <a:p>
+            <a:pPr marL="0" indent="0">
+              <a:buNone/>
+            </a:pPr>
+            <a:endParaRPr lang="en-GB" b="1" dirty="0">
+              <a:latin typeface="Courier New"/>
+              <a:cs typeface="Courier New"/>
+            </a:endParaRPr>
+          </a:p>
+          <a:p>
+            <a:pPr marL="0" indent="0">
+              <a:buNone/>
+            </a:pPr>
+            <a:endParaRPr lang="en-GB" b="1" dirty="0">
+              <a:latin typeface="Courier New"/>
+              <a:cs typeface="Courier New"/>
+            </a:endParaRPr>
+          </a:p>
+          <a:p>
+            <a:pPr marL="0" indent="0">
+              <a:buNone/>
+            </a:pPr>
+            <a:endParaRPr lang="en-GB" b="1" dirty="0">
+              <a:latin typeface="Courier New"/>
+              <a:cs typeface="Courier New"/>
+            </a:endParaRPr>
+          </a:p>
+          <a:p>
+            <a:pPr marL="0" indent="0">
+              <a:buNone/>
+            </a:pPr>
+            <a:endParaRPr lang="en-GB" b="1" dirty="0">
+              <a:latin typeface="Courier New"/>
+              <a:cs typeface="Courier New"/>
+            </a:endParaRPr>
+          </a:p>
+          <a:p>
+            <a:pPr marL="0" indent="0">
+              <a:buNone/>
+            </a:pPr>
+            <a:endParaRPr lang="en-GB" b="1" dirty="0">
+              <a:latin typeface="Courier New"/>
+              <a:cs typeface="Courier New"/>
+            </a:endParaRPr>
+          </a:p>
+          <a:p>
+            <a:pPr marL="0" indent="0">
+              <a:buNone/>
+            </a:pPr>
+            <a:endParaRPr lang="en-GB" b="1" dirty="0">
+              <a:latin typeface="Courier New"/>
+              <a:cs typeface="Courier New"/>
+            </a:endParaRPr>
+          </a:p>
+          <a:p>
+            <a:pPr marL="0" indent="0">
+              <a:buNone/>
+            </a:pPr>
+            <a:endParaRPr lang="en-GB" b="1" dirty="0">
+              <a:latin typeface="Courier New"/>
+              <a:cs typeface="Courier New"/>
+            </a:endParaRPr>
+          </a:p>
+          <a:p>
+            <a:pPr marL="0" indent="0">
+              <a:buNone/>
+            </a:pPr>
+            <a:r>
+              <a:rPr lang="en-GB" b="1" dirty="0" err="1">
+                <a:latin typeface="Courier New"/>
+                <a:cs typeface="Courier New"/>
+              </a:rPr>
+              <a:t>clBuildProgram</a:t>
+            </a:r>
+            <a:r>
+              <a:rPr lang="en-GB" b="1" dirty="0">
+                <a:latin typeface="Courier New"/>
+                <a:cs typeface="Courier New"/>
+              </a:rPr>
+              <a:t>(program, 0, NULL, NULL, NULL, NULL);</a:t>
+            </a:r>
+          </a:p>
+          <a:p>
+            <a:pPr marL="0" indent="0">
+              <a:buNone/>
+            </a:pPr>
+            <a:endParaRPr lang="en-GB" b="1" dirty="0">
+              <a:latin typeface="Courier New"/>
+              <a:cs typeface="Courier New"/>
+            </a:endParaRPr>
+          </a:p>
+        </p:txBody>
+      </p:sp>
+      <p:sp>
+        <p:nvSpPr>
+          <p:cNvPr id="5" name="Text Placeholder 4"/>
+          <p:cNvSpPr>
+            <a:spLocks noGrp="1"/>
+          </p:cNvSpPr>
+          <p:nvPr>
+            <p:ph type="body" sz="quarter" idx="3"/>
+          </p:nvPr>
+        </p:nvSpPr>
+        <p:spPr/>
+        <p:txBody>
+          <a:bodyPr>
+            <a:normAutofit fontScale="92500" lnSpcReduction="20000"/>
+          </a:bodyPr>
+          <a:lstStyle/>
+          <a:p>
+            <a:r>
+              <a:rPr lang="en-GB" dirty="0"/>
+              <a:t>Defining the value as a </a:t>
+            </a:r>
+            <a:r>
+              <a:rPr lang="en-GB" dirty="0" err="1"/>
+              <a:t>preprocessor</a:t>
+            </a:r>
+            <a:r>
+              <a:rPr lang="en-GB" dirty="0"/>
+              <a:t> macro</a:t>
+            </a:r>
+          </a:p>
+        </p:txBody>
+      </p:sp>
+      <p:sp>
+        <p:nvSpPr>
+          <p:cNvPr id="6" name="Content Placeholder 5"/>
+          <p:cNvSpPr>
+            <a:spLocks noGrp="1"/>
+          </p:cNvSpPr>
+          <p:nvPr>
+            <p:ph sz="quarter" idx="4"/>
+          </p:nvPr>
+        </p:nvSpPr>
+        <p:spPr>
+          <a:xfrm>
+            <a:off x="4645025" y="2174875"/>
+            <a:ext cx="4699391" cy="3951288"/>
+          </a:xfrm>
+        </p:spPr>
+        <p:txBody>
+          <a:bodyPr>
+            <a:normAutofit fontScale="55000" lnSpcReduction="20000"/>
+          </a:bodyPr>
+          <a:lstStyle/>
+          <a:p>
+            <a:pPr marL="0" indent="0">
+              <a:buNone/>
+            </a:pPr>
+            <a:r>
+              <a:rPr lang="en-GB" b="1" dirty="0">
+                <a:solidFill>
+                  <a:srgbClr val="C0504D"/>
+                </a:solidFill>
+                <a:latin typeface="Courier New"/>
+                <a:cs typeface="Courier New"/>
+              </a:rPr>
+              <a:t>kernel</a:t>
+            </a:r>
+            <a:r>
+              <a:rPr lang="en-GB" b="1" dirty="0">
+                <a:latin typeface="Courier New"/>
+                <a:cs typeface="Courier New"/>
+              </a:rPr>
+              <a:t> </a:t>
+            </a:r>
+            <a:r>
+              <a:rPr lang="en-GB" b="1" i="1" dirty="0">
+                <a:solidFill>
+                  <a:srgbClr val="3366FF"/>
+                </a:solidFill>
+                <a:latin typeface="Courier New"/>
+                <a:cs typeface="Courier New"/>
+              </a:rPr>
+              <a:t>void</a:t>
+            </a:r>
+            <a:r>
+              <a:rPr lang="en-GB" b="1" dirty="0">
+                <a:latin typeface="Courier New"/>
+                <a:cs typeface="Courier New"/>
+              </a:rPr>
+              <a:t> </a:t>
+            </a:r>
+            <a:r>
+              <a:rPr lang="en-GB" b="1" dirty="0" err="1">
+                <a:solidFill>
+                  <a:schemeClr val="accent3"/>
+                </a:solidFill>
+                <a:latin typeface="Courier New"/>
+                <a:cs typeface="Courier New"/>
+              </a:rPr>
+              <a:t>vecmul</a:t>
+            </a:r>
+            <a:r>
+              <a:rPr lang="en-GB" b="1" dirty="0">
+                <a:latin typeface="Courier New"/>
+                <a:cs typeface="Courier New"/>
+              </a:rPr>
+              <a:t>(</a:t>
+            </a:r>
+          </a:p>
+          <a:p>
+            <a:pPr marL="0" indent="0">
+              <a:buNone/>
+            </a:pPr>
+            <a:r>
+              <a:rPr lang="en-GB" b="1" dirty="0">
+                <a:latin typeface="Courier New"/>
+                <a:cs typeface="Courier New"/>
+              </a:rPr>
+              <a:t>  </a:t>
+            </a:r>
+            <a:r>
+              <a:rPr lang="en-GB" b="1" dirty="0">
+                <a:solidFill>
+                  <a:srgbClr val="C0504D"/>
+                </a:solidFill>
+                <a:latin typeface="Courier New"/>
+                <a:cs typeface="Courier New"/>
+              </a:rPr>
+              <a:t>global</a:t>
+            </a:r>
+            <a:r>
+              <a:rPr lang="en-GB" b="1" dirty="0">
+                <a:latin typeface="Courier New"/>
+                <a:cs typeface="Courier New"/>
+              </a:rPr>
+              <a:t> </a:t>
+            </a:r>
+            <a:r>
+              <a:rPr lang="en-GB" b="1" i="1" dirty="0">
+                <a:solidFill>
+                  <a:srgbClr val="3366FF"/>
+                </a:solidFill>
+                <a:latin typeface="Courier New"/>
+                <a:cs typeface="Courier New"/>
+              </a:rPr>
+              <a:t>float</a:t>
+            </a:r>
+            <a:r>
+              <a:rPr lang="en-GB" b="1" dirty="0">
+                <a:latin typeface="Courier New"/>
+                <a:cs typeface="Courier New"/>
+              </a:rPr>
+              <a:t> *data)</a:t>
+            </a:r>
+          </a:p>
+          <a:p>
+            <a:pPr marL="0" indent="0">
+              <a:buNone/>
+            </a:pPr>
+            <a:endParaRPr lang="en-GB" b="1" dirty="0">
+              <a:latin typeface="Courier New"/>
+              <a:cs typeface="Courier New"/>
+            </a:endParaRPr>
+          </a:p>
+          <a:p>
+            <a:pPr marL="0" indent="0">
+              <a:buNone/>
+            </a:pPr>
+            <a:r>
+              <a:rPr lang="en-GB" b="1" dirty="0">
+                <a:latin typeface="Courier New"/>
+                <a:cs typeface="Courier New"/>
+              </a:rPr>
+              <a:t>{</a:t>
+            </a:r>
+          </a:p>
+          <a:p>
+            <a:pPr marL="0" indent="0">
+              <a:buNone/>
+            </a:pPr>
+            <a:r>
+              <a:rPr lang="en-GB" b="1" dirty="0">
+                <a:latin typeface="Courier New"/>
+                <a:cs typeface="Courier New"/>
+              </a:rPr>
+              <a:t>  </a:t>
+            </a:r>
+            <a:r>
+              <a:rPr lang="en-GB" b="1" i="1" dirty="0" err="1">
+                <a:solidFill>
+                  <a:srgbClr val="3366FF"/>
+                </a:solidFill>
+                <a:latin typeface="Courier New"/>
+                <a:cs typeface="Courier New"/>
+              </a:rPr>
+              <a:t>int</a:t>
+            </a:r>
+            <a:r>
+              <a:rPr lang="en-GB" b="1" dirty="0">
+                <a:latin typeface="Courier New"/>
+                <a:cs typeface="Courier New"/>
+              </a:rPr>
+              <a:t> </a:t>
+            </a:r>
+            <a:r>
+              <a:rPr lang="en-GB" b="1" dirty="0" err="1">
+                <a:latin typeface="Courier New"/>
+                <a:cs typeface="Courier New"/>
+              </a:rPr>
+              <a:t>i</a:t>
+            </a:r>
+            <a:r>
+              <a:rPr lang="en-GB" b="1" dirty="0">
+                <a:latin typeface="Courier New"/>
+                <a:cs typeface="Courier New"/>
+              </a:rPr>
+              <a:t> = </a:t>
+            </a:r>
+            <a:r>
+              <a:rPr lang="en-GB" b="1" dirty="0" err="1">
+                <a:solidFill>
+                  <a:srgbClr val="3366FF"/>
+                </a:solidFill>
+                <a:latin typeface="Courier New"/>
+                <a:cs typeface="Courier New"/>
+              </a:rPr>
+              <a:t>get_global_id</a:t>
+            </a:r>
+            <a:r>
+              <a:rPr lang="en-GB" b="1" dirty="0">
+                <a:latin typeface="Courier New"/>
+                <a:cs typeface="Courier New"/>
+              </a:rPr>
+              <a:t>(</a:t>
+            </a:r>
+            <a:r>
+              <a:rPr lang="en-GB" b="1" dirty="0">
+                <a:solidFill>
+                  <a:srgbClr val="FF00FF"/>
+                </a:solidFill>
+                <a:latin typeface="Courier New"/>
+                <a:cs typeface="Courier New"/>
+              </a:rPr>
+              <a:t>0</a:t>
+            </a:r>
+            <a:r>
+              <a:rPr lang="en-GB" b="1" dirty="0">
+                <a:latin typeface="Courier New"/>
+                <a:cs typeface="Courier New"/>
+              </a:rPr>
+              <a:t>);</a:t>
+            </a:r>
+          </a:p>
+          <a:p>
+            <a:pPr marL="0" indent="0">
+              <a:buNone/>
+            </a:pPr>
+            <a:r>
+              <a:rPr lang="en-GB" b="1" dirty="0">
+                <a:latin typeface="Courier New"/>
+                <a:cs typeface="Courier New"/>
+              </a:rPr>
+              <a:t>  data[</a:t>
+            </a:r>
+            <a:r>
+              <a:rPr lang="en-GB" b="1" dirty="0" err="1">
+                <a:latin typeface="Courier New"/>
+                <a:cs typeface="Courier New"/>
+              </a:rPr>
+              <a:t>i</a:t>
+            </a:r>
+            <a:r>
+              <a:rPr lang="en-GB" b="1" dirty="0">
+                <a:latin typeface="Courier New"/>
+                <a:cs typeface="Courier New"/>
+              </a:rPr>
+              <a:t>] *= factor;</a:t>
+            </a:r>
+            <a:br>
+              <a:rPr lang="en-GB" b="1" dirty="0">
+                <a:latin typeface="Courier New"/>
+                <a:cs typeface="Courier New"/>
+              </a:rPr>
+            </a:br>
+            <a:r>
+              <a:rPr lang="en-GB" b="1" dirty="0">
+                <a:latin typeface="Courier New"/>
+                <a:cs typeface="Courier New"/>
+              </a:rPr>
+              <a:t>}</a:t>
+            </a:r>
+          </a:p>
+          <a:p>
+            <a:pPr marL="0" indent="0">
+              <a:buNone/>
+            </a:pPr>
+            <a:endParaRPr lang="en-GB" b="1" dirty="0">
+              <a:latin typeface="Courier New"/>
+              <a:cs typeface="Courier New"/>
+            </a:endParaRPr>
+          </a:p>
+          <a:p>
+            <a:pPr marL="0" indent="0">
+              <a:buNone/>
+            </a:pPr>
+            <a:endParaRPr lang="en-GB" b="1" dirty="0">
+              <a:latin typeface="Courier New"/>
+              <a:cs typeface="Courier New"/>
+            </a:endParaRPr>
+          </a:p>
+          <a:p>
+            <a:pPr marL="0" indent="0">
+              <a:buNone/>
+            </a:pPr>
+            <a:endParaRPr lang="en-GB" b="1" dirty="0">
+              <a:latin typeface="Courier New"/>
+              <a:cs typeface="Courier New"/>
+            </a:endParaRPr>
+          </a:p>
+          <a:p>
+            <a:pPr marL="0" indent="0">
+              <a:buNone/>
+            </a:pPr>
+            <a:endParaRPr lang="en-GB" b="1" dirty="0">
+              <a:latin typeface="Courier New"/>
+              <a:cs typeface="Courier New"/>
+            </a:endParaRPr>
+          </a:p>
+          <a:p>
+            <a:pPr marL="0" indent="0">
+              <a:buNone/>
+            </a:pPr>
+            <a:r>
+              <a:rPr lang="en-GB" b="1" dirty="0" err="1">
+                <a:latin typeface="Courier New"/>
+                <a:cs typeface="Courier New"/>
+              </a:rPr>
+              <a:t>sprintf</a:t>
+            </a:r>
+            <a:r>
+              <a:rPr lang="en-GB" b="1" dirty="0">
+                <a:latin typeface="Courier New"/>
+                <a:cs typeface="Courier New"/>
+              </a:rPr>
+              <a:t>(options, “-</a:t>
+            </a:r>
+            <a:r>
+              <a:rPr lang="en-GB" b="1" dirty="0" err="1">
+                <a:latin typeface="Courier New"/>
+                <a:cs typeface="Courier New"/>
+              </a:rPr>
+              <a:t>Dfactor</a:t>
+            </a:r>
+            <a:r>
+              <a:rPr lang="en-GB" b="1" dirty="0">
+                <a:latin typeface="Courier New"/>
+                <a:cs typeface="Courier New"/>
+              </a:rPr>
+              <a:t>=%f”, </a:t>
+            </a:r>
+            <a:r>
+              <a:rPr lang="en-GB" b="1" dirty="0" err="1">
+                <a:latin typeface="Courier New"/>
+                <a:cs typeface="Courier New"/>
+              </a:rPr>
+              <a:t>userFactor</a:t>
+            </a:r>
+            <a:r>
+              <a:rPr lang="en-GB" b="1" dirty="0">
+                <a:latin typeface="Courier New"/>
+                <a:cs typeface="Courier New"/>
+              </a:rPr>
+              <a:t>);</a:t>
+            </a:r>
+          </a:p>
+          <a:p>
+            <a:pPr marL="0" indent="0">
+              <a:buNone/>
+            </a:pPr>
+            <a:r>
+              <a:rPr lang="en-GB" b="1" dirty="0" err="1">
+                <a:latin typeface="Courier New"/>
+                <a:cs typeface="Courier New"/>
+              </a:rPr>
+              <a:t>clBuildProgram</a:t>
+            </a:r>
+            <a:r>
+              <a:rPr lang="en-GB" b="1" dirty="0">
+                <a:latin typeface="Courier New"/>
+                <a:cs typeface="Courier New"/>
+              </a:rPr>
+              <a:t>(program, 0, NULL, options, NULL, NULL);</a:t>
+            </a:r>
+          </a:p>
+        </p:txBody>
+      </p:sp>
+      <p:sp>
+        <p:nvSpPr>
+          <p:cNvPr id="8" name="Slide Number Placeholder 7">
+            <a:extLst>
+              <a:ext uri="{FF2B5EF4-FFF2-40B4-BE49-F238E27FC236}">
+                <a16:creationId xmlns:a16="http://schemas.microsoft.com/office/drawing/2014/main" id="{522E97C2-105C-FA45-A1A4-02049B3C0A9F}"/>
+              </a:ext>
+            </a:extLst>
+          </p:cNvPr>
+          <p:cNvSpPr>
+            <a:spLocks noGrp="1"/>
+          </p:cNvSpPr>
+          <p:nvPr>
+            <p:ph type="sldNum" sz="quarter" idx="12"/>
+          </p:nvPr>
+        </p:nvSpPr>
+        <p:spPr/>
+        <p:txBody>
+          <a:bodyPr/>
+          <a:lstStyle/>
+          <a:p>
+            <a:fld id="{412843D3-244E-7B40-8F83-4C5ACBCBD5F2}" type="slidenum">
+              <a:rPr lang="en-GB" smtClean="0"/>
+              <a:t>26</a:t>
+            </a:fld>
+            <a:endParaRPr lang="en-GB"/>
+          </a:p>
+        </p:txBody>
+      </p:sp>
+    </p:spTree>
+    <p:extLst>
+      <p:ext uri="{BB962C8B-B14F-4D97-AF65-F5344CB8AC3E}">
+        <p14:creationId xmlns:p14="http://schemas.microsoft.com/office/powerpoint/2010/main" val="3730386915"/>
+      </p:ext>
+    </p:extLst>
+  </p:cSld>
+  <p:clrMapOvr>
+    <a:masterClrMapping/>
+  </p:clrMapOvr>
+  <p:timing>
+    <p:tnLst>
+      <p:par>
+        <p:cTn id="1" dur="indefinite" restart="never" nodeType="tmRoot">
+          <p:childTnLst>
+            <p:seq concurrent="1" nextAc="seek">
+              <p:cTn id="2" dur="indefinite" nodeType="mainSeq">
+                <p:childTnLst>
                   <p:par>
-                    <p:cTn id="11" fill="hold">
+                    <p:cTn id="3" fill="hold">
                       <p:stCondLst>
                         <p:cond delay="indefinite"/>
                       </p:stCondLst>
                       <p:childTnLst>
                         <p:par>
-                          <p:cTn id="12" fill="hold">
+                          <p:cTn id="4" fill="hold">
                             <p:stCondLst>
                               <p:cond delay="0"/>
                             </p:stCondLst>
                             <p:childTnLst>
                               <p:par>
-                                <p:cTn id="13" presetID="1" presetClass="exit" presetSubtype="0" fill="hold" grpId="1" nodeType="clickEffect">
+                                <p:cTn id="5" presetID="1" presetClass="entr" presetSubtype="0" fill="hold" grpId="0" nodeType="clickEffect">
                                   <p:stCondLst>
                                     <p:cond delay="0"/>
                                   </p:stCondLst>
                                   <p:childTnLst>
                                     <p:set>
                                       <p:cBhvr>
-                                        <p:cTn id="14" dur="1" fill="hold">
-                                          <p:stCondLst>
-                                            <p:cond delay="0"/>
-                                          </p:stCondLst>
-                                        </p:cTn>
-                                        <p:tgtEl>
-                                          <p:spTgt spid="7"/>
-                                        </p:tgtEl>
-                                        <p:attrNameLst>
-                                          <p:attrName>style.visibility</p:attrName>
-                                        </p:attrNameLst>
-                                      </p:cBhvr>
-                                      <p:to>
-                                        <p:strVal val="hidden"/>
-                                      </p:to>
-                                    </p:set>
-                                  </p:childTnLst>
-                                </p:cTn>
-                              </p:par>
-                              <p:par>
-                                <p:cTn id="15" presetID="1" presetClass="exit" presetSubtype="0" fill="hold" nodeType="withEffect">
-                                  <p:stCondLst>
-                                    <p:cond delay="0"/>
-                                  </p:stCondLst>
-                                  <p:childTnLst>
-                                    <p:set>
-                                      <p:cBhvr>
-                                        <p:cTn id="16" dur="1" fill="hold">
-                                          <p:stCondLst>
-                                            <p:cond delay="0"/>
-                                          </p:stCondLst>
-                                        </p:cTn>
-                                        <p:tgtEl>
-                                          <p:spTgt spid="11"/>
-                                        </p:tgtEl>
-                                        <p:attrNameLst>
-                                          <p:attrName>style.visibility</p:attrName>
-                                        </p:attrNameLst>
-                                      </p:cBhvr>
-                                      <p:to>
-                                        <p:strVal val="hidden"/>
-                                      </p:to>
-                                    </p:set>
-                                  </p:childTnLst>
-                                </p:cTn>
-                              </p:par>
-                              <p:par>
-                                <p:cTn id="17" presetID="1" presetClass="exit" presetSubtype="0" fill="hold" nodeType="withEffect">
-                                  <p:stCondLst>
-                                    <p:cond delay="0"/>
-                                  </p:stCondLst>
-                                  <p:childTnLst>
-                                    <p:set>
-                                      <p:cBhvr>
-                                        <p:cTn id="18" dur="1" fill="hold">
-                                          <p:stCondLst>
-                                            <p:cond delay="0"/>
-                                          </p:stCondLst>
-                                        </p:cTn>
-                                        <p:tgtEl>
-                                          <p:spTgt spid="9"/>
-                                        </p:tgtEl>
-                                        <p:attrNameLst>
-                                          <p:attrName>style.visibility</p:attrName>
-                                        </p:attrNameLst>
-                                      </p:cBhvr>
-                                      <p:to>
-                                        <p:strVal val="hidden"/>
-                                      </p:to>
-                                    </p:set>
-                                  </p:childTnLst>
-                                </p:cTn>
-                              </p:par>
-                              <p:par>
-                                <p:cTn id="19" presetID="1" presetClass="entr" presetSubtype="0" fill="hold" grpId="0" nodeType="withEffect">
-                                  <p:stCondLst>
-                                    <p:cond delay="0"/>
-                                  </p:stCondLst>
-                                  <p:childTnLst>
-                                    <p:set>
-                                      <p:cBhvr>
-                                        <p:cTn id="20" dur="1" fill="hold">
-                                          <p:stCondLst>
-                                            <p:cond delay="0"/>
-                                          </p:stCondLst>
-                                        </p:cTn>
-                                        <p:tgtEl>
-                                          <p:spTgt spid="5">
-                                            <p:txEl>
-                                              <p:pRg st="0" end="0"/>
-                                            </p:txEl>
-                                          </p:spTgt>
-                                        </p:tgtEl>
-                                        <p:attrNameLst>
-                                          <p:attrName>style.visibility</p:attrName>
-                                        </p:attrNameLst>
-                                      </p:cBhvr>
-                                      <p:to>
-                                        <p:strVal val="visible"/>
-                                      </p:to>
-                                    </p:set>
-                                  </p:childTnLst>
-                                </p:cTn>
-                              </p:par>
-                              <p:par>
-                                <p:cTn id="21" presetID="1" presetClass="entr" presetSubtype="0" fill="hold" grpId="0" nodeType="withEffect">
-                                  <p:stCondLst>
-                                    <p:cond delay="0"/>
-                                  </p:stCondLst>
-                                  <p:childTnLst>
-                                    <p:set>
-                                      <p:cBhvr>
-                                        <p:cTn id="22" dur="1" fill="hold">
-                                          <p:stCondLst>
-                                            <p:cond delay="0"/>
-                                          </p:stCondLst>
-                                        </p:cTn>
-                                        <p:tgtEl>
-                                          <p:spTgt spid="6">
-                                            <p:txEl>
-                                              <p:pRg st="0" end="0"/>
-                                            </p:txEl>
-                                          </p:spTgt>
-                                        </p:tgtEl>
-                                        <p:attrNameLst>
-                                          <p:attrName>style.visibility</p:attrName>
-                                        </p:attrNameLst>
-                                      </p:cBhvr>
-                                      <p:to>
-                                        <p:strVal val="visible"/>
-                                      </p:to>
-                                    </p:set>
-                                  </p:childTnLst>
-                                </p:cTn>
-                              </p:par>
-                              <p:par>
-                                <p:cTn id="23" presetID="1" presetClass="entr" presetSubtype="0" fill="hold" grpId="0" nodeType="withEffect">
-                                  <p:stCondLst>
-                                    <p:cond delay="0"/>
-                                  </p:stCondLst>
-                                  <p:childTnLst>
-                                    <p:set>
-                                      <p:cBhvr>
-                                        <p:cTn id="24" dur="1" fill="hold">
-                                          <p:stCondLst>
-                                            <p:cond delay="0"/>
-                                          </p:stCondLst>
-                                        </p:cTn>
-                                        <p:tgtEl>
-                                          <p:spTgt spid="6">
-                                            <p:txEl>
-                                              <p:pRg st="1" end="1"/>
-                                            </p:txEl>
-                                          </p:spTgt>
-                                        </p:tgtEl>
-                                        <p:attrNameLst>
-                                          <p:attrName>style.visibility</p:attrName>
-                                        </p:attrNameLst>
-                                      </p:cBhvr>
-                                      <p:to>
-                                        <p:strVal val="visible"/>
-                                      </p:to>
-                                    </p:set>
-                                  </p:childTnLst>
-                                </p:cTn>
-                              </p:par>
-                              <p:par>
-                                <p:cTn id="25" presetID="1" presetClass="entr" presetSubtype="0" fill="hold" grpId="0" nodeType="withEffect">
-                                  <p:stCondLst>
-                                    <p:cond delay="0"/>
-                                  </p:stCondLst>
-                                  <p:childTnLst>
-                                    <p:set>
-                                      <p:cBhvr>
-                                        <p:cTn id="26" dur="1" fill="hold">
-                                          <p:stCondLst>
-                                            <p:cond delay="0"/>
-                                          </p:stCondLst>
-                                        </p:cTn>
-                                        <p:tgtEl>
-                                          <p:spTgt spid="6">
-                                            <p:txEl>
-                                              <p:pRg st="3" end="3"/>
-                                            </p:txEl>
-                                          </p:spTgt>
-                                        </p:tgtEl>
-                                        <p:attrNameLst>
-                                          <p:attrName>style.visibility</p:attrName>
-                                        </p:attrNameLst>
-                                      </p:cBhvr>
-                                      <p:to>
-                                        <p:strVal val="visible"/>
-                                      </p:to>
-                                    </p:set>
-                                  </p:childTnLst>
-                                </p:cTn>
-                              </p:par>
-                              <p:par>
-                                <p:cTn id="27" presetID="1" presetClass="entr" presetSubtype="0" fill="hold" grpId="0" nodeType="withEffect">
-                                  <p:stCondLst>
-                                    <p:cond delay="0"/>
-                                  </p:stCondLst>
-                                  <p:childTnLst>
-                                    <p:set>
-                                      <p:cBhvr>
-                                        <p:cTn id="28" dur="1" fill="hold">
-                                          <p:stCondLst>
-                                            <p:cond delay="0"/>
-                                          </p:stCondLst>
-                                        </p:cTn>
-                                        <p:tgtEl>
-                                          <p:spTgt spid="6">
-                                            <p:txEl>
-                                              <p:pRg st="4" end="4"/>
-                                            </p:txEl>
-                                          </p:spTgt>
-                                        </p:tgtEl>
-                                        <p:attrNameLst>
-                                          <p:attrName>style.visibility</p:attrName>
-                                        </p:attrNameLst>
-                                      </p:cBhvr>
-                                      <p:to>
-                                        <p:strVal val="visible"/>
-                                      </p:to>
-                                    </p:set>
-                                  </p:childTnLst>
-                                </p:cTn>
-                              </p:par>
-                              <p:par>
-                                <p:cTn id="29" presetID="1" presetClass="entr" presetSubtype="0" fill="hold" grpId="0" nodeType="withEffect">
-                                  <p:stCondLst>
-                                    <p:cond delay="0"/>
-                                  </p:stCondLst>
-                                  <p:childTnLst>
-                                    <p:set>
-                                      <p:cBhvr>
-                                        <p:cTn id="30" dur="1" fill="hold">
-                                          <p:stCondLst>
-                                            <p:cond delay="0"/>
-                                          </p:stCondLst>
-                                        </p:cTn>
-                                        <p:tgtEl>
-                                          <p:spTgt spid="6">
-                                            <p:txEl>
-                                              <p:pRg st="5" end="5"/>
-                                            </p:txEl>
-                                          </p:spTgt>
-                                        </p:tgtEl>
-                                        <p:attrNameLst>
-                                          <p:attrName>style.visibility</p:attrName>
-                                        </p:attrNameLst>
-                                      </p:cBhvr>
-                                      <p:to>
-                                        <p:strVal val="visible"/>
-                                      </p:to>
-                                    </p:set>
-                                  </p:childTnLst>
-                                </p:cTn>
-                              </p:par>
-                              <p:par>
-                                <p:cTn id="31" presetID="1" presetClass="entr" presetSubtype="0" fill="hold" grpId="0" nodeType="withEffect">
-                                  <p:stCondLst>
-                                    <p:cond delay="0"/>
-                                  </p:stCondLst>
-                                  <p:childTnLst>
-                                    <p:set>
-                                      <p:cBhvr>
-                                        <p:cTn id="32" dur="1" fill="hold">
-                                          <p:stCondLst>
-                                            <p:cond delay="0"/>
-                                          </p:stCondLst>
-                                        </p:cTn>
-                                        <p:tgtEl>
-                                          <p:spTgt spid="6">
-                                            <p:txEl>
-                                              <p:pRg st="10" end="10"/>
-                                            </p:txEl>
-                                          </p:spTgt>
-                                        </p:tgtEl>
-                                        <p:attrNameLst>
-                                          <p:attrName>style.visibility</p:attrName>
-                                        </p:attrNameLst>
-                                      </p:cBhvr>
-                                      <p:to>
-                                        <p:strVal val="visible"/>
-                                      </p:to>
-                                    </p:set>
-                                  </p:childTnLst>
-                                </p:cTn>
-                              </p:par>
-                            </p:childTnLst>
-                          </p:cTn>
-                        </p:par>
-                      </p:childTnLst>
-                    </p:cTn>
-                  </p:par>
-                  <p:par>
-                    <p:cTn id="33" fill="hold">
-                      <p:stCondLst>
-                        <p:cond delay="indefinite"/>
-                      </p:stCondLst>
-                      <p:childTnLst>
-                        <p:par>
-                          <p:cTn id="34" fill="hold">
-                            <p:stCondLst>
-                              <p:cond delay="0"/>
-                            </p:stCondLst>
-                            <p:childTnLst>
-                              <p:par>
-                                <p:cTn id="35" presetID="1" presetClass="entr" presetSubtype="0" fill="hold" grpId="0" nodeType="clickEffect">
-                                  <p:stCondLst>
-                                    <p:cond delay="0"/>
-                                  </p:stCondLst>
-                                  <p:childTnLst>
-                                    <p:set>
-                                      <p:cBhvr>
-                                        <p:cTn id="36" dur="1" fill="hold">
+                                        <p:cTn id="6" dur="1" fill="hold">
                                           <p:stCondLst>
                                             <p:cond delay="0"/>
                                           </p:stCondLst>
@@ -11614,263 +11873,9 @@
       </p:par>
     </p:tnLst>
     <p:bldLst>
-      <p:bldP spid="5" grpId="0" build="allAtOnce"/>
-      <p:bldP spid="6" grpId="0" build="p"/>
-      <p:bldP spid="7" grpId="0" animBg="1"/>
-      <p:bldP spid="7" grpId="1" animBg="1"/>
+      <p:bldP spid="6" grpId="0" uiExpand="1" build="p"/>
     </p:bldLst>
   </p:timing>
-</p:sld>
-</file>
-
-<file path=ppt/slides/slide26.xml><?xml version="1.0" encoding="utf-8"?>
-<p:sld xmlns:a="http://schemas.openxmlformats.org/drawingml/2006/main" xmlns:r="http://schemas.openxmlformats.org/officeDocument/2006/relationships" xmlns:p="http://schemas.openxmlformats.org/presentationml/2006/main">
-  <p:cSld>
-    <p:spTree>
-      <p:nvGrpSpPr>
-        <p:cNvPr id="1" name=""/>
-        <p:cNvGrpSpPr/>
-        <p:nvPr/>
-      </p:nvGrpSpPr>
-      <p:grpSpPr>
-        <a:xfrm>
-          <a:off x="0" y="0"/>
-          <a:ext cx="0" cy="0"/>
-          <a:chOff x="0" y="0"/>
-          <a:chExt cx="0" cy="0"/>
-        </a:xfrm>
-      </p:grpSpPr>
-      <p:sp>
-        <p:nvSpPr>
-          <p:cNvPr id="2" name="Title 1"/>
-          <p:cNvSpPr>
-            <a:spLocks noGrp="1"/>
-          </p:cNvSpPr>
-          <p:nvPr>
-            <p:ph type="title"/>
-          </p:nvPr>
-        </p:nvSpPr>
-        <p:spPr/>
-        <p:txBody>
-          <a:bodyPr/>
-          <a:lstStyle/>
-          <a:p>
-            <a:r>
-              <a:rPr lang="en-GB" dirty="0" err="1"/>
-              <a:t>Metaprogramming</a:t>
-            </a:r>
-            <a:endParaRPr lang="en-GB" dirty="0"/>
-          </a:p>
-        </p:txBody>
-      </p:sp>
-      <p:sp>
-        <p:nvSpPr>
-          <p:cNvPr id="3" name="Content Placeholder 2"/>
-          <p:cNvSpPr>
-            <a:spLocks noGrp="1"/>
-          </p:cNvSpPr>
-          <p:nvPr>
-            <p:ph idx="1"/>
-          </p:nvPr>
-        </p:nvSpPr>
-        <p:spPr>
-          <a:xfrm>
-            <a:off x="457200" y="1600200"/>
-            <a:ext cx="8229600" cy="5141168"/>
-          </a:xfrm>
-        </p:spPr>
-        <p:txBody>
-          <a:bodyPr>
-            <a:normAutofit fontScale="85000" lnSpcReduction="10000"/>
-          </a:bodyPr>
-          <a:lstStyle/>
-          <a:p>
-            <a:pPr>
-              <a:lnSpc>
-                <a:spcPct val="110000"/>
-              </a:lnSpc>
-            </a:pPr>
-            <a:r>
-              <a:rPr lang="en-GB" dirty="0"/>
-              <a:t>Can be used to dynamically change the precision of a kernel</a:t>
-            </a:r>
-          </a:p>
-          <a:p>
-            <a:pPr lvl="1">
-              <a:lnSpc>
-                <a:spcPct val="110000"/>
-              </a:lnSpc>
-            </a:pPr>
-            <a:r>
-              <a:rPr lang="en-GB" dirty="0"/>
-              <a:t>Use </a:t>
-            </a:r>
-            <a:r>
-              <a:rPr lang="en-GB" b="1" dirty="0">
-                <a:solidFill>
-                  <a:srgbClr val="3366FF"/>
-                </a:solidFill>
-                <a:latin typeface="Courier New"/>
-                <a:cs typeface="Courier New"/>
-              </a:rPr>
-              <a:t>REAL</a:t>
-            </a:r>
-            <a:r>
-              <a:rPr lang="en-GB" dirty="0">
-                <a:solidFill>
-                  <a:srgbClr val="3366FF"/>
-                </a:solidFill>
-              </a:rPr>
-              <a:t> </a:t>
-            </a:r>
-            <a:r>
-              <a:rPr lang="en-GB" dirty="0"/>
-              <a:t>instead of </a:t>
-            </a:r>
-            <a:r>
-              <a:rPr lang="en-GB" b="1" dirty="0">
-                <a:solidFill>
-                  <a:srgbClr val="3366FF"/>
-                </a:solidFill>
-                <a:latin typeface="Courier New"/>
-                <a:cs typeface="Courier New"/>
-              </a:rPr>
-              <a:t>float/double</a:t>
-            </a:r>
-            <a:r>
-              <a:rPr lang="en-GB" dirty="0"/>
-              <a:t>, then define </a:t>
-            </a:r>
-            <a:r>
-              <a:rPr lang="en-GB" b="1" dirty="0">
-                <a:solidFill>
-                  <a:srgbClr val="3366FF"/>
-                </a:solidFill>
-                <a:latin typeface="Courier New"/>
-                <a:cs typeface="Courier New"/>
-              </a:rPr>
-              <a:t>REAL</a:t>
-            </a:r>
-            <a:r>
-              <a:rPr lang="en-GB" dirty="0">
-                <a:solidFill>
-                  <a:srgbClr val="3366FF"/>
-                </a:solidFill>
-              </a:rPr>
-              <a:t> </a:t>
-            </a:r>
-            <a:r>
-              <a:rPr lang="en-GB" dirty="0"/>
-              <a:t>at runtime using OpenCL build options: </a:t>
-            </a:r>
-            <a:r>
-              <a:rPr lang="en-GB" b="1" dirty="0">
-                <a:solidFill>
-                  <a:srgbClr val="3366FF"/>
-                </a:solidFill>
-                <a:latin typeface="Courier New"/>
-                <a:cs typeface="Courier New"/>
-              </a:rPr>
-              <a:t>–DREAL=type</a:t>
-            </a:r>
-          </a:p>
-          <a:p>
-            <a:pPr>
-              <a:lnSpc>
-                <a:spcPct val="110000"/>
-              </a:lnSpc>
-            </a:pPr>
-            <a:r>
-              <a:rPr lang="en-GB" dirty="0">
-                <a:latin typeface="Trebuchet MS"/>
-                <a:cs typeface="Trebuchet MS"/>
-              </a:rPr>
-              <a:t>Can make runtime decisions that change the functionality of the kernel, or change the way that it is implemented to improve performance portability</a:t>
-            </a:r>
-          </a:p>
-          <a:p>
-            <a:pPr lvl="1">
-              <a:lnSpc>
-                <a:spcPct val="110000"/>
-              </a:lnSpc>
-            </a:pPr>
-            <a:r>
-              <a:rPr lang="en-GB" dirty="0">
-                <a:latin typeface="Trebuchet MS"/>
-                <a:cs typeface="Trebuchet MS"/>
-              </a:rPr>
-              <a:t>Switching between scalar and vector types</a:t>
-            </a:r>
-          </a:p>
-          <a:p>
-            <a:pPr lvl="1">
-              <a:lnSpc>
-                <a:spcPct val="110000"/>
-              </a:lnSpc>
-            </a:pPr>
-            <a:r>
-              <a:rPr lang="en-GB" dirty="0">
-                <a:latin typeface="Trebuchet MS"/>
-                <a:cs typeface="Trebuchet MS"/>
-              </a:rPr>
-              <a:t>Changing whether data is stored in buffers or images</a:t>
-            </a:r>
-          </a:p>
-          <a:p>
-            <a:pPr lvl="1">
-              <a:lnSpc>
-                <a:spcPct val="110000"/>
-              </a:lnSpc>
-            </a:pPr>
-            <a:r>
-              <a:rPr lang="en-GB" dirty="0">
-                <a:latin typeface="Trebuchet MS"/>
-                <a:cs typeface="Trebuchet MS"/>
-              </a:rPr>
-              <a:t>Toggling use of local memory</a:t>
-            </a:r>
-          </a:p>
-        </p:txBody>
-      </p:sp>
-      <p:sp>
-        <p:nvSpPr>
-          <p:cNvPr id="4" name="Slide Number Placeholder 3">
-            <a:extLst>
-              <a:ext uri="{FF2B5EF4-FFF2-40B4-BE49-F238E27FC236}">
-                <a16:creationId xmlns:a16="http://schemas.microsoft.com/office/drawing/2014/main" id="{38EF515B-FCD1-144C-98E6-C84A0E82AA81}"/>
-              </a:ext>
-            </a:extLst>
-          </p:cNvPr>
-          <p:cNvSpPr>
-            <a:spLocks noGrp="1"/>
-          </p:cNvSpPr>
-          <p:nvPr>
-            <p:ph type="sldNum" sz="quarter" idx="12"/>
-          </p:nvPr>
-        </p:nvSpPr>
-        <p:spPr/>
-        <p:txBody>
-          <a:bodyPr/>
-          <a:lstStyle/>
-          <a:p>
-            <a:fld id="{412843D3-244E-7B40-8F83-4C5ACBCBD5F2}" type="slidenum">
-              <a:rPr lang="en-GB" smtClean="0"/>
-              <a:t>26</a:t>
-            </a:fld>
-            <a:endParaRPr lang="en-GB"/>
-          </a:p>
-        </p:txBody>
-      </p:sp>
-    </p:spTree>
-    <p:extLst>
-      <p:ext uri="{BB962C8B-B14F-4D97-AF65-F5344CB8AC3E}">
-        <p14:creationId xmlns:p14="http://schemas.microsoft.com/office/powerpoint/2010/main" val="4085093005"/>
-      </p:ext>
-    </p:extLst>
-  </p:cSld>
-  <p:clrMapOvr>
-    <a:masterClrMapping/>
-  </p:clrMapOvr>
 </p:sld>
 </file>
 
@@ -11926,6 +11931,257 @@
         </p:nvSpPr>
         <p:spPr>
           <a:xfrm>
+            <a:off x="457200" y="1600200"/>
+            <a:ext cx="8229600" cy="5141168"/>
+          </a:xfrm>
+        </p:spPr>
+        <p:txBody>
+          <a:bodyPr>
+            <a:normAutofit fontScale="85000" lnSpcReduction="10000"/>
+          </a:bodyPr>
+          <a:lstStyle/>
+          <a:p>
+            <a:pPr>
+              <a:lnSpc>
+                <a:spcPct val="110000"/>
+              </a:lnSpc>
+            </a:pPr>
+            <a:r>
+              <a:rPr lang="en-GB" dirty="0"/>
+              <a:t>Can be used to dynamically change the precision of a kernel</a:t>
+            </a:r>
+          </a:p>
+          <a:p>
+            <a:pPr lvl="1">
+              <a:lnSpc>
+                <a:spcPct val="110000"/>
+              </a:lnSpc>
+            </a:pPr>
+            <a:r>
+              <a:rPr lang="en-GB" dirty="0"/>
+              <a:t>Use </a:t>
+            </a:r>
+            <a:r>
+              <a:rPr lang="en-GB" b="1" dirty="0">
+                <a:solidFill>
+                  <a:srgbClr val="3366FF"/>
+                </a:solidFill>
+                <a:latin typeface="Courier New"/>
+                <a:cs typeface="Courier New"/>
+              </a:rPr>
+              <a:t>REAL</a:t>
+            </a:r>
+            <a:r>
+              <a:rPr lang="en-GB" dirty="0">
+                <a:solidFill>
+                  <a:srgbClr val="3366FF"/>
+                </a:solidFill>
+              </a:rPr>
+              <a:t> </a:t>
+            </a:r>
+            <a:r>
+              <a:rPr lang="en-GB" dirty="0"/>
+              <a:t>instead of </a:t>
+            </a:r>
+            <a:r>
+              <a:rPr lang="en-GB" b="1" dirty="0">
+                <a:solidFill>
+                  <a:srgbClr val="3366FF"/>
+                </a:solidFill>
+                <a:latin typeface="Courier New"/>
+                <a:cs typeface="Courier New"/>
+              </a:rPr>
+              <a:t>float/double</a:t>
+            </a:r>
+            <a:r>
+              <a:rPr lang="en-GB" dirty="0"/>
+              <a:t>, then define </a:t>
+            </a:r>
+            <a:r>
+              <a:rPr lang="en-GB" b="1" dirty="0">
+                <a:solidFill>
+                  <a:srgbClr val="3366FF"/>
+                </a:solidFill>
+                <a:latin typeface="Courier New"/>
+                <a:cs typeface="Courier New"/>
+              </a:rPr>
+              <a:t>REAL</a:t>
+            </a:r>
+            <a:r>
+              <a:rPr lang="en-GB" dirty="0">
+                <a:solidFill>
+                  <a:srgbClr val="3366FF"/>
+                </a:solidFill>
+              </a:rPr>
+              <a:t> </a:t>
+            </a:r>
+            <a:r>
+              <a:rPr lang="en-GB" dirty="0"/>
+              <a:t>at runtime using OpenCL build options: </a:t>
+            </a:r>
+            <a:r>
+              <a:rPr lang="en-GB" b="1" dirty="0">
+                <a:solidFill>
+                  <a:srgbClr val="3366FF"/>
+                </a:solidFill>
+                <a:latin typeface="Courier New"/>
+                <a:cs typeface="Courier New"/>
+              </a:rPr>
+              <a:t>–DREAL=type</a:t>
+            </a:r>
+          </a:p>
+          <a:p>
+            <a:pPr>
+              <a:lnSpc>
+                <a:spcPct val="110000"/>
+              </a:lnSpc>
+            </a:pPr>
+            <a:r>
+              <a:rPr lang="en-GB" dirty="0">
+                <a:latin typeface="Trebuchet MS"/>
+                <a:cs typeface="Trebuchet MS"/>
+              </a:rPr>
+              <a:t>Can make runtime decisions that change the functionality of the kernel, or change the way that it is implemented to improve performance portability</a:t>
+            </a:r>
+          </a:p>
+          <a:p>
+            <a:pPr lvl="1">
+              <a:lnSpc>
+                <a:spcPct val="110000"/>
+              </a:lnSpc>
+            </a:pPr>
+            <a:r>
+              <a:rPr lang="en-GB" dirty="0">
+                <a:latin typeface="Trebuchet MS"/>
+                <a:cs typeface="Trebuchet MS"/>
+              </a:rPr>
+              <a:t>Switching between scalar and vector types</a:t>
+            </a:r>
+          </a:p>
+          <a:p>
+            <a:pPr lvl="1">
+              <a:lnSpc>
+                <a:spcPct val="110000"/>
+              </a:lnSpc>
+            </a:pPr>
+            <a:r>
+              <a:rPr lang="en-GB" dirty="0">
+                <a:latin typeface="Trebuchet MS"/>
+                <a:cs typeface="Trebuchet MS"/>
+              </a:rPr>
+              <a:t>Changing whether data is stored in buffers or images</a:t>
+            </a:r>
+          </a:p>
+          <a:p>
+            <a:pPr lvl="1">
+              <a:lnSpc>
+                <a:spcPct val="110000"/>
+              </a:lnSpc>
+            </a:pPr>
+            <a:r>
+              <a:rPr lang="en-GB" dirty="0">
+                <a:latin typeface="Trebuchet MS"/>
+                <a:cs typeface="Trebuchet MS"/>
+              </a:rPr>
+              <a:t>Toggling use of local memory</a:t>
+            </a:r>
+          </a:p>
+        </p:txBody>
+      </p:sp>
+      <p:sp>
+        <p:nvSpPr>
+          <p:cNvPr id="4" name="Slide Number Placeholder 3">
+            <a:extLst>
+              <a:ext uri="{FF2B5EF4-FFF2-40B4-BE49-F238E27FC236}">
+                <a16:creationId xmlns:a16="http://schemas.microsoft.com/office/drawing/2014/main" id="{38EF515B-FCD1-144C-98E6-C84A0E82AA81}"/>
+              </a:ext>
+            </a:extLst>
+          </p:cNvPr>
+          <p:cNvSpPr>
+            <a:spLocks noGrp="1"/>
+          </p:cNvSpPr>
+          <p:nvPr>
+            <p:ph type="sldNum" sz="quarter" idx="12"/>
+          </p:nvPr>
+        </p:nvSpPr>
+        <p:spPr/>
+        <p:txBody>
+          <a:bodyPr/>
+          <a:lstStyle/>
+          <a:p>
+            <a:fld id="{412843D3-244E-7B40-8F83-4C5ACBCBD5F2}" type="slidenum">
+              <a:rPr lang="en-GB" smtClean="0"/>
+              <a:t>27</a:t>
+            </a:fld>
+            <a:endParaRPr lang="en-GB"/>
+          </a:p>
+        </p:txBody>
+      </p:sp>
+    </p:spTree>
+    <p:extLst>
+      <p:ext uri="{BB962C8B-B14F-4D97-AF65-F5344CB8AC3E}">
+        <p14:creationId xmlns:p14="http://schemas.microsoft.com/office/powerpoint/2010/main" val="4085093005"/>
+      </p:ext>
+    </p:extLst>
+  </p:cSld>
+  <p:clrMapOvr>
+    <a:masterClrMapping/>
+  </p:clrMapOvr>
+</p:sld>
+</file>
+
+<file path=ppt/slides/slide28.xml><?xml version="1.0" encoding="utf-8"?>
+<p:sld xmlns:a="http://schemas.openxmlformats.org/drawingml/2006/main" xmlns:r="http://schemas.openxmlformats.org/officeDocument/2006/relationships" xmlns:p="http://schemas.openxmlformats.org/presentationml/2006/main">
+  <p:cSld>
+    <p:spTree>
+      <p:nvGrpSpPr>
+        <p:cNvPr id="1" name=""/>
+        <p:cNvGrpSpPr/>
+        <p:nvPr/>
+      </p:nvGrpSpPr>
+      <p:grpSpPr>
+        <a:xfrm>
+          <a:off x="0" y="0"/>
+          <a:ext cx="0" cy="0"/>
+          <a:chOff x="0" y="0"/>
+          <a:chExt cx="0" cy="0"/>
+        </a:xfrm>
+      </p:grpSpPr>
+      <p:sp>
+        <p:nvSpPr>
+          <p:cNvPr id="2" name="Title 1"/>
+          <p:cNvSpPr>
+            <a:spLocks noGrp="1"/>
+          </p:cNvSpPr>
+          <p:nvPr>
+            <p:ph type="title"/>
+          </p:nvPr>
+        </p:nvSpPr>
+        <p:spPr/>
+        <p:txBody>
+          <a:bodyPr/>
+          <a:lstStyle/>
+          <a:p>
+            <a:r>
+              <a:rPr lang="en-GB" dirty="0" err="1"/>
+              <a:t>Metaprogramming</a:t>
+            </a:r>
+            <a:endParaRPr lang="en-GB" dirty="0"/>
+          </a:p>
+        </p:txBody>
+      </p:sp>
+      <p:sp>
+        <p:nvSpPr>
+          <p:cNvPr id="3" name="Content Placeholder 2"/>
+          <p:cNvSpPr>
+            <a:spLocks noGrp="1"/>
+          </p:cNvSpPr>
+          <p:nvPr>
+            <p:ph idx="1"/>
+          </p:nvPr>
+        </p:nvSpPr>
+        <p:spPr>
+          <a:xfrm>
             <a:off x="457200" y="1600201"/>
             <a:ext cx="8229600" cy="2863866"/>
           </a:xfrm>
@@ -12578,7 +12834,7 @@
           <a:p>
             <a:fld id="{412843D3-244E-7B40-8F83-4C5ACBCBD5F2}" type="slidenum">
               <a:rPr lang="en-GB" smtClean="0"/>
-              <a:t>27</a:t>
+              <a:t>28</a:t>
             </a:fld>
             <a:endParaRPr lang="en-GB"/>
           </a:p>
@@ -12979,203 +13235,6 @@
 </p:sld>
 </file>
 
-<file path=ppt/slides/slide28.xml><?xml version="1.0" encoding="utf-8"?>
-<p:sld xmlns:a="http://schemas.openxmlformats.org/drawingml/2006/main" xmlns:r="http://schemas.openxmlformats.org/officeDocument/2006/relationships" xmlns:p="http://schemas.openxmlformats.org/presentationml/2006/main">
-  <p:cSld>
-    <p:spTree>
-      <p:nvGrpSpPr>
-        <p:cNvPr id="1" name=""/>
-        <p:cNvGrpSpPr/>
-        <p:nvPr/>
-      </p:nvGrpSpPr>
-      <p:grpSpPr>
-        <a:xfrm>
-          <a:off x="0" y="0"/>
-          <a:ext cx="0" cy="0"/>
-          <a:chOff x="0" y="0"/>
-          <a:chExt cx="0" cy="0"/>
-        </a:xfrm>
-      </p:grpSpPr>
-      <p:sp>
-        <p:nvSpPr>
-          <p:cNvPr id="2" name="Title 1"/>
-          <p:cNvSpPr>
-            <a:spLocks noGrp="1"/>
-          </p:cNvSpPr>
-          <p:nvPr>
-            <p:ph type="title"/>
-          </p:nvPr>
-        </p:nvSpPr>
-        <p:spPr/>
-        <p:txBody>
-          <a:bodyPr>
-            <a:normAutofit/>
-          </a:bodyPr>
-          <a:lstStyle/>
-          <a:p>
-            <a:r>
-              <a:rPr lang="en-GB" dirty="0"/>
-              <a:t>Exercise: kernel compilation</a:t>
-            </a:r>
-          </a:p>
-        </p:txBody>
-      </p:sp>
-      <p:sp>
-        <p:nvSpPr>
-          <p:cNvPr id="3" name="Content Placeholder 2"/>
-          <p:cNvSpPr>
-            <a:spLocks noGrp="1"/>
-          </p:cNvSpPr>
-          <p:nvPr>
-            <p:ph idx="1"/>
-          </p:nvPr>
-        </p:nvSpPr>
-        <p:spPr>
-          <a:xfrm>
-            <a:off x="457200" y="1600200"/>
-            <a:ext cx="8229600" cy="5257800"/>
-          </a:xfrm>
-        </p:spPr>
-        <p:txBody>
-          <a:bodyPr>
-            <a:normAutofit/>
-          </a:bodyPr>
-          <a:lstStyle/>
-          <a:p>
-            <a:r>
-              <a:rPr lang="en-GB" dirty="0"/>
-              <a:t>The example is a simple bilateral filter</a:t>
-            </a:r>
-          </a:p>
-          <a:p>
-            <a:pPr lvl="1"/>
-            <a:r>
-              <a:rPr lang="en-GB" dirty="0"/>
-              <a:t>Edge-preserving smoothing/noise reduction filter</a:t>
-            </a:r>
-          </a:p>
-          <a:p>
-            <a:pPr lvl="1"/>
-            <a:r>
-              <a:rPr lang="en-GB" dirty="0"/>
-              <a:t>Each pixel of the output image is some function of its neighbouring pixels from the input image</a:t>
-            </a:r>
-          </a:p>
-          <a:p>
-            <a:pPr lvl="1"/>
-            <a:r>
-              <a:rPr lang="en-GB" dirty="0"/>
-              <a:t>Uses </a:t>
-            </a:r>
-            <a:r>
-              <a:rPr lang="en-GB" b="1" dirty="0" err="1">
-                <a:solidFill>
-                  <a:srgbClr val="3366FF"/>
-                </a:solidFill>
-                <a:latin typeface="Courier New"/>
-                <a:cs typeface="Courier New"/>
-              </a:rPr>
-              <a:t>sqrt</a:t>
-            </a:r>
-            <a:r>
-              <a:rPr lang="en-GB" dirty="0"/>
-              <a:t>, </a:t>
-            </a:r>
-            <a:r>
-              <a:rPr lang="en-GB" b="1" dirty="0" err="1">
-                <a:solidFill>
-                  <a:srgbClr val="3366FF"/>
-                </a:solidFill>
-                <a:latin typeface="Courier New"/>
-                <a:cs typeface="Courier New"/>
-              </a:rPr>
-              <a:t>exp</a:t>
-            </a:r>
-            <a:r>
-              <a:rPr lang="en-GB" dirty="0">
-                <a:solidFill>
-                  <a:srgbClr val="3366FF"/>
-                </a:solidFill>
-              </a:rPr>
-              <a:t> </a:t>
-            </a:r>
-            <a:r>
-              <a:rPr lang="en-GB" dirty="0"/>
-              <a:t>and </a:t>
-            </a:r>
-            <a:r>
-              <a:rPr lang="en-GB" b="1" dirty="0">
-                <a:solidFill>
-                  <a:srgbClr val="3366FF"/>
-                </a:solidFill>
-                <a:latin typeface="Courier New"/>
-                <a:cs typeface="Courier New"/>
-              </a:rPr>
-              <a:t>distance</a:t>
-            </a:r>
-            <a:r>
-              <a:rPr lang="en-GB" dirty="0"/>
-              <a:t> </a:t>
-            </a:r>
-            <a:r>
-              <a:rPr lang="en-GB" dirty="0" err="1"/>
-              <a:t>builtins</a:t>
-            </a:r>
-            <a:endParaRPr lang="en-GB" dirty="0"/>
-          </a:p>
-          <a:p>
-            <a:endParaRPr lang="en-GB" dirty="0"/>
-          </a:p>
-          <a:p>
-            <a:r>
-              <a:rPr lang="en-GB" dirty="0"/>
-              <a:t>A fully working implementation of this code is provided as a starting point</a:t>
-            </a:r>
-          </a:p>
-        </p:txBody>
-      </p:sp>
-      <p:sp>
-        <p:nvSpPr>
-          <p:cNvPr id="4" name="Slide Number Placeholder 3">
-            <a:extLst>
-              <a:ext uri="{FF2B5EF4-FFF2-40B4-BE49-F238E27FC236}">
-                <a16:creationId xmlns:a16="http://schemas.microsoft.com/office/drawing/2014/main" id="{53C61C04-83DE-6B4E-A1F6-7E4E6B64BA56}"/>
-              </a:ext>
-            </a:extLst>
-          </p:cNvPr>
-          <p:cNvSpPr>
-            <a:spLocks noGrp="1"/>
-          </p:cNvSpPr>
-          <p:nvPr>
-            <p:ph type="sldNum" sz="quarter" idx="12"/>
-          </p:nvPr>
-        </p:nvSpPr>
-        <p:spPr/>
-        <p:txBody>
-          <a:bodyPr/>
-          <a:lstStyle/>
-          <a:p>
-            <a:fld id="{412843D3-244E-7B40-8F83-4C5ACBCBD5F2}" type="slidenum">
-              <a:rPr lang="en-GB" smtClean="0"/>
-              <a:t>28</a:t>
-            </a:fld>
-            <a:endParaRPr lang="en-GB"/>
-          </a:p>
-        </p:txBody>
-      </p:sp>
-    </p:spTree>
-    <p:extLst>
-      <p:ext uri="{BB962C8B-B14F-4D97-AF65-F5344CB8AC3E}">
-        <p14:creationId xmlns:p14="http://schemas.microsoft.com/office/powerpoint/2010/main" val="175238421"/>
-      </p:ext>
-    </p:extLst>
-  </p:cSld>
-  <p:clrMapOvr>
-    <a:masterClrMapping/>
-  </p:clrMapOvr>
-</p:sld>
-</file>
-
 <file path=ppt/slides/slide29.xml><?xml version="1.0" encoding="utf-8"?>
 <p:sld xmlns:a="http://schemas.openxmlformats.org/drawingml/2006/main" xmlns:r="http://schemas.openxmlformats.org/officeDocument/2006/relationships" xmlns:p="http://schemas.openxmlformats.org/presentationml/2006/main">
   <p:cSld>
@@ -13203,12 +13262,7 @@
             <p:ph type="title"/>
           </p:nvPr>
         </p:nvSpPr>
-        <p:spPr>
-          <a:xfrm>
-            <a:off x="0" y="274638"/>
-            <a:ext cx="9144000" cy="1143000"/>
-          </a:xfrm>
-        </p:spPr>
+        <p:spPr/>
         <p:txBody>
           <a:bodyPr>
             <a:normAutofit/>
@@ -13234,218 +13288,104 @@
         </p:nvSpPr>
         <p:spPr>
           <a:xfrm>
-            <a:off x="406908" y="1417638"/>
-            <a:ext cx="8482482" cy="5440362"/>
+            <a:off x="457200" y="1600200"/>
+            <a:ext cx="8229600" cy="5257800"/>
           </a:xfrm>
         </p:spPr>
         <p:txBody>
           <a:bodyPr>
-            <a:normAutofit fontScale="62500" lnSpcReduction="20000"/>
+            <a:normAutofit/>
           </a:bodyPr>
           <a:lstStyle/>
           <a:p>
-            <a:pPr>
-              <a:lnSpc>
-                <a:spcPct val="120000"/>
-              </a:lnSpc>
-            </a:pPr>
             <a:r>
               <a:rPr lang="en-GB" dirty="0"/>
-              <a:t>Find the starting code:</a:t>
-            </a:r>
-          </a:p>
-          <a:p>
-            <a:pPr marL="971550" lvl="1" indent="-514350">
-              <a:lnSpc>
-                <a:spcPct val="120000"/>
-              </a:lnSpc>
-              <a:buFont typeface="+mj-lt"/>
-              <a:buAutoNum type="arabicPeriod"/>
-            </a:pPr>
-            <a:r>
-              <a:rPr lang="en-GB" b="1" dirty="0">
-                <a:latin typeface="Courier New" panose="02070309020205020404" pitchFamily="49" charset="0"/>
-                <a:cs typeface="Courier New" panose="02070309020205020404" pitchFamily="49" charset="0"/>
-              </a:rPr>
-              <a:t>cd ~/</a:t>
+              <a:t>The example is a simple bilateral filter</a:t>
+            </a:r>
+          </a:p>
+          <a:p>
+            <a:pPr lvl="1"/>
+            <a:r>
+              <a:rPr lang="en-GB" dirty="0"/>
+              <a:t>Edge-preserving smoothing/noise reduction filter</a:t>
+            </a:r>
+          </a:p>
+          <a:p>
+            <a:pPr lvl="1"/>
+            <a:r>
+              <a:rPr lang="en-GB" dirty="0"/>
+              <a:t>Each pixel of the output image is some function of its neighbouring pixels from the input image</a:t>
+            </a:r>
+          </a:p>
+          <a:p>
+            <a:pPr lvl="1"/>
+            <a:r>
+              <a:rPr lang="en-GB" dirty="0"/>
+              <a:t>Uses </a:t>
             </a:r>
             <a:r>
               <a:rPr lang="en-GB" b="1" dirty="0" err="1">
-                <a:latin typeface="Courier New" panose="02070309020205020404" pitchFamily="49" charset="0"/>
-                <a:cs typeface="Courier New" panose="02070309020205020404" pitchFamily="49" charset="0"/>
-              </a:rPr>
-              <a:t>opencl</a:t>
-            </a:r>
-            <a:r>
-              <a:rPr lang="en-GB" b="1" dirty="0">
-                <a:latin typeface="Courier New" panose="02070309020205020404" pitchFamily="49" charset="0"/>
-                <a:cs typeface="Courier New" panose="02070309020205020404" pitchFamily="49" charset="0"/>
-              </a:rPr>
-              <a:t>-training/exercises/Bilateral</a:t>
-            </a:r>
-          </a:p>
-          <a:p>
-            <a:pPr marL="971550" lvl="1" indent="-514350">
-              <a:lnSpc>
-                <a:spcPct val="120000"/>
-              </a:lnSpc>
-              <a:buFont typeface="+mj-lt"/>
-              <a:buAutoNum type="arabicPeriod"/>
-            </a:pPr>
-            <a:r>
-              <a:rPr lang="en-GB" b="1" dirty="0">
-                <a:latin typeface="Courier New" panose="02070309020205020404" pitchFamily="49" charset="0"/>
-                <a:cs typeface="Courier New" panose="02070309020205020404" pitchFamily="49" charset="0"/>
-              </a:rPr>
-              <a:t>make</a:t>
-            </a:r>
-          </a:p>
-          <a:p>
-            <a:pPr marL="971550" lvl="1" indent="-514350">
-              <a:lnSpc>
-                <a:spcPct val="120000"/>
-              </a:lnSpc>
-              <a:buFont typeface="+mj-lt"/>
-              <a:buAutoNum type="arabicPeriod"/>
-            </a:pPr>
+                <a:solidFill>
+                  <a:srgbClr val="3366FF"/>
+                </a:solidFill>
+                <a:latin typeface="Courier New"/>
+                <a:cs typeface="Courier New"/>
+              </a:rPr>
+              <a:t>sqrt</a:t>
+            </a:r>
+            <a:r>
+              <a:rPr lang="en-GB" dirty="0"/>
+              <a:t>, </a:t>
+            </a:r>
             <a:r>
               <a:rPr lang="en-GB" b="1" dirty="0" err="1">
-                <a:latin typeface="Courier New" panose="02070309020205020404" pitchFamily="49" charset="0"/>
-                <a:cs typeface="Courier New" panose="02070309020205020404" pitchFamily="49" charset="0"/>
-              </a:rPr>
-              <a:t>qsub</a:t>
-            </a:r>
-            <a:r>
-              <a:rPr lang="en-GB" b="1" dirty="0">
-                <a:latin typeface="Courier New" panose="02070309020205020404" pitchFamily="49" charset="0"/>
-                <a:cs typeface="Courier New" panose="02070309020205020404" pitchFamily="49" charset="0"/>
+                <a:solidFill>
+                  <a:srgbClr val="3366FF"/>
+                </a:solidFill>
+                <a:latin typeface="Courier New"/>
+                <a:cs typeface="Courier New"/>
+              </a:rPr>
+              <a:t>exp</a:t>
+            </a:r>
+            <a:r>
+              <a:rPr lang="en-GB" dirty="0">
+                <a:solidFill>
+                  <a:srgbClr val="3366FF"/>
+                </a:solidFill>
               </a:rPr>
               <a:t> </a:t>
             </a:r>
             <a:r>
-              <a:rPr lang="en-GB" b="1" dirty="0" err="1">
-                <a:latin typeface="Courier New" panose="02070309020205020404" pitchFamily="49" charset="0"/>
-                <a:cs typeface="Courier New" panose="02070309020205020404" pitchFamily="49" charset="0"/>
-              </a:rPr>
-              <a:t>submit_bilateral</a:t>
-            </a:r>
-            <a:endParaRPr lang="en-GB" b="1" dirty="0">
-              <a:latin typeface="Courier New" panose="02070309020205020404" pitchFamily="49" charset="0"/>
-              <a:cs typeface="Courier New" panose="02070309020205020404" pitchFamily="49" charset="0"/>
-            </a:endParaRPr>
-          </a:p>
-          <a:p>
-            <a:pPr>
-              <a:lnSpc>
-                <a:spcPct val="120000"/>
-              </a:lnSpc>
-            </a:pPr>
-            <a:r>
               <a:rPr lang="en-GB" dirty="0"/>
-              <a:t>Experiment with some OpenCL compiler options to improve performance</a:t>
-            </a:r>
-          </a:p>
-          <a:p>
-            <a:pPr>
-              <a:lnSpc>
-                <a:spcPct val="120000"/>
-              </a:lnSpc>
-            </a:pPr>
+              <a:t>and </a:t>
+            </a:r>
+            <a:r>
+              <a:rPr lang="en-GB" b="1" dirty="0">
+                <a:solidFill>
+                  <a:srgbClr val="3366FF"/>
+                </a:solidFill>
+                <a:latin typeface="Courier New"/>
+                <a:cs typeface="Courier New"/>
+              </a:rPr>
+              <a:t>distance</a:t>
+            </a:r>
             <a:r>
               <a:rPr lang="en-GB" dirty="0"/>
-              <a:t>Try embedding some simulation parameters into the kernel as compile-time constants using OpenCL build options</a:t>
-            </a:r>
-          </a:p>
-          <a:p>
-            <a:pPr lvl="1">
-              <a:lnSpc>
-                <a:spcPct val="120000"/>
-              </a:lnSpc>
-            </a:pPr>
+              <a:t> </a:t>
+            </a:r>
+            <a:r>
+              <a:rPr lang="en-GB" dirty="0" err="1"/>
+              <a:t>builtins</a:t>
+            </a:r>
+            <a:endParaRPr lang="en-GB" dirty="0"/>
+          </a:p>
+          <a:p>
+            <a:endParaRPr lang="en-GB" dirty="0"/>
+          </a:p>
+          <a:p>
             <a:r>
               <a:rPr lang="en-GB" dirty="0"/>
-              <a:t>Disclaimer: This might not help for every parameter or on every device – try it with a few!</a:t>
-            </a:r>
-          </a:p>
-          <a:p>
-            <a:pPr>
-              <a:lnSpc>
-                <a:spcPct val="120000"/>
-              </a:lnSpc>
-            </a:pPr>
-            <a:r>
-              <a:rPr lang="en-GB" dirty="0"/>
-              <a:t>An example solution will be provided</a:t>
-            </a:r>
-          </a:p>
-          <a:p>
-            <a:pPr>
-              <a:lnSpc>
-                <a:spcPct val="120000"/>
-              </a:lnSpc>
-            </a:pPr>
-            <a:r>
-              <a:rPr lang="en-GB" dirty="0"/>
-              <a:t>Tip: If verification is too slow, use </a:t>
-            </a:r>
-            <a:r>
-              <a:rPr lang="en-GB" b="1" dirty="0">
-                <a:solidFill>
-                  <a:srgbClr val="3366FF"/>
-                </a:solidFill>
-                <a:latin typeface="Courier New"/>
-                <a:cs typeface="Courier New"/>
-              </a:rPr>
-              <a:t>--</a:t>
-            </a:r>
-            <a:r>
-              <a:rPr lang="en-GB" b="1" dirty="0" err="1">
-                <a:solidFill>
-                  <a:srgbClr val="3366FF"/>
-                </a:solidFill>
-                <a:latin typeface="Courier New"/>
-                <a:cs typeface="Courier New"/>
-              </a:rPr>
-              <a:t>noverify</a:t>
-            </a:r>
-            <a:r>
-              <a:rPr lang="en-GB" dirty="0"/>
-              <a:t> flag or set </a:t>
-            </a:r>
-            <a:r>
-              <a:rPr lang="en-GB" b="1" dirty="0">
-                <a:solidFill>
-                  <a:srgbClr val="3366FF"/>
-                </a:solidFill>
-                <a:latin typeface="Courier New"/>
-                <a:cs typeface="Courier New"/>
-              </a:rPr>
-              <a:t>verify = false</a:t>
-            </a:r>
-            <a:endParaRPr lang="en-GB" dirty="0"/>
-          </a:p>
-          <a:p>
-            <a:pPr marL="0" indent="0">
-              <a:lnSpc>
-                <a:spcPct val="120000"/>
-              </a:lnSpc>
-              <a:buNone/>
-            </a:pPr>
-            <a:r>
-              <a:rPr lang="en-GB" b="1" dirty="0"/>
-              <a:t>Extra:</a:t>
-            </a:r>
-            <a:endParaRPr lang="en-GB" dirty="0"/>
-          </a:p>
-          <a:p>
-            <a:pPr>
-              <a:lnSpc>
-                <a:spcPct val="120000"/>
-              </a:lnSpc>
-            </a:pPr>
-            <a:r>
-              <a:rPr lang="en-GB" dirty="0"/>
-              <a:t>Get the compiler to generate the assembly code and look through this, correlating it to your source code</a:t>
+              <a:t>A fully working implementation of this code is provided as a starting point</a:t>
             </a:r>
           </a:p>
         </p:txBody>
@@ -13455,7 +13395,7 @@
           <p:cNvPr id="4" name="Slide Number Placeholder 3">
             <a:extLst>
               <a:ext uri="{FF2B5EF4-FFF2-40B4-BE49-F238E27FC236}">
-                <a16:creationId xmlns:a16="http://schemas.microsoft.com/office/drawing/2014/main" id="{A8471308-23D8-3D4C-83C9-858E1F9DF60B}"/>
+                <a16:creationId xmlns:a16="http://schemas.microsoft.com/office/drawing/2014/main" id="{53C61C04-83DE-6B4E-A1F6-7E4E6B64BA56}"/>
               </a:ext>
             </a:extLst>
           </p:cNvPr>
@@ -13482,7 +13422,7 @@
     </p:spTree>
     <p:extLst>
       <p:ext uri="{BB962C8B-B14F-4D97-AF65-F5344CB8AC3E}">
-        <p14:creationId xmlns:p14="http://schemas.microsoft.com/office/powerpoint/2010/main" val="359158878"/>
+        <p14:creationId xmlns:p14="http://schemas.microsoft.com/office/powerpoint/2010/main" val="175238421"/>
       </p:ext>
     </p:extLst>
   </p:cSld>
@@ -14523,6 +14463,322 @@
 </file>
 
 <file path=ppt/slides/slide30.xml><?xml version="1.0" encoding="utf-8"?>
+<p:sld xmlns:a="http://schemas.openxmlformats.org/drawingml/2006/main" xmlns:r="http://schemas.openxmlformats.org/officeDocument/2006/relationships" xmlns:p="http://schemas.openxmlformats.org/presentationml/2006/main">
+  <p:cSld>
+    <p:spTree>
+      <p:nvGrpSpPr>
+        <p:cNvPr id="1" name=""/>
+        <p:cNvGrpSpPr/>
+        <p:nvPr/>
+      </p:nvGrpSpPr>
+      <p:grpSpPr>
+        <a:xfrm>
+          <a:off x="0" y="0"/>
+          <a:ext cx="0" cy="0"/>
+          <a:chOff x="0" y="0"/>
+          <a:chExt cx="0" cy="0"/>
+        </a:xfrm>
+      </p:grpSpPr>
+      <p:sp>
+        <p:nvSpPr>
+          <p:cNvPr id="2" name="Title 1"/>
+          <p:cNvSpPr>
+            <a:spLocks noGrp="1"/>
+          </p:cNvSpPr>
+          <p:nvPr>
+            <p:ph type="title"/>
+          </p:nvPr>
+        </p:nvSpPr>
+        <p:spPr>
+          <a:xfrm>
+            <a:off x="0" y="274638"/>
+            <a:ext cx="9144000" cy="1143000"/>
+          </a:xfrm>
+        </p:spPr>
+        <p:txBody>
+          <a:bodyPr>
+            <a:normAutofit/>
+          </a:bodyPr>
+          <a:lstStyle/>
+          <a:p>
+            <a:r>
+              <a:rPr lang="en-GB" dirty="0"/>
+              <a:t>Exercise: kernel compilation</a:t>
+            </a:r>
+          </a:p>
+        </p:txBody>
+      </p:sp>
+      <p:sp>
+        <p:nvSpPr>
+          <p:cNvPr id="3" name="Content Placeholder 2"/>
+          <p:cNvSpPr>
+            <a:spLocks noGrp="1"/>
+          </p:cNvSpPr>
+          <p:nvPr>
+            <p:ph idx="1"/>
+          </p:nvPr>
+        </p:nvSpPr>
+        <p:spPr>
+          <a:xfrm>
+            <a:off x="406908" y="1417638"/>
+            <a:ext cx="8482482" cy="5440362"/>
+          </a:xfrm>
+        </p:spPr>
+        <p:txBody>
+          <a:bodyPr>
+            <a:normAutofit fontScale="62500" lnSpcReduction="20000"/>
+          </a:bodyPr>
+          <a:lstStyle/>
+          <a:p>
+            <a:pPr>
+              <a:lnSpc>
+                <a:spcPct val="120000"/>
+              </a:lnSpc>
+            </a:pPr>
+            <a:r>
+              <a:rPr lang="en-GB" dirty="0"/>
+              <a:t>Find the starting code:</a:t>
+            </a:r>
+          </a:p>
+          <a:p>
+            <a:pPr marL="971550" lvl="1" indent="-514350">
+              <a:lnSpc>
+                <a:spcPct val="120000"/>
+              </a:lnSpc>
+              <a:buFont typeface="+mj-lt"/>
+              <a:buAutoNum type="arabicPeriod"/>
+            </a:pPr>
+            <a:r>
+              <a:rPr lang="en-GB" b="1" dirty="0">
+                <a:latin typeface="Courier New" panose="02070309020205020404" pitchFamily="49" charset="0"/>
+                <a:cs typeface="Courier New" panose="02070309020205020404" pitchFamily="49" charset="0"/>
+              </a:rPr>
+              <a:t>cd ~/</a:t>
+            </a:r>
+            <a:r>
+              <a:rPr lang="en-GB" b="1" dirty="0" err="1">
+                <a:latin typeface="Courier New" panose="02070309020205020404" pitchFamily="49" charset="0"/>
+                <a:cs typeface="Courier New" panose="02070309020205020404" pitchFamily="49" charset="0"/>
+              </a:rPr>
+              <a:t>opencl</a:t>
+            </a:r>
+            <a:r>
+              <a:rPr lang="en-GB" b="1" dirty="0">
+                <a:latin typeface="Courier New" panose="02070309020205020404" pitchFamily="49" charset="0"/>
+                <a:cs typeface="Courier New" panose="02070309020205020404" pitchFamily="49" charset="0"/>
+              </a:rPr>
+              <a:t>-training/exercises/Bilateral</a:t>
+            </a:r>
+          </a:p>
+          <a:p>
+            <a:pPr marL="971550" lvl="1" indent="-514350">
+              <a:lnSpc>
+                <a:spcPct val="120000"/>
+              </a:lnSpc>
+              <a:buFont typeface="+mj-lt"/>
+              <a:buAutoNum type="arabicPeriod"/>
+            </a:pPr>
+            <a:r>
+              <a:rPr lang="en-GB" b="1" dirty="0">
+                <a:latin typeface="Courier New" panose="02070309020205020404" pitchFamily="49" charset="0"/>
+                <a:cs typeface="Courier New" panose="02070309020205020404" pitchFamily="49" charset="0"/>
+              </a:rPr>
+              <a:t>make</a:t>
+            </a:r>
+          </a:p>
+          <a:p>
+            <a:pPr marL="971550" lvl="1" indent="-514350">
+              <a:lnSpc>
+                <a:spcPct val="120000"/>
+              </a:lnSpc>
+              <a:buFont typeface="+mj-lt"/>
+              <a:buAutoNum type="arabicPeriod"/>
+            </a:pPr>
+            <a:r>
+              <a:rPr lang="en-GB" b="1" dirty="0" err="1">
+                <a:latin typeface="Courier New" panose="02070309020205020404" pitchFamily="49" charset="0"/>
+                <a:cs typeface="Courier New" panose="02070309020205020404" pitchFamily="49" charset="0"/>
+              </a:rPr>
+              <a:t>qsub</a:t>
+            </a:r>
+            <a:r>
+              <a:rPr lang="en-GB" b="1" dirty="0">
+                <a:latin typeface="Courier New" panose="02070309020205020404" pitchFamily="49" charset="0"/>
+                <a:cs typeface="Courier New" panose="02070309020205020404" pitchFamily="49" charset="0"/>
+              </a:rPr>
+              <a:t> </a:t>
+            </a:r>
+            <a:r>
+              <a:rPr lang="en-GB" b="1" dirty="0" err="1">
+                <a:latin typeface="Courier New" panose="02070309020205020404" pitchFamily="49" charset="0"/>
+                <a:cs typeface="Courier New" panose="02070309020205020404" pitchFamily="49" charset="0"/>
+              </a:rPr>
+              <a:t>submit_bilateral</a:t>
+            </a:r>
+            <a:endParaRPr lang="en-GB" b="1" dirty="0">
+              <a:latin typeface="Courier New" panose="02070309020205020404" pitchFamily="49" charset="0"/>
+              <a:cs typeface="Courier New" panose="02070309020205020404" pitchFamily="49" charset="0"/>
+            </a:endParaRPr>
+          </a:p>
+          <a:p>
+            <a:pPr>
+              <a:lnSpc>
+                <a:spcPct val="120000"/>
+              </a:lnSpc>
+            </a:pPr>
+            <a:r>
+              <a:rPr lang="en-GB" dirty="0"/>
+              <a:t>Experiment with some OpenCL compiler options to improve performance</a:t>
+            </a:r>
+          </a:p>
+          <a:p>
+            <a:pPr>
+              <a:lnSpc>
+                <a:spcPct val="120000"/>
+              </a:lnSpc>
+            </a:pPr>
+            <a:r>
+              <a:rPr lang="en-GB" dirty="0"/>
+              <a:t>Try embedding some simulation parameters into the kernel as compile-time constants using OpenCL build options</a:t>
+            </a:r>
+          </a:p>
+          <a:p>
+            <a:pPr lvl="1">
+              <a:lnSpc>
+                <a:spcPct val="120000"/>
+              </a:lnSpc>
+            </a:pPr>
+            <a:r>
+              <a:rPr lang="en-GB" dirty="0"/>
+              <a:t>Disclaimer: This might not help for every parameter or on every device – try it with a few!</a:t>
+            </a:r>
+          </a:p>
+          <a:p>
+            <a:pPr>
+              <a:lnSpc>
+                <a:spcPct val="120000"/>
+              </a:lnSpc>
+            </a:pPr>
+            <a:r>
+              <a:rPr lang="en-GB" dirty="0"/>
+              <a:t>An example solution will be provided</a:t>
+            </a:r>
+          </a:p>
+          <a:p>
+            <a:pPr>
+              <a:lnSpc>
+                <a:spcPct val="120000"/>
+              </a:lnSpc>
+            </a:pPr>
+            <a:r>
+              <a:rPr lang="en-GB" dirty="0"/>
+              <a:t>Tip: If verification is too slow, use </a:t>
+            </a:r>
+            <a:r>
+              <a:rPr lang="en-GB" b="1" dirty="0">
+                <a:solidFill>
+                  <a:srgbClr val="3366FF"/>
+                </a:solidFill>
+                <a:latin typeface="Courier New"/>
+                <a:cs typeface="Courier New"/>
+              </a:rPr>
+              <a:t>--</a:t>
+            </a:r>
+            <a:r>
+              <a:rPr lang="en-GB" b="1" dirty="0" err="1">
+                <a:solidFill>
+                  <a:srgbClr val="3366FF"/>
+                </a:solidFill>
+                <a:latin typeface="Courier New"/>
+                <a:cs typeface="Courier New"/>
+              </a:rPr>
+              <a:t>noverify</a:t>
+            </a:r>
+            <a:r>
+              <a:rPr lang="en-GB" dirty="0"/>
+              <a:t> flag or set </a:t>
+            </a:r>
+            <a:r>
+              <a:rPr lang="en-GB" b="1" dirty="0">
+                <a:solidFill>
+                  <a:srgbClr val="3366FF"/>
+                </a:solidFill>
+                <a:latin typeface="Courier New"/>
+                <a:cs typeface="Courier New"/>
+              </a:rPr>
+              <a:t>verify = false</a:t>
+            </a:r>
+            <a:endParaRPr lang="en-GB" dirty="0"/>
+          </a:p>
+          <a:p>
+            <a:pPr marL="0" indent="0">
+              <a:lnSpc>
+                <a:spcPct val="120000"/>
+              </a:lnSpc>
+              <a:buNone/>
+            </a:pPr>
+            <a:r>
+              <a:rPr lang="en-GB" b="1" dirty="0"/>
+              <a:t>Extra:</a:t>
+            </a:r>
+            <a:endParaRPr lang="en-GB" dirty="0"/>
+          </a:p>
+          <a:p>
+            <a:pPr>
+              <a:lnSpc>
+                <a:spcPct val="120000"/>
+              </a:lnSpc>
+            </a:pPr>
+            <a:r>
+              <a:rPr lang="en-GB" dirty="0"/>
+              <a:t>Get the compiler to generate the assembly code and look through this, correlating it to your source code</a:t>
+            </a:r>
+          </a:p>
+        </p:txBody>
+      </p:sp>
+      <p:sp>
+        <p:nvSpPr>
+          <p:cNvPr id="4" name="Slide Number Placeholder 3">
+            <a:extLst>
+              <a:ext uri="{FF2B5EF4-FFF2-40B4-BE49-F238E27FC236}">
+                <a16:creationId xmlns:a16="http://schemas.microsoft.com/office/drawing/2014/main" id="{A8471308-23D8-3D4C-83C9-858E1F9DF60B}"/>
+              </a:ext>
+            </a:extLst>
+          </p:cNvPr>
+          <p:cNvSpPr>
+            <a:spLocks noGrp="1"/>
+          </p:cNvSpPr>
+          <p:nvPr>
+            <p:ph type="sldNum" sz="quarter" idx="12"/>
+          </p:nvPr>
+        </p:nvSpPr>
+        <p:spPr/>
+        <p:txBody>
+          <a:bodyPr/>
+          <a:lstStyle/>
+          <a:p>
+            <a:fld id="{412843D3-244E-7B40-8F83-4C5ACBCBD5F2}" type="slidenum">
+              <a:rPr lang="en-GB" smtClean="0"/>
+              <a:t>30</a:t>
+            </a:fld>
+            <a:endParaRPr lang="en-GB"/>
+          </a:p>
+        </p:txBody>
+      </p:sp>
+    </p:spTree>
+    <p:extLst>
+      <p:ext uri="{BB962C8B-B14F-4D97-AF65-F5344CB8AC3E}">
+        <p14:creationId xmlns:p14="http://schemas.microsoft.com/office/powerpoint/2010/main" val="359158878"/>
+      </p:ext>
+    </p:extLst>
+  </p:cSld>
+  <p:clrMapOvr>
+    <a:masterClrMapping/>
+  </p:clrMapOvr>
+</p:sld>
+</file>
+
+<file path=ppt/slides/slide31.xml><?xml version="1.0" encoding="utf-8"?>
 <p:sld xmlns:a="http://schemas.openxmlformats.org/drawingml/2006/main" xmlns:r="http://schemas.openxmlformats.org/officeDocument/2006/relationships" xmlns:p="http://schemas.openxmlformats.org/presentationml/2006/main" show="0">
   <p:cSld>
     <p:spTree>
@@ -14747,7 +15003,7 @@
           <a:p>
             <a:fld id="{412843D3-244E-7B40-8F83-4C5ACBCBD5F2}" type="slidenum">
               <a:rPr lang="en-GB" smtClean="0"/>
-              <a:t>30</a:t>
+              <a:t>31</a:t>
             </a:fld>
             <a:endParaRPr lang="en-GB"/>
           </a:p>
@@ -14766,7 +15022,7 @@
 </p:sld>
 </file>
 
-<file path=ppt/slides/slide31.xml><?xml version="1.0" encoding="utf-8"?>
+<file path=ppt/slides/slide32.xml><?xml version="1.0" encoding="utf-8"?>
 <p:sld xmlns:a="http://schemas.openxmlformats.org/drawingml/2006/main" xmlns:r="http://schemas.openxmlformats.org/officeDocument/2006/relationships" xmlns:p="http://schemas.openxmlformats.org/presentationml/2006/main">
   <p:cSld>
     <p:spTree>
@@ -14991,7 +15247,7 @@
           <a:p>
             <a:fld id="{412843D3-244E-7B40-8F83-4C5ACBCBD5F2}" type="slidenum">
               <a:rPr lang="en-GB" smtClean="0"/>
-              <a:t>31</a:t>
+              <a:t>32</a:t>
             </a:fld>
             <a:endParaRPr lang="en-GB"/>
           </a:p>

</xml_diff>

<commit_message>
Minor tweaks to formatting to aid readability
</commit_message>
<xml_diff>
--- a/advanced_part2.pptx
+++ b/advanced_part2.pptx
@@ -238,7 +238,7 @@
           <a:p>
             <a:fld id="{7FB74D45-CC88-7D46-9D48-9989C6A85D58}" type="datetimeFigureOut">
               <a:rPr lang="en-US" smtClean="0"/>
-              <a:t>11/28/18</a:t>
+              <a:t>5/12/19</a:t>
             </a:fld>
             <a:endParaRPr lang="en-US"/>
           </a:p>
@@ -1736,7 +1736,7 @@
           <a:p>
             <a:fld id="{98B7218E-8A9E-214E-AD19-AE634911F270}" type="datetime1">
               <a:rPr lang="en-GB" smtClean="0"/>
-              <a:t>28/11/2018</a:t>
+              <a:t>12/05/2019</a:t>
             </a:fld>
             <a:endParaRPr lang="en-GB"/>
           </a:p>
@@ -1904,7 +1904,7 @@
           <a:p>
             <a:fld id="{AA991B60-00D2-2343-80A7-DF08911EB882}" type="datetime1">
               <a:rPr lang="en-GB" smtClean="0"/>
-              <a:t>28/11/2018</a:t>
+              <a:t>12/05/2019</a:t>
             </a:fld>
             <a:endParaRPr lang="en-GB"/>
           </a:p>
@@ -2082,7 +2082,7 @@
           <a:p>
             <a:fld id="{79F2F4DC-ECDA-1B4B-A55A-19C765AB0936}" type="datetime1">
               <a:rPr lang="en-GB" smtClean="0"/>
-              <a:t>28/11/2018</a:t>
+              <a:t>12/05/2019</a:t>
             </a:fld>
             <a:endParaRPr lang="en-GB"/>
           </a:p>
@@ -2250,7 +2250,7 @@
           <a:p>
             <a:fld id="{E10EB459-D562-FA41-9CCB-2AF59A37850A}" type="datetime1">
               <a:rPr lang="en-GB" smtClean="0"/>
-              <a:t>28/11/2018</a:t>
+              <a:t>12/05/2019</a:t>
             </a:fld>
             <a:endParaRPr lang="en-GB"/>
           </a:p>
@@ -2495,7 +2495,7 @@
           <a:p>
             <a:fld id="{FF74A8AB-ACA2-0A4A-9324-7ABD14604470}" type="datetime1">
               <a:rPr lang="en-GB" smtClean="0"/>
-              <a:t>28/11/2018</a:t>
+              <a:t>12/05/2019</a:t>
             </a:fld>
             <a:endParaRPr lang="en-GB"/>
           </a:p>
@@ -2780,7 +2780,7 @@
           <a:p>
             <a:fld id="{BD56FB53-7A18-374A-9D53-928831CF7E8F}" type="datetime1">
               <a:rPr lang="en-GB" smtClean="0"/>
-              <a:t>28/11/2018</a:t>
+              <a:t>12/05/2019</a:t>
             </a:fld>
             <a:endParaRPr lang="en-GB"/>
           </a:p>
@@ -3199,7 +3199,7 @@
           <a:p>
             <a:fld id="{413DD57C-1454-CB46-ACCC-5F4CB268C6FE}" type="datetime1">
               <a:rPr lang="en-GB" smtClean="0"/>
-              <a:t>28/11/2018</a:t>
+              <a:t>12/05/2019</a:t>
             </a:fld>
             <a:endParaRPr lang="en-GB"/>
           </a:p>
@@ -3316,7 +3316,7 @@
           <a:p>
             <a:fld id="{59D2FC35-1ADA-B44B-BA66-EAFF9F83A6FA}" type="datetime1">
               <a:rPr lang="en-GB" smtClean="0"/>
-              <a:t>28/11/2018</a:t>
+              <a:t>12/05/2019</a:t>
             </a:fld>
             <a:endParaRPr lang="en-GB"/>
           </a:p>
@@ -3411,7 +3411,7 @@
           <a:p>
             <a:fld id="{61A51BD4-1821-E541-8C0D-147BB6BF4448}" type="datetime1">
               <a:rPr lang="en-GB" smtClean="0"/>
-              <a:t>28/11/2018</a:t>
+              <a:t>12/05/2019</a:t>
             </a:fld>
             <a:endParaRPr lang="en-GB"/>
           </a:p>
@@ -3686,7 +3686,7 @@
           <a:p>
             <a:fld id="{BEF9BA88-43D2-2E48-A2BB-52A4AEC31D51}" type="datetime1">
               <a:rPr lang="en-GB" smtClean="0"/>
-              <a:t>28/11/2018</a:t>
+              <a:t>12/05/2019</a:t>
             </a:fld>
             <a:endParaRPr lang="en-GB"/>
           </a:p>
@@ -3938,7 +3938,7 @@
           <a:p>
             <a:fld id="{DA316296-312D-764B-BF60-CABC8F3C2E8E}" type="datetime1">
               <a:rPr lang="en-GB" smtClean="0"/>
-              <a:t>28/11/2018</a:t>
+              <a:t>12/05/2019</a:t>
             </a:fld>
             <a:endParaRPr lang="en-GB"/>
           </a:p>
@@ -4149,7 +4149,7 @@
           <a:p>
             <a:fld id="{593728D0-71E1-F948-8215-937DF37E15C5}" type="datetime1">
               <a:rPr lang="en-GB" smtClean="0"/>
-              <a:t>28/11/2018</a:t>
+              <a:t>12/05/2019</a:t>
             </a:fld>
             <a:endParaRPr lang="en-GB"/>
           </a:p>
@@ -7897,7 +7897,19 @@
             </a:pPr>
             <a:r>
               <a:rPr lang="en-GB" dirty="0"/>
-              <a:t>Can use an attribute to inform the compiler of the work-group size that you intend to launch kernels with:</a:t>
+              <a:t>Can use an </a:t>
+            </a:r>
+            <a:r>
+              <a:rPr lang="en-GB" b="1" i="1" dirty="0">
+                <a:solidFill>
+                  <a:srgbClr val="00B050"/>
+                </a:solidFill>
+              </a:rPr>
+              <a:t>attribute</a:t>
+            </a:r>
+            <a:r>
+              <a:rPr lang="en-GB" dirty="0"/>
+              <a:t> to inform the compiler of information such as the work-group size that you intend to launch kernels with:</a:t>
             </a:r>
           </a:p>
           <a:p>
@@ -10078,7 +10090,7 @@
             </a:pPr>
             <a:r>
               <a:rPr lang="en-GB" dirty="0"/>
-              <a:t>Can be used to dynamically change the precision of a kernel</a:t>
+              <a:t>Can be used to e.g. dynamically change the precision of a kernel</a:t>
             </a:r>
           </a:p>
           <a:p>

</xml_diff>